<commit_message>
Java 8: Implemented example for default methods
</commit_message>
<xml_diff>
--- a/Java 7 and 8.pptx
+++ b/Java 7 and 8.pptx
@@ -114,6 +114,11 @@
       </a:defRPr>
     </a:lvl9pPr>
   </p:defaultTextStyle>
+  <p:extLst>
+    <p:ext uri="{EFAFB233-063F-42B5-8137-9DF3F51BA10A}">
+      <p15:sldGuideLst xmlns:p15="http://schemas.microsoft.com/office/powerpoint/2012/main"/>
+    </p:ext>
+  </p:extLst>
 </p:presentation>
 </file>
 
@@ -199,7 +204,7 @@
           <a:p>
             <a:fld id="{7139643C-5607-B049-9B5A-F7A87CB21215}" type="datetimeFigureOut">
               <a:rPr lang="en-US" smtClean="0"/>
-              <a:t>9/21/20</a:t>
+              <a:t>9/24/20</a:t>
             </a:fld>
             <a:endParaRPr lang="en-US"/>
           </a:p>
@@ -882,7 +887,7 @@
             <a:fld id="{B61BEF0D-F0BB-DE4B-95CE-6DB70DBA9567}" type="datetimeFigureOut">
               <a:rPr lang="en-US" dirty="0"/>
               <a:pPr/>
-              <a:t>9/21/20</a:t>
+              <a:t>9/24/20</a:t>
             </a:fld>
             <a:endParaRPr lang="en-US" dirty="0"/>
           </a:p>
@@ -1213,7 +1218,7 @@
             <a:fld id="{B61BEF0D-F0BB-DE4B-95CE-6DB70DBA9567}" type="datetimeFigureOut">
               <a:rPr lang="en-US" dirty="0"/>
               <a:pPr/>
-              <a:t>9/21/20</a:t>
+              <a:t>9/24/20</a:t>
             </a:fld>
             <a:endParaRPr lang="en-US" dirty="0"/>
           </a:p>
@@ -1488,7 +1493,7 @@
             <a:fld id="{B61BEF0D-F0BB-DE4B-95CE-6DB70DBA9567}" type="datetimeFigureOut">
               <a:rPr lang="en-US" dirty="0"/>
               <a:pPr/>
-              <a:t>9/21/20</a:t>
+              <a:t>9/24/20</a:t>
             </a:fld>
             <a:endParaRPr lang="en-US" dirty="0"/>
           </a:p>
@@ -2053,7 +2058,7 @@
             <a:fld id="{B61BEF0D-F0BB-DE4B-95CE-6DB70DBA9567}" type="datetimeFigureOut">
               <a:rPr lang="en-US" dirty="0"/>
               <a:pPr/>
-              <a:t>9/21/20</a:t>
+              <a:t>9/24/20</a:t>
             </a:fld>
             <a:endParaRPr lang="en-US" dirty="0"/>
           </a:p>
@@ -2328,7 +2333,7 @@
             <a:fld id="{B61BEF0D-F0BB-DE4B-95CE-6DB70DBA9567}" type="datetimeFigureOut">
               <a:rPr lang="en-US" dirty="0"/>
               <a:pPr/>
-              <a:t>9/21/20</a:t>
+              <a:t>9/24/20</a:t>
             </a:fld>
             <a:endParaRPr lang="en-US" dirty="0"/>
           </a:p>
@@ -2887,7 +2892,7 @@
             <a:fld id="{B61BEF0D-F0BB-DE4B-95CE-6DB70DBA9567}" type="datetimeFigureOut">
               <a:rPr lang="en-US" dirty="0"/>
               <a:pPr/>
-              <a:t>9/21/20</a:t>
+              <a:t>9/24/20</a:t>
             </a:fld>
             <a:endParaRPr lang="en-US" dirty="0"/>
           </a:p>
@@ -3211,7 +3216,7 @@
             <a:fld id="{B61BEF0D-F0BB-DE4B-95CE-6DB70DBA9567}" type="datetimeFigureOut">
               <a:rPr lang="en-US" dirty="0"/>
               <a:pPr/>
-              <a:t>9/21/20</a:t>
+              <a:t>9/24/20</a:t>
             </a:fld>
             <a:endParaRPr lang="en-US" dirty="0"/>
           </a:p>
@@ -3385,7 +3390,7 @@
             <a:fld id="{B61BEF0D-F0BB-DE4B-95CE-6DB70DBA9567}" type="datetimeFigureOut">
               <a:rPr lang="en-US" dirty="0"/>
               <a:pPr/>
-              <a:t>9/21/20</a:t>
+              <a:t>9/24/20</a:t>
             </a:fld>
             <a:endParaRPr lang="en-US" dirty="0"/>
           </a:p>
@@ -3620,7 +3625,7 @@
             <a:fld id="{B61BEF0D-F0BB-DE4B-95CE-6DB70DBA9567}" type="datetimeFigureOut">
               <a:rPr lang="en-US" dirty="0"/>
               <a:pPr/>
-              <a:t>9/21/20</a:t>
+              <a:t>9/24/20</a:t>
             </a:fld>
             <a:endParaRPr lang="en-US" dirty="0"/>
           </a:p>
@@ -3817,7 +3822,7 @@
             <a:fld id="{B61BEF0D-F0BB-DE4B-95CE-6DB70DBA9567}" type="datetimeFigureOut">
               <a:rPr lang="en-US" dirty="0"/>
               <a:pPr/>
-              <a:t>9/21/20</a:t>
+              <a:t>9/24/20</a:t>
             </a:fld>
             <a:endParaRPr lang="en-US" dirty="0"/>
           </a:p>
@@ -4090,7 +4095,7 @@
             <a:fld id="{B61BEF0D-F0BB-DE4B-95CE-6DB70DBA9567}" type="datetimeFigureOut">
               <a:rPr lang="en-US" dirty="0"/>
               <a:pPr/>
-              <a:t>9/21/20</a:t>
+              <a:t>9/24/20</a:t>
             </a:fld>
             <a:endParaRPr lang="en-US" dirty="0"/>
           </a:p>
@@ -4353,7 +4358,7 @@
             <a:fld id="{B61BEF0D-F0BB-DE4B-95CE-6DB70DBA9567}" type="datetimeFigureOut">
               <a:rPr lang="en-US" dirty="0"/>
               <a:pPr/>
-              <a:t>9/21/20</a:t>
+              <a:t>9/24/20</a:t>
             </a:fld>
             <a:endParaRPr lang="en-US" dirty="0"/>
           </a:p>
@@ -4724,7 +4729,7 @@
             <a:fld id="{B61BEF0D-F0BB-DE4B-95CE-6DB70DBA9567}" type="datetimeFigureOut">
               <a:rPr lang="en-US" dirty="0"/>
               <a:pPr/>
-              <a:t>9/21/20</a:t>
+              <a:t>9/24/20</a:t>
             </a:fld>
             <a:endParaRPr lang="en-US" dirty="0"/>
           </a:p>
@@ -4869,7 +4874,7 @@
             <a:fld id="{B61BEF0D-F0BB-DE4B-95CE-6DB70DBA9567}" type="datetimeFigureOut">
               <a:rPr lang="en-US" dirty="0"/>
               <a:pPr/>
-              <a:t>9/21/20</a:t>
+              <a:t>9/24/20</a:t>
             </a:fld>
             <a:endParaRPr lang="en-US" dirty="0"/>
           </a:p>
@@ -4991,7 +4996,7 @@
             <a:fld id="{B61BEF0D-F0BB-DE4B-95CE-6DB70DBA9567}" type="datetimeFigureOut">
               <a:rPr lang="en-US" dirty="0"/>
               <a:pPr/>
-              <a:t>9/21/20</a:t>
+              <a:t>9/24/20</a:t>
             </a:fld>
             <a:endParaRPr lang="en-US" dirty="0"/>
           </a:p>
@@ -5273,7 +5278,7 @@
             <a:fld id="{B61BEF0D-F0BB-DE4B-95CE-6DB70DBA9567}" type="datetimeFigureOut">
               <a:rPr lang="en-US" dirty="0"/>
               <a:pPr/>
-              <a:t>9/21/20</a:t>
+              <a:t>9/24/20</a:t>
             </a:fld>
             <a:endParaRPr lang="en-US" dirty="0"/>
           </a:p>
@@ -5594,7 +5599,7 @@
             <a:fld id="{B61BEF0D-F0BB-DE4B-95CE-6DB70DBA9567}" type="datetimeFigureOut">
               <a:rPr lang="en-US" dirty="0"/>
               <a:pPr/>
-              <a:t>9/21/20</a:t>
+              <a:t>9/24/20</a:t>
             </a:fld>
             <a:endParaRPr lang="en-US" dirty="0"/>
           </a:p>
@@ -5805,7 +5810,7 @@
             <a:fld id="{B61BEF0D-F0BB-DE4B-95CE-6DB70DBA9567}" type="datetimeFigureOut">
               <a:rPr lang="en-US" dirty="0"/>
               <a:pPr/>
-              <a:t>9/21/20</a:t>
+              <a:t>9/24/20</a:t>
             </a:fld>
             <a:endParaRPr lang="en-US" dirty="0"/>
           </a:p>
@@ -6664,12 +6669,14 @@
         </p:nvSpPr>
         <p:spPr/>
         <p:txBody>
-          <a:bodyPr/>
-          <a:lstStyle/>
-          <a:p>
-            <a:r>
-              <a:rPr lang="en-US" dirty="0"/>
-              <a:t>Starting with the release of Java 9 on September 21, 2017, Oracle went to a new release cadence</a:t>
+          <a:bodyPr>
+            <a:normAutofit/>
+          </a:bodyPr>
+          <a:lstStyle/>
+          <a:p>
+            <a:r>
+              <a:rPr lang="en-US" dirty="0"/>
+              <a:t>Starting after the release of Java 9 on September 21, 2017, Oracle went to a new release cadence</a:t>
             </a:r>
           </a:p>
           <a:p>
@@ -6690,14 +6697,14 @@
             <a:pPr lvl="1"/>
             <a:r>
               <a:rPr lang="en-US" dirty="0"/>
+              <a:t>Long-term support releases every 3 years</a:t>
+            </a:r>
+          </a:p>
+          <a:p>
+            <a:pPr lvl="1"/>
+            <a:r>
+              <a:rPr lang="en-US" dirty="0"/>
               <a:t>Support for one major release ends when then next one becomes available (except for LTS releases)</a:t>
-            </a:r>
-          </a:p>
-          <a:p>
-            <a:pPr lvl="1"/>
-            <a:r>
-              <a:rPr lang="en-US" dirty="0"/>
-              <a:t>Long-term support releases every 3 years</a:t>
             </a:r>
           </a:p>
           <a:p>
@@ -6917,6 +6924,15 @@
           <a:bodyPr/>
           <a:lstStyle/>
           <a:p>
+            <a:pPr marL="0" indent="0">
+              <a:buNone/>
+            </a:pPr>
+            <a:r>
+              <a:rPr lang="en-US" dirty="0"/>
+              <a:t>OpenJDK Distributions</a:t>
+            </a:r>
+          </a:p>
+          <a:p>
             <a:pPr marL="342900" indent="-342900">
               <a:buFont typeface="+mj-lt"/>
               <a:buAutoNum type="arabicPeriod"/>
@@ -6944,13 +6960,21 @@
             </a:pPr>
             <a:r>
               <a:rPr lang="en-US" dirty="0"/>
-              <a:t>OpenJDK - </a:t>
+              <a:t>Amazon’s </a:t>
+            </a:r>
+            <a:r>
+              <a:rPr lang="en-US" dirty="0" err="1"/>
+              <a:t>Corretto</a:t>
+            </a:r>
+            <a:r>
+              <a:rPr lang="en-US" dirty="0"/>
+              <a:t> - </a:t>
             </a:r>
             <a:r>
               <a:rPr lang="en-US" dirty="0">
                 <a:hlinkClick r:id="rId4"/>
               </a:rPr>
-              <a:t>https://jdk.java.net/</a:t>
+              <a:t>https://aws.amazon.com/corretto/</a:t>
             </a:r>
             <a:endParaRPr lang="en-US" dirty="0"/>
           </a:p>
@@ -6977,12 +7001,16 @@
               <a:buAutoNum type="arabicPeriod"/>
             </a:pPr>
             <a:r>
-              <a:rPr lang="en-US" dirty="0"/>
-              <a:t>Amazon’s </a:t>
-            </a:r>
-            <a:r>
               <a:rPr lang="en-US" dirty="0" err="1"/>
-              <a:t>Corretto</a:t>
+              <a:t>Bellsoft’s</a:t>
+            </a:r>
+            <a:r>
+              <a:rPr lang="en-US" dirty="0"/>
+              <a:t> </a:t>
+            </a:r>
+            <a:r>
+              <a:rPr lang="en-US" dirty="0" err="1"/>
+              <a:t>Liberica</a:t>
             </a:r>
             <a:r>
               <a:rPr lang="en-US" dirty="0"/>
@@ -6992,7 +7020,7 @@
               <a:rPr lang="en-US" dirty="0">
                 <a:hlinkClick r:id="rId6"/>
               </a:rPr>
-              <a:t>https://aws.amazon.com/corretto/</a:t>
+              <a:t>https://bell-sw.com/</a:t>
             </a:r>
             <a:endParaRPr lang="en-US" dirty="0"/>
           </a:p>
@@ -7003,21 +7031,13 @@
             </a:pPr>
             <a:r>
               <a:rPr lang="en-US" dirty="0"/>
-              <a:t>Oracle’s </a:t>
-            </a:r>
-            <a:r>
-              <a:rPr lang="en-US" dirty="0" err="1"/>
-              <a:t>GraalVM</a:t>
-            </a:r>
-            <a:r>
-              <a:rPr lang="en-US" dirty="0"/>
-              <a:t>* - </a:t>
+              <a:t>OpenJDK - </a:t>
             </a:r>
             <a:r>
               <a:rPr lang="en-US" dirty="0">
                 <a:hlinkClick r:id="rId7"/>
               </a:rPr>
-              <a:t>https://www.graalvm.org/</a:t>
+              <a:t>https://jdk.java.net/</a:t>
             </a:r>
             <a:endParaRPr lang="en-US" dirty="0"/>
           </a:p>
@@ -7027,26 +7047,22 @@
               <a:buAutoNum type="arabicPeriod"/>
             </a:pPr>
             <a:r>
+              <a:rPr lang="en-US" dirty="0"/>
+              <a:t>Oracle’s </a:t>
+            </a:r>
+            <a:r>
               <a:rPr lang="en-US" dirty="0" err="1"/>
-              <a:t>Bellsoft’s</a:t>
-            </a:r>
-            <a:r>
-              <a:rPr lang="en-US" dirty="0"/>
-              <a:t> </a:t>
-            </a:r>
-            <a:r>
-              <a:rPr lang="en-US" dirty="0" err="1"/>
-              <a:t>Liberica</a:t>
-            </a:r>
-            <a:r>
-              <a:rPr lang="en-US" dirty="0"/>
-              <a:t> - </a:t>
+              <a:t>GraalVM</a:t>
+            </a:r>
+            <a:r>
+              <a:rPr lang="en-US" dirty="0"/>
+              <a:t>* - </a:t>
             </a:r>
             <a:r>
               <a:rPr lang="en-US" dirty="0">
                 <a:hlinkClick r:id="rId8"/>
               </a:rPr>
-              <a:t>https://bell-sw.com/</a:t>
+              <a:t>https://www.graalvm.org/</a:t>
             </a:r>
             <a:endParaRPr lang="en-US" dirty="0"/>
           </a:p>
@@ -7071,13 +7087,7 @@
               <a:rPr lang="en-US" dirty="0">
                 <a:hlinkClick r:id="rId9"/>
               </a:rPr>
-              <a:t>https://sap.github.io/SapMachine</a:t>
-            </a:r>
-            <a:r>
-              <a:rPr lang="en-US">
-                <a:hlinkClick r:id="rId9"/>
-              </a:rPr>
-              <a:t>/</a:t>
+              <a:t>https://sap.github.io/SapMachine/</a:t>
             </a:r>
             <a:endParaRPr lang="en-US" dirty="0"/>
           </a:p>

</xml_diff>

<commit_message>
Presentation: Java 7/Coin slides
</commit_message>
<xml_diff>
--- a/Java 7 and 8.pptx
+++ b/Java 7 and 8.pptx
@@ -5,7 +5,7 @@
     <p:sldMasterId id="2147483648" r:id="rId1"/>
   </p:sldMasterIdLst>
   <p:notesMasterIdLst>
-    <p:notesMasterId r:id="rId10"/>
+    <p:notesMasterId r:id="rId23"/>
   </p:notesMasterIdLst>
   <p:sldIdLst>
     <p:sldId id="256" r:id="rId2"/>
@@ -16,6 +16,19 @@
     <p:sldId id="263" r:id="rId7"/>
     <p:sldId id="258" r:id="rId8"/>
     <p:sldId id="257" r:id="rId9"/>
+    <p:sldId id="267" r:id="rId10"/>
+    <p:sldId id="269" r:id="rId11"/>
+    <p:sldId id="270" r:id="rId12"/>
+    <p:sldId id="268" r:id="rId13"/>
+    <p:sldId id="275" r:id="rId14"/>
+    <p:sldId id="276" r:id="rId15"/>
+    <p:sldId id="271" r:id="rId16"/>
+    <p:sldId id="272" r:id="rId17"/>
+    <p:sldId id="273" r:id="rId18"/>
+    <p:sldId id="274" r:id="rId19"/>
+    <p:sldId id="264" r:id="rId20"/>
+    <p:sldId id="265" r:id="rId21"/>
+    <p:sldId id="266" r:id="rId22"/>
   </p:sldIdLst>
   <p:sldSz cx="12192000" cy="6858000"/>
   <p:notesSz cx="6858000" cy="9144000"/>
@@ -115,6 +128,47 @@
     </a:lvl9pPr>
   </p:defaultTextStyle>
   <p:extLst>
+    <p:ext uri="{521415D9-36F7-43E2-AB2F-B90AF26B5E84}">
+      <p14:sectionLst xmlns:p14="http://schemas.microsoft.com/office/powerpoint/2010/main">
+        <p14:section name="Default Section" id="{C5990EB7-E4F8-374F-B43C-DAAA2FBEB75B}">
+          <p14:sldIdLst>
+            <p14:sldId id="256"/>
+          </p14:sldIdLst>
+        </p14:section>
+        <p14:section name="Intro" id="{05A493A6-F598-2B44-92F7-6807F06C6F88}">
+          <p14:sldIdLst>
+            <p14:sldId id="261"/>
+            <p14:sldId id="259"/>
+            <p14:sldId id="260"/>
+            <p14:sldId id="262"/>
+            <p14:sldId id="263"/>
+          </p14:sldIdLst>
+        </p14:section>
+        <p14:section name="Java 7" id="{E35C5B5B-240D-324B-AD90-72908E7C6717}">
+          <p14:sldIdLst>
+            <p14:sldId id="258"/>
+            <p14:sldId id="257"/>
+            <p14:sldId id="267"/>
+            <p14:sldId id="269"/>
+            <p14:sldId id="270"/>
+            <p14:sldId id="268"/>
+            <p14:sldId id="275"/>
+            <p14:sldId id="276"/>
+            <p14:sldId id="271"/>
+            <p14:sldId id="272"/>
+            <p14:sldId id="273"/>
+            <p14:sldId id="274"/>
+          </p14:sldIdLst>
+        </p14:section>
+        <p14:section name="Java 8" id="{D7382956-2B57-0E4B-A030-A326880810EB}">
+          <p14:sldIdLst>
+            <p14:sldId id="264"/>
+            <p14:sldId id="265"/>
+            <p14:sldId id="266"/>
+          </p14:sldIdLst>
+        </p14:section>
+      </p14:sectionLst>
+    </p:ext>
     <p:ext uri="{EFAFB233-063F-42B5-8137-9DF3F51BA10A}">
       <p15:sldGuideLst xmlns:p15="http://schemas.microsoft.com/office/powerpoint/2012/main"/>
     </p:ext>
@@ -204,7 +258,7 @@
           <a:p>
             <a:fld id="{7139643C-5607-B049-9B5A-F7A87CB21215}" type="datetimeFigureOut">
               <a:rPr lang="en-US" smtClean="0"/>
-              <a:t>9/24/20</a:t>
+              <a:t>11/4/20</a:t>
             </a:fld>
             <a:endParaRPr lang="en-US"/>
           </a:p>
@@ -887,7 +941,7 @@
             <a:fld id="{B61BEF0D-F0BB-DE4B-95CE-6DB70DBA9567}" type="datetimeFigureOut">
               <a:rPr lang="en-US" dirty="0"/>
               <a:pPr/>
-              <a:t>9/24/20</a:t>
+              <a:t>11/4/20</a:t>
             </a:fld>
             <a:endParaRPr lang="en-US" dirty="0"/>
           </a:p>
@@ -1218,7 +1272,7 @@
             <a:fld id="{B61BEF0D-F0BB-DE4B-95CE-6DB70DBA9567}" type="datetimeFigureOut">
               <a:rPr lang="en-US" dirty="0"/>
               <a:pPr/>
-              <a:t>9/24/20</a:t>
+              <a:t>11/4/20</a:t>
             </a:fld>
             <a:endParaRPr lang="en-US" dirty="0"/>
           </a:p>
@@ -1493,7 +1547,7 @@
             <a:fld id="{B61BEF0D-F0BB-DE4B-95CE-6DB70DBA9567}" type="datetimeFigureOut">
               <a:rPr lang="en-US" dirty="0"/>
               <a:pPr/>
-              <a:t>9/24/20</a:t>
+              <a:t>11/4/20</a:t>
             </a:fld>
             <a:endParaRPr lang="en-US" dirty="0"/>
           </a:p>
@@ -2058,7 +2112,7 @@
             <a:fld id="{B61BEF0D-F0BB-DE4B-95CE-6DB70DBA9567}" type="datetimeFigureOut">
               <a:rPr lang="en-US" dirty="0"/>
               <a:pPr/>
-              <a:t>9/24/20</a:t>
+              <a:t>11/4/20</a:t>
             </a:fld>
             <a:endParaRPr lang="en-US" dirty="0"/>
           </a:p>
@@ -2333,7 +2387,7 @@
             <a:fld id="{B61BEF0D-F0BB-DE4B-95CE-6DB70DBA9567}" type="datetimeFigureOut">
               <a:rPr lang="en-US" dirty="0"/>
               <a:pPr/>
-              <a:t>9/24/20</a:t>
+              <a:t>11/4/20</a:t>
             </a:fld>
             <a:endParaRPr lang="en-US" dirty="0"/>
           </a:p>
@@ -2892,7 +2946,7 @@
             <a:fld id="{B61BEF0D-F0BB-DE4B-95CE-6DB70DBA9567}" type="datetimeFigureOut">
               <a:rPr lang="en-US" dirty="0"/>
               <a:pPr/>
-              <a:t>9/24/20</a:t>
+              <a:t>11/4/20</a:t>
             </a:fld>
             <a:endParaRPr lang="en-US" dirty="0"/>
           </a:p>
@@ -3216,7 +3270,7 @@
             <a:fld id="{B61BEF0D-F0BB-DE4B-95CE-6DB70DBA9567}" type="datetimeFigureOut">
               <a:rPr lang="en-US" dirty="0"/>
               <a:pPr/>
-              <a:t>9/24/20</a:t>
+              <a:t>11/4/20</a:t>
             </a:fld>
             <a:endParaRPr lang="en-US" dirty="0"/>
           </a:p>
@@ -3390,7 +3444,7 @@
             <a:fld id="{B61BEF0D-F0BB-DE4B-95CE-6DB70DBA9567}" type="datetimeFigureOut">
               <a:rPr lang="en-US" dirty="0"/>
               <a:pPr/>
-              <a:t>9/24/20</a:t>
+              <a:t>11/4/20</a:t>
             </a:fld>
             <a:endParaRPr lang="en-US" dirty="0"/>
           </a:p>
@@ -3625,7 +3679,7 @@
             <a:fld id="{B61BEF0D-F0BB-DE4B-95CE-6DB70DBA9567}" type="datetimeFigureOut">
               <a:rPr lang="en-US" dirty="0"/>
               <a:pPr/>
-              <a:t>9/24/20</a:t>
+              <a:t>11/4/20</a:t>
             </a:fld>
             <a:endParaRPr lang="en-US" dirty="0"/>
           </a:p>
@@ -3822,7 +3876,7 @@
             <a:fld id="{B61BEF0D-F0BB-DE4B-95CE-6DB70DBA9567}" type="datetimeFigureOut">
               <a:rPr lang="en-US" dirty="0"/>
               <a:pPr/>
-              <a:t>9/24/20</a:t>
+              <a:t>11/4/20</a:t>
             </a:fld>
             <a:endParaRPr lang="en-US" dirty="0"/>
           </a:p>
@@ -4095,7 +4149,7 @@
             <a:fld id="{B61BEF0D-F0BB-DE4B-95CE-6DB70DBA9567}" type="datetimeFigureOut">
               <a:rPr lang="en-US" dirty="0"/>
               <a:pPr/>
-              <a:t>9/24/20</a:t>
+              <a:t>11/4/20</a:t>
             </a:fld>
             <a:endParaRPr lang="en-US" dirty="0"/>
           </a:p>
@@ -4358,7 +4412,7 @@
             <a:fld id="{B61BEF0D-F0BB-DE4B-95CE-6DB70DBA9567}" type="datetimeFigureOut">
               <a:rPr lang="en-US" dirty="0"/>
               <a:pPr/>
-              <a:t>9/24/20</a:t>
+              <a:t>11/4/20</a:t>
             </a:fld>
             <a:endParaRPr lang="en-US" dirty="0"/>
           </a:p>
@@ -4729,7 +4783,7 @@
             <a:fld id="{B61BEF0D-F0BB-DE4B-95CE-6DB70DBA9567}" type="datetimeFigureOut">
               <a:rPr lang="en-US" dirty="0"/>
               <a:pPr/>
-              <a:t>9/24/20</a:t>
+              <a:t>11/4/20</a:t>
             </a:fld>
             <a:endParaRPr lang="en-US" dirty="0"/>
           </a:p>
@@ -4874,7 +4928,7 @@
             <a:fld id="{B61BEF0D-F0BB-DE4B-95CE-6DB70DBA9567}" type="datetimeFigureOut">
               <a:rPr lang="en-US" dirty="0"/>
               <a:pPr/>
-              <a:t>9/24/20</a:t>
+              <a:t>11/4/20</a:t>
             </a:fld>
             <a:endParaRPr lang="en-US" dirty="0"/>
           </a:p>
@@ -4996,7 +5050,7 @@
             <a:fld id="{B61BEF0D-F0BB-DE4B-95CE-6DB70DBA9567}" type="datetimeFigureOut">
               <a:rPr lang="en-US" dirty="0"/>
               <a:pPr/>
-              <a:t>9/24/20</a:t>
+              <a:t>11/4/20</a:t>
             </a:fld>
             <a:endParaRPr lang="en-US" dirty="0"/>
           </a:p>
@@ -5278,7 +5332,7 @@
             <a:fld id="{B61BEF0D-F0BB-DE4B-95CE-6DB70DBA9567}" type="datetimeFigureOut">
               <a:rPr lang="en-US" dirty="0"/>
               <a:pPr/>
-              <a:t>9/24/20</a:t>
+              <a:t>11/4/20</a:t>
             </a:fld>
             <a:endParaRPr lang="en-US" dirty="0"/>
           </a:p>
@@ -5599,7 +5653,7 @@
             <a:fld id="{B61BEF0D-F0BB-DE4B-95CE-6DB70DBA9567}" type="datetimeFigureOut">
               <a:rPr lang="en-US" dirty="0"/>
               <a:pPr/>
-              <a:t>9/24/20</a:t>
+              <a:t>11/4/20</a:t>
             </a:fld>
             <a:endParaRPr lang="en-US" dirty="0"/>
           </a:p>
@@ -5810,7 +5864,7 @@
             <a:fld id="{B61BEF0D-F0BB-DE4B-95CE-6DB70DBA9567}" type="datetimeFigureOut">
               <a:rPr lang="en-US" dirty="0"/>
               <a:pPr/>
-              <a:t>9/24/20</a:t>
+              <a:t>11/4/20</a:t>
             </a:fld>
             <a:endParaRPr lang="en-US" dirty="0"/>
           </a:p>
@@ -6395,6 +6449,2625 @@
 </p:sld>
 </file>
 
+<file path=ppt/slides/slide10.xml><?xml version="1.0" encoding="utf-8"?>
+<p:sld xmlns:a="http://schemas.openxmlformats.org/drawingml/2006/main" xmlns:r="http://schemas.openxmlformats.org/officeDocument/2006/relationships" xmlns:p="http://schemas.openxmlformats.org/presentationml/2006/main">
+  <p:cSld>
+    <p:spTree>
+      <p:nvGrpSpPr>
+        <p:cNvPr id="1" name=""/>
+        <p:cNvGrpSpPr/>
+        <p:nvPr/>
+      </p:nvGrpSpPr>
+      <p:grpSpPr>
+        <a:xfrm>
+          <a:off x="0" y="0"/>
+          <a:ext cx="0" cy="0"/>
+          <a:chOff x="0" y="0"/>
+          <a:chExt cx="0" cy="0"/>
+        </a:xfrm>
+      </p:grpSpPr>
+      <p:sp>
+        <p:nvSpPr>
+          <p:cNvPr id="2" name="Title 1">
+            <a:extLst>
+              <a:ext uri="{FF2B5EF4-FFF2-40B4-BE49-F238E27FC236}">
+                <a16:creationId xmlns:a16="http://schemas.microsoft.com/office/drawing/2014/main" id="{C2052CE5-F69A-D645-8ECD-5C44E4A30D5C}"/>
+              </a:ext>
+            </a:extLst>
+          </p:cNvPr>
+          <p:cNvSpPr>
+            <a:spLocks noGrp="1"/>
+          </p:cNvSpPr>
+          <p:nvPr>
+            <p:ph type="title"/>
+          </p:nvPr>
+        </p:nvSpPr>
+        <p:spPr/>
+        <p:txBody>
+          <a:bodyPr/>
+          <a:lstStyle/>
+          <a:p>
+            <a:r>
+              <a:rPr lang="en-US" dirty="0"/>
+              <a:t>Java 7</a:t>
+            </a:r>
+          </a:p>
+        </p:txBody>
+      </p:sp>
+      <p:sp>
+        <p:nvSpPr>
+          <p:cNvPr id="3" name="Content Placeholder 2">
+            <a:extLst>
+              <a:ext uri="{FF2B5EF4-FFF2-40B4-BE49-F238E27FC236}">
+                <a16:creationId xmlns:a16="http://schemas.microsoft.com/office/drawing/2014/main" id="{20ABE521-BF95-4441-82E2-23994761C137}"/>
+              </a:ext>
+            </a:extLst>
+          </p:cNvPr>
+          <p:cNvSpPr>
+            <a:spLocks noGrp="1"/>
+          </p:cNvSpPr>
+          <p:nvPr>
+            <p:ph sz="half" idx="1"/>
+          </p:nvPr>
+        </p:nvSpPr>
+        <p:spPr>
+          <a:xfrm>
+            <a:off x="685802" y="2142067"/>
+            <a:ext cx="3016403" cy="3649134"/>
+          </a:xfrm>
+        </p:spPr>
+        <p:txBody>
+          <a:bodyPr>
+            <a:normAutofit/>
+          </a:bodyPr>
+          <a:lstStyle/>
+          <a:p>
+            <a:pPr marL="0" indent="0">
+              <a:buNone/>
+            </a:pPr>
+            <a:r>
+              <a:rPr lang="en-US" sz="2800" dirty="0"/>
+              <a:t>Project Coin</a:t>
+            </a:r>
+          </a:p>
+        </p:txBody>
+      </p:sp>
+      <p:sp>
+        <p:nvSpPr>
+          <p:cNvPr id="4" name="Content Placeholder 3">
+            <a:extLst>
+              <a:ext uri="{FF2B5EF4-FFF2-40B4-BE49-F238E27FC236}">
+                <a16:creationId xmlns:a16="http://schemas.microsoft.com/office/drawing/2014/main" id="{26204FAF-26E7-1B46-B974-24DDC791B844}"/>
+              </a:ext>
+            </a:extLst>
+          </p:cNvPr>
+          <p:cNvSpPr>
+            <a:spLocks noGrp="1"/>
+          </p:cNvSpPr>
+          <p:nvPr>
+            <p:ph sz="half" idx="2"/>
+          </p:nvPr>
+        </p:nvSpPr>
+        <p:spPr>
+          <a:xfrm>
+            <a:off x="3914078" y="2142067"/>
+            <a:ext cx="6903149" cy="3649133"/>
+          </a:xfrm>
+        </p:spPr>
+        <p:txBody>
+          <a:bodyPr anchor="t">
+            <a:normAutofit/>
+          </a:bodyPr>
+          <a:lstStyle/>
+          <a:p>
+            <a:pPr marL="0" indent="0">
+              <a:buNone/>
+            </a:pPr>
+            <a:r>
+              <a:rPr lang="en-US" sz="2400" dirty="0"/>
+              <a:t>Strings in </a:t>
+            </a:r>
+            <a:r>
+              <a:rPr lang="en-US" sz="2400" dirty="0">
+                <a:latin typeface="Andale Mono" panose="020B0509000000000004" pitchFamily="49" charset="0"/>
+              </a:rPr>
+              <a:t>switch</a:t>
+            </a:r>
+            <a:r>
+              <a:rPr lang="en-US" sz="2400" dirty="0"/>
+              <a:t> statement</a:t>
+            </a:r>
+          </a:p>
+          <a:p>
+            <a:pPr marL="0" indent="0">
+              <a:buNone/>
+            </a:pPr>
+            <a:endParaRPr lang="en-US" sz="2400" dirty="0"/>
+          </a:p>
+        </p:txBody>
+      </p:sp>
+      <p:pic>
+        <p:nvPicPr>
+          <p:cNvPr id="7" name="Picture 6">
+            <a:extLst>
+              <a:ext uri="{FF2B5EF4-FFF2-40B4-BE49-F238E27FC236}">
+                <a16:creationId xmlns:a16="http://schemas.microsoft.com/office/drawing/2014/main" id="{BD053E5B-BA21-8748-9864-F5F35E30ADDA}"/>
+              </a:ext>
+            </a:extLst>
+          </p:cNvPr>
+          <p:cNvPicPr>
+            <a:picLocks noChangeAspect="1"/>
+          </p:cNvPicPr>
+          <p:nvPr/>
+        </p:nvPicPr>
+        <p:blipFill>
+          <a:blip r:embed="rId2"/>
+          <a:stretch>
+            <a:fillRect/>
+          </a:stretch>
+        </p:blipFill>
+        <p:spPr>
+          <a:xfrm>
+            <a:off x="3914077" y="3163415"/>
+            <a:ext cx="6903149" cy="2627785"/>
+          </a:xfrm>
+          <a:prstGeom prst="rect">
+            <a:avLst/>
+          </a:prstGeom>
+        </p:spPr>
+      </p:pic>
+    </p:spTree>
+    <p:extLst>
+      <p:ext uri="{BB962C8B-B14F-4D97-AF65-F5344CB8AC3E}">
+        <p14:creationId xmlns:p14="http://schemas.microsoft.com/office/powerpoint/2010/main" val="4089854927"/>
+      </p:ext>
+    </p:extLst>
+  </p:cSld>
+  <p:clrMapOvr>
+    <a:masterClrMapping/>
+  </p:clrMapOvr>
+</p:sld>
+</file>
+
+<file path=ppt/slides/slide11.xml><?xml version="1.0" encoding="utf-8"?>
+<p:sld xmlns:a="http://schemas.openxmlformats.org/drawingml/2006/main" xmlns:r="http://schemas.openxmlformats.org/officeDocument/2006/relationships" xmlns:p="http://schemas.openxmlformats.org/presentationml/2006/main">
+  <p:cSld>
+    <p:spTree>
+      <p:nvGrpSpPr>
+        <p:cNvPr id="1" name=""/>
+        <p:cNvGrpSpPr/>
+        <p:nvPr/>
+      </p:nvGrpSpPr>
+      <p:grpSpPr>
+        <a:xfrm>
+          <a:off x="0" y="0"/>
+          <a:ext cx="0" cy="0"/>
+          <a:chOff x="0" y="0"/>
+          <a:chExt cx="0" cy="0"/>
+        </a:xfrm>
+      </p:grpSpPr>
+      <p:sp>
+        <p:nvSpPr>
+          <p:cNvPr id="2" name="Title 1">
+            <a:extLst>
+              <a:ext uri="{FF2B5EF4-FFF2-40B4-BE49-F238E27FC236}">
+                <a16:creationId xmlns:a16="http://schemas.microsoft.com/office/drawing/2014/main" id="{C2052CE5-F69A-D645-8ECD-5C44E4A30D5C}"/>
+              </a:ext>
+            </a:extLst>
+          </p:cNvPr>
+          <p:cNvSpPr>
+            <a:spLocks noGrp="1"/>
+          </p:cNvSpPr>
+          <p:nvPr>
+            <p:ph type="title"/>
+          </p:nvPr>
+        </p:nvSpPr>
+        <p:spPr/>
+        <p:txBody>
+          <a:bodyPr/>
+          <a:lstStyle/>
+          <a:p>
+            <a:r>
+              <a:rPr lang="en-US" dirty="0"/>
+              <a:t>Java 7</a:t>
+            </a:r>
+          </a:p>
+        </p:txBody>
+      </p:sp>
+      <p:sp>
+        <p:nvSpPr>
+          <p:cNvPr id="3" name="Content Placeholder 2">
+            <a:extLst>
+              <a:ext uri="{FF2B5EF4-FFF2-40B4-BE49-F238E27FC236}">
+                <a16:creationId xmlns:a16="http://schemas.microsoft.com/office/drawing/2014/main" id="{20ABE521-BF95-4441-82E2-23994761C137}"/>
+              </a:ext>
+            </a:extLst>
+          </p:cNvPr>
+          <p:cNvSpPr>
+            <a:spLocks noGrp="1"/>
+          </p:cNvSpPr>
+          <p:nvPr>
+            <p:ph sz="half" idx="1"/>
+          </p:nvPr>
+        </p:nvSpPr>
+        <p:spPr>
+          <a:xfrm>
+            <a:off x="685802" y="2142067"/>
+            <a:ext cx="3016403" cy="3649134"/>
+          </a:xfrm>
+        </p:spPr>
+        <p:txBody>
+          <a:bodyPr>
+            <a:normAutofit/>
+          </a:bodyPr>
+          <a:lstStyle/>
+          <a:p>
+            <a:pPr marL="0" indent="0">
+              <a:buNone/>
+            </a:pPr>
+            <a:r>
+              <a:rPr lang="en-US" sz="2800" dirty="0"/>
+              <a:t>Project Coin</a:t>
+            </a:r>
+          </a:p>
+        </p:txBody>
+      </p:sp>
+      <p:sp>
+        <p:nvSpPr>
+          <p:cNvPr id="4" name="Content Placeholder 3">
+            <a:extLst>
+              <a:ext uri="{FF2B5EF4-FFF2-40B4-BE49-F238E27FC236}">
+                <a16:creationId xmlns:a16="http://schemas.microsoft.com/office/drawing/2014/main" id="{26204FAF-26E7-1B46-B974-24DDC791B844}"/>
+              </a:ext>
+            </a:extLst>
+          </p:cNvPr>
+          <p:cNvSpPr>
+            <a:spLocks noGrp="1"/>
+          </p:cNvSpPr>
+          <p:nvPr>
+            <p:ph sz="half" idx="2"/>
+          </p:nvPr>
+        </p:nvSpPr>
+        <p:spPr>
+          <a:xfrm>
+            <a:off x="3914078" y="2142067"/>
+            <a:ext cx="6903149" cy="3649133"/>
+          </a:xfrm>
+        </p:spPr>
+        <p:txBody>
+          <a:bodyPr anchor="t">
+            <a:normAutofit/>
+          </a:bodyPr>
+          <a:lstStyle/>
+          <a:p>
+            <a:pPr marL="0" indent="0">
+              <a:buNone/>
+            </a:pPr>
+            <a:r>
+              <a:rPr lang="en-US" sz="2400" dirty="0"/>
+              <a:t>Automatic resource management (try-with-resources)</a:t>
+            </a:r>
+          </a:p>
+          <a:p>
+            <a:pPr marL="0" indent="0">
+              <a:buNone/>
+            </a:pPr>
+            <a:endParaRPr lang="en-US" sz="2400" dirty="0"/>
+          </a:p>
+          <a:p>
+            <a:pPr marL="0" indent="0">
+              <a:lnSpc>
+                <a:spcPct val="150000"/>
+              </a:lnSpc>
+              <a:buNone/>
+            </a:pPr>
+            <a:r>
+              <a:rPr lang="en-US" sz="2000" dirty="0"/>
+              <a:t>Resource allocation as part of </a:t>
+            </a:r>
+            <a:r>
+              <a:rPr lang="en-US" sz="2000" dirty="0">
+                <a:latin typeface="Andale Mono" panose="020B0509000000000004" pitchFamily="49" charset="0"/>
+              </a:rPr>
+              <a:t>try</a:t>
+            </a:r>
+          </a:p>
+          <a:p>
+            <a:pPr marL="0" indent="0">
+              <a:lnSpc>
+                <a:spcPct val="150000"/>
+              </a:lnSpc>
+              <a:buNone/>
+            </a:pPr>
+            <a:r>
+              <a:rPr lang="en-US" sz="2000" dirty="0"/>
+              <a:t>Automatically closed right before any </a:t>
+            </a:r>
+            <a:r>
+              <a:rPr lang="en-US" sz="2000" dirty="0">
+                <a:latin typeface="Andale Mono" panose="020B0509000000000004" pitchFamily="49" charset="0"/>
+              </a:rPr>
+              <a:t>catch</a:t>
+            </a:r>
+            <a:r>
+              <a:rPr lang="en-US" sz="2000" dirty="0"/>
+              <a:t> or </a:t>
+            </a:r>
+            <a:r>
+              <a:rPr lang="en-US" sz="2000" dirty="0">
+                <a:latin typeface="Andale Mono" panose="020B0509000000000004" pitchFamily="49" charset="0"/>
+              </a:rPr>
+              <a:t>finally</a:t>
+            </a:r>
+          </a:p>
+          <a:p>
+            <a:pPr marL="0" indent="0">
+              <a:lnSpc>
+                <a:spcPct val="150000"/>
+              </a:lnSpc>
+              <a:buNone/>
+            </a:pPr>
+            <a:r>
+              <a:rPr lang="en-US" sz="2000" dirty="0"/>
+              <a:t>Anything that implements </a:t>
+            </a:r>
+            <a:r>
+              <a:rPr lang="en-US" sz="2000" dirty="0" err="1"/>
+              <a:t>java.lang.AutoClosable</a:t>
+            </a:r>
+            <a:endParaRPr lang="en-US" sz="2000" dirty="0"/>
+          </a:p>
+        </p:txBody>
+      </p:sp>
+    </p:spTree>
+    <p:extLst>
+      <p:ext uri="{BB962C8B-B14F-4D97-AF65-F5344CB8AC3E}">
+        <p14:creationId xmlns:p14="http://schemas.microsoft.com/office/powerpoint/2010/main" val="3668138911"/>
+      </p:ext>
+    </p:extLst>
+  </p:cSld>
+  <p:clrMapOvr>
+    <a:masterClrMapping/>
+  </p:clrMapOvr>
+  <p:timing>
+    <p:tnLst>
+      <p:par>
+        <p:cTn id="1" dur="indefinite" restart="never" nodeType="tmRoot">
+          <p:childTnLst>
+            <p:seq concurrent="1" nextAc="seek">
+              <p:cTn id="2" dur="indefinite" nodeType="mainSeq">
+                <p:childTnLst>
+                  <p:par>
+                    <p:cTn id="3" fill="hold">
+                      <p:stCondLst>
+                        <p:cond delay="indefinite"/>
+                        <p:cond evt="onBegin" delay="0">
+                          <p:tn val="2"/>
+                        </p:cond>
+                      </p:stCondLst>
+                      <p:childTnLst>
+                        <p:par>
+                          <p:cTn id="4" fill="hold">
+                            <p:stCondLst>
+                              <p:cond delay="0"/>
+                            </p:stCondLst>
+                            <p:childTnLst>
+                              <p:par>
+                                <p:cTn id="5" presetID="2" presetClass="entr" presetSubtype="4" fill="hold" nodeType="withEffect">
+                                  <p:stCondLst>
+                                    <p:cond delay="0"/>
+                                  </p:stCondLst>
+                                  <p:childTnLst>
+                                    <p:set>
+                                      <p:cBhvr>
+                                        <p:cTn id="6" dur="1" fill="hold">
+                                          <p:stCondLst>
+                                            <p:cond delay="0"/>
+                                          </p:stCondLst>
+                                        </p:cTn>
+                                        <p:tgtEl>
+                                          <p:spTgt spid="4">
+                                            <p:txEl>
+                                              <p:pRg st="0" end="0"/>
+                                            </p:txEl>
+                                          </p:spTgt>
+                                        </p:tgtEl>
+                                        <p:attrNameLst>
+                                          <p:attrName>style.visibility</p:attrName>
+                                        </p:attrNameLst>
+                                      </p:cBhvr>
+                                      <p:to>
+                                        <p:strVal val="visible"/>
+                                      </p:to>
+                                    </p:set>
+                                    <p:anim calcmode="lin" valueType="num">
+                                      <p:cBhvr additive="base">
+                                        <p:cTn id="7" dur="500" fill="hold"/>
+                                        <p:tgtEl>
+                                          <p:spTgt spid="4">
+                                            <p:txEl>
+                                              <p:pRg st="0" end="0"/>
+                                            </p:txEl>
+                                          </p:spTgt>
+                                        </p:tgtEl>
+                                        <p:attrNameLst>
+                                          <p:attrName>ppt_x</p:attrName>
+                                        </p:attrNameLst>
+                                      </p:cBhvr>
+                                      <p:tavLst>
+                                        <p:tav tm="0">
+                                          <p:val>
+                                            <p:strVal val="#ppt_x"/>
+                                          </p:val>
+                                        </p:tav>
+                                        <p:tav tm="100000">
+                                          <p:val>
+                                            <p:strVal val="#ppt_x"/>
+                                          </p:val>
+                                        </p:tav>
+                                      </p:tavLst>
+                                    </p:anim>
+                                    <p:anim calcmode="lin" valueType="num">
+                                      <p:cBhvr additive="base">
+                                        <p:cTn id="8" dur="500" fill="hold"/>
+                                        <p:tgtEl>
+                                          <p:spTgt spid="4">
+                                            <p:txEl>
+                                              <p:pRg st="0" end="0"/>
+                                            </p:txEl>
+                                          </p:spTgt>
+                                        </p:tgtEl>
+                                        <p:attrNameLst>
+                                          <p:attrName>ppt_y</p:attrName>
+                                        </p:attrNameLst>
+                                      </p:cBhvr>
+                                      <p:tavLst>
+                                        <p:tav tm="0">
+                                          <p:val>
+                                            <p:strVal val="1+#ppt_h/2"/>
+                                          </p:val>
+                                        </p:tav>
+                                        <p:tav tm="100000">
+                                          <p:val>
+                                            <p:strVal val="#ppt_y"/>
+                                          </p:val>
+                                        </p:tav>
+                                      </p:tavLst>
+                                    </p:anim>
+                                  </p:childTnLst>
+                                </p:cTn>
+                              </p:par>
+                            </p:childTnLst>
+                          </p:cTn>
+                        </p:par>
+                        <p:par>
+                          <p:cTn id="9" fill="hold">
+                            <p:stCondLst>
+                              <p:cond delay="500"/>
+                            </p:stCondLst>
+                            <p:childTnLst>
+                              <p:par>
+                                <p:cTn id="10" presetID="1" presetClass="entr" presetSubtype="0" fill="hold" nodeType="afterEffect">
+                                  <p:stCondLst>
+                                    <p:cond delay="0"/>
+                                  </p:stCondLst>
+                                  <p:childTnLst>
+                                    <p:set>
+                                      <p:cBhvr>
+                                        <p:cTn id="11" dur="1" fill="hold">
+                                          <p:stCondLst>
+                                            <p:cond delay="0"/>
+                                          </p:stCondLst>
+                                        </p:cTn>
+                                        <p:tgtEl>
+                                          <p:spTgt spid="4">
+                                            <p:txEl>
+                                              <p:pRg st="2" end="2"/>
+                                            </p:txEl>
+                                          </p:spTgt>
+                                        </p:tgtEl>
+                                        <p:attrNameLst>
+                                          <p:attrName>style.visibility</p:attrName>
+                                        </p:attrNameLst>
+                                      </p:cBhvr>
+                                      <p:to>
+                                        <p:strVal val="visible"/>
+                                      </p:to>
+                                    </p:set>
+                                  </p:childTnLst>
+                                </p:cTn>
+                              </p:par>
+                              <p:par>
+                                <p:cTn id="12" presetID="1" presetClass="entr" presetSubtype="0" fill="hold" nodeType="withEffect">
+                                  <p:stCondLst>
+                                    <p:cond delay="0"/>
+                                  </p:stCondLst>
+                                  <p:childTnLst>
+                                    <p:set>
+                                      <p:cBhvr>
+                                        <p:cTn id="13" dur="1" fill="hold">
+                                          <p:stCondLst>
+                                            <p:cond delay="0"/>
+                                          </p:stCondLst>
+                                        </p:cTn>
+                                        <p:tgtEl>
+                                          <p:spTgt spid="4">
+                                            <p:txEl>
+                                              <p:pRg st="3" end="3"/>
+                                            </p:txEl>
+                                          </p:spTgt>
+                                        </p:tgtEl>
+                                        <p:attrNameLst>
+                                          <p:attrName>style.visibility</p:attrName>
+                                        </p:attrNameLst>
+                                      </p:cBhvr>
+                                      <p:to>
+                                        <p:strVal val="visible"/>
+                                      </p:to>
+                                    </p:set>
+                                  </p:childTnLst>
+                                </p:cTn>
+                              </p:par>
+                              <p:par>
+                                <p:cTn id="14" presetID="1" presetClass="entr" presetSubtype="0" fill="hold" nodeType="withEffect">
+                                  <p:stCondLst>
+                                    <p:cond delay="0"/>
+                                  </p:stCondLst>
+                                  <p:childTnLst>
+                                    <p:set>
+                                      <p:cBhvr>
+                                        <p:cTn id="15" dur="1" fill="hold">
+                                          <p:stCondLst>
+                                            <p:cond delay="0"/>
+                                          </p:stCondLst>
+                                        </p:cTn>
+                                        <p:tgtEl>
+                                          <p:spTgt spid="4">
+                                            <p:txEl>
+                                              <p:pRg st="4" end="4"/>
+                                            </p:txEl>
+                                          </p:spTgt>
+                                        </p:tgtEl>
+                                        <p:attrNameLst>
+                                          <p:attrName>style.visibility</p:attrName>
+                                        </p:attrNameLst>
+                                      </p:cBhvr>
+                                      <p:to>
+                                        <p:strVal val="visible"/>
+                                      </p:to>
+                                    </p:set>
+                                  </p:childTnLst>
+                                </p:cTn>
+                              </p:par>
+                            </p:childTnLst>
+                          </p:cTn>
+                        </p:par>
+                      </p:childTnLst>
+                    </p:cTn>
+                  </p:par>
+                </p:childTnLst>
+              </p:cTn>
+              <p:prevCondLst>
+                <p:cond evt="onPrev" delay="0">
+                  <p:tgtEl>
+                    <p:sldTgt/>
+                  </p:tgtEl>
+                </p:cond>
+              </p:prevCondLst>
+              <p:nextCondLst>
+                <p:cond evt="onNext" delay="0">
+                  <p:tgtEl>
+                    <p:sldTgt/>
+                  </p:tgtEl>
+                </p:cond>
+              </p:nextCondLst>
+            </p:seq>
+          </p:childTnLst>
+        </p:cTn>
+      </p:par>
+    </p:tnLst>
+  </p:timing>
+</p:sld>
+</file>
+
+<file path=ppt/slides/slide12.xml><?xml version="1.0" encoding="utf-8"?>
+<p:sld xmlns:a="http://schemas.openxmlformats.org/drawingml/2006/main" xmlns:r="http://schemas.openxmlformats.org/officeDocument/2006/relationships" xmlns:p="http://schemas.openxmlformats.org/presentationml/2006/main">
+  <p:cSld>
+    <p:spTree>
+      <p:nvGrpSpPr>
+        <p:cNvPr id="1" name=""/>
+        <p:cNvGrpSpPr/>
+        <p:nvPr/>
+      </p:nvGrpSpPr>
+      <p:grpSpPr>
+        <a:xfrm>
+          <a:off x="0" y="0"/>
+          <a:ext cx="0" cy="0"/>
+          <a:chOff x="0" y="0"/>
+          <a:chExt cx="0" cy="0"/>
+        </a:xfrm>
+      </p:grpSpPr>
+      <p:sp>
+        <p:nvSpPr>
+          <p:cNvPr id="2" name="Title 1">
+            <a:extLst>
+              <a:ext uri="{FF2B5EF4-FFF2-40B4-BE49-F238E27FC236}">
+                <a16:creationId xmlns:a16="http://schemas.microsoft.com/office/drawing/2014/main" id="{C2052CE5-F69A-D645-8ECD-5C44E4A30D5C}"/>
+              </a:ext>
+            </a:extLst>
+          </p:cNvPr>
+          <p:cNvSpPr>
+            <a:spLocks noGrp="1"/>
+          </p:cNvSpPr>
+          <p:nvPr>
+            <p:ph type="title"/>
+          </p:nvPr>
+        </p:nvSpPr>
+        <p:spPr/>
+        <p:txBody>
+          <a:bodyPr/>
+          <a:lstStyle/>
+          <a:p>
+            <a:r>
+              <a:rPr lang="en-US" dirty="0"/>
+              <a:t>Java 7</a:t>
+            </a:r>
+          </a:p>
+        </p:txBody>
+      </p:sp>
+      <p:sp>
+        <p:nvSpPr>
+          <p:cNvPr id="3" name="Content Placeholder 2">
+            <a:extLst>
+              <a:ext uri="{FF2B5EF4-FFF2-40B4-BE49-F238E27FC236}">
+                <a16:creationId xmlns:a16="http://schemas.microsoft.com/office/drawing/2014/main" id="{20ABE521-BF95-4441-82E2-23994761C137}"/>
+              </a:ext>
+            </a:extLst>
+          </p:cNvPr>
+          <p:cNvSpPr>
+            <a:spLocks noGrp="1"/>
+          </p:cNvSpPr>
+          <p:nvPr>
+            <p:ph sz="half" idx="1"/>
+          </p:nvPr>
+        </p:nvSpPr>
+        <p:spPr>
+          <a:xfrm>
+            <a:off x="685802" y="2142067"/>
+            <a:ext cx="3016403" cy="3649134"/>
+          </a:xfrm>
+        </p:spPr>
+        <p:txBody>
+          <a:bodyPr>
+            <a:normAutofit/>
+          </a:bodyPr>
+          <a:lstStyle/>
+          <a:p>
+            <a:pPr marL="0" indent="0">
+              <a:buNone/>
+            </a:pPr>
+            <a:r>
+              <a:rPr lang="en-US" sz="2800" dirty="0"/>
+              <a:t>Project Coin</a:t>
+            </a:r>
+          </a:p>
+        </p:txBody>
+      </p:sp>
+      <p:sp>
+        <p:nvSpPr>
+          <p:cNvPr id="4" name="Content Placeholder 3">
+            <a:extLst>
+              <a:ext uri="{FF2B5EF4-FFF2-40B4-BE49-F238E27FC236}">
+                <a16:creationId xmlns:a16="http://schemas.microsoft.com/office/drawing/2014/main" id="{26204FAF-26E7-1B46-B974-24DDC791B844}"/>
+              </a:ext>
+            </a:extLst>
+          </p:cNvPr>
+          <p:cNvSpPr>
+            <a:spLocks noGrp="1"/>
+          </p:cNvSpPr>
+          <p:nvPr>
+            <p:ph sz="half" idx="2"/>
+          </p:nvPr>
+        </p:nvSpPr>
+        <p:spPr>
+          <a:xfrm>
+            <a:off x="3914078" y="2142067"/>
+            <a:ext cx="6903149" cy="3649133"/>
+          </a:xfrm>
+        </p:spPr>
+        <p:txBody>
+          <a:bodyPr anchor="t">
+            <a:normAutofit/>
+          </a:bodyPr>
+          <a:lstStyle/>
+          <a:p>
+            <a:pPr marL="0" indent="0">
+              <a:buNone/>
+            </a:pPr>
+            <a:r>
+              <a:rPr lang="en-US" sz="2400" dirty="0"/>
+              <a:t>Automatic resource management (try-with-resources)</a:t>
+            </a:r>
+          </a:p>
+          <a:p>
+            <a:pPr marL="0" indent="0">
+              <a:buNone/>
+            </a:pPr>
+            <a:endParaRPr lang="en-US" sz="2400" dirty="0"/>
+          </a:p>
+        </p:txBody>
+      </p:sp>
+      <p:pic>
+        <p:nvPicPr>
+          <p:cNvPr id="5" name="Picture 4">
+            <a:extLst>
+              <a:ext uri="{FF2B5EF4-FFF2-40B4-BE49-F238E27FC236}">
+                <a16:creationId xmlns:a16="http://schemas.microsoft.com/office/drawing/2014/main" id="{6F9689F9-1734-7749-A3C4-65059DEFABC2}"/>
+              </a:ext>
+            </a:extLst>
+          </p:cNvPr>
+          <p:cNvPicPr>
+            <a:picLocks noChangeAspect="1"/>
+          </p:cNvPicPr>
+          <p:nvPr/>
+        </p:nvPicPr>
+        <p:blipFill>
+          <a:blip r:embed="rId2"/>
+          <a:stretch>
+            <a:fillRect/>
+          </a:stretch>
+        </p:blipFill>
+        <p:spPr>
+          <a:xfrm>
+            <a:off x="3914078" y="2789831"/>
+            <a:ext cx="6903148" cy="3001369"/>
+          </a:xfrm>
+          <a:prstGeom prst="rect">
+            <a:avLst/>
+          </a:prstGeom>
+        </p:spPr>
+      </p:pic>
+    </p:spTree>
+    <p:extLst>
+      <p:ext uri="{BB962C8B-B14F-4D97-AF65-F5344CB8AC3E}">
+        <p14:creationId xmlns:p14="http://schemas.microsoft.com/office/powerpoint/2010/main" val="1507300249"/>
+      </p:ext>
+    </p:extLst>
+  </p:cSld>
+  <p:clrMapOvr>
+    <a:masterClrMapping/>
+  </p:clrMapOvr>
+</p:sld>
+</file>
+
+<file path=ppt/slides/slide13.xml><?xml version="1.0" encoding="utf-8"?>
+<p:sld xmlns:a="http://schemas.openxmlformats.org/drawingml/2006/main" xmlns:r="http://schemas.openxmlformats.org/officeDocument/2006/relationships" xmlns:p="http://schemas.openxmlformats.org/presentationml/2006/main">
+  <p:cSld>
+    <p:spTree>
+      <p:nvGrpSpPr>
+        <p:cNvPr id="1" name=""/>
+        <p:cNvGrpSpPr/>
+        <p:nvPr/>
+      </p:nvGrpSpPr>
+      <p:grpSpPr>
+        <a:xfrm>
+          <a:off x="0" y="0"/>
+          <a:ext cx="0" cy="0"/>
+          <a:chOff x="0" y="0"/>
+          <a:chExt cx="0" cy="0"/>
+        </a:xfrm>
+      </p:grpSpPr>
+      <p:sp>
+        <p:nvSpPr>
+          <p:cNvPr id="2" name="Title 1">
+            <a:extLst>
+              <a:ext uri="{FF2B5EF4-FFF2-40B4-BE49-F238E27FC236}">
+                <a16:creationId xmlns:a16="http://schemas.microsoft.com/office/drawing/2014/main" id="{C2052CE5-F69A-D645-8ECD-5C44E4A30D5C}"/>
+              </a:ext>
+            </a:extLst>
+          </p:cNvPr>
+          <p:cNvSpPr>
+            <a:spLocks noGrp="1"/>
+          </p:cNvSpPr>
+          <p:nvPr>
+            <p:ph type="title"/>
+          </p:nvPr>
+        </p:nvSpPr>
+        <p:spPr/>
+        <p:txBody>
+          <a:bodyPr/>
+          <a:lstStyle/>
+          <a:p>
+            <a:r>
+              <a:rPr lang="en-US" dirty="0"/>
+              <a:t>Java 7</a:t>
+            </a:r>
+          </a:p>
+        </p:txBody>
+      </p:sp>
+      <p:sp>
+        <p:nvSpPr>
+          <p:cNvPr id="3" name="Content Placeholder 2">
+            <a:extLst>
+              <a:ext uri="{FF2B5EF4-FFF2-40B4-BE49-F238E27FC236}">
+                <a16:creationId xmlns:a16="http://schemas.microsoft.com/office/drawing/2014/main" id="{20ABE521-BF95-4441-82E2-23994761C137}"/>
+              </a:ext>
+            </a:extLst>
+          </p:cNvPr>
+          <p:cNvSpPr>
+            <a:spLocks noGrp="1"/>
+          </p:cNvSpPr>
+          <p:nvPr>
+            <p:ph sz="half" idx="1"/>
+          </p:nvPr>
+        </p:nvSpPr>
+        <p:spPr>
+          <a:xfrm>
+            <a:off x="685802" y="2142067"/>
+            <a:ext cx="3016403" cy="3649134"/>
+          </a:xfrm>
+        </p:spPr>
+        <p:txBody>
+          <a:bodyPr>
+            <a:normAutofit/>
+          </a:bodyPr>
+          <a:lstStyle/>
+          <a:p>
+            <a:pPr marL="0" indent="0">
+              <a:buNone/>
+            </a:pPr>
+            <a:r>
+              <a:rPr lang="en-US" sz="2800" dirty="0"/>
+              <a:t>Project Coin</a:t>
+            </a:r>
+          </a:p>
+        </p:txBody>
+      </p:sp>
+      <p:sp>
+        <p:nvSpPr>
+          <p:cNvPr id="4" name="Content Placeholder 3">
+            <a:extLst>
+              <a:ext uri="{FF2B5EF4-FFF2-40B4-BE49-F238E27FC236}">
+                <a16:creationId xmlns:a16="http://schemas.microsoft.com/office/drawing/2014/main" id="{26204FAF-26E7-1B46-B974-24DDC791B844}"/>
+              </a:ext>
+            </a:extLst>
+          </p:cNvPr>
+          <p:cNvSpPr>
+            <a:spLocks noGrp="1"/>
+          </p:cNvSpPr>
+          <p:nvPr>
+            <p:ph sz="half" idx="2"/>
+          </p:nvPr>
+        </p:nvSpPr>
+        <p:spPr>
+          <a:xfrm>
+            <a:off x="3914078" y="2142067"/>
+            <a:ext cx="6903149" cy="3649133"/>
+          </a:xfrm>
+        </p:spPr>
+        <p:txBody>
+          <a:bodyPr anchor="t">
+            <a:normAutofit/>
+          </a:bodyPr>
+          <a:lstStyle/>
+          <a:p>
+            <a:pPr marL="0" indent="0">
+              <a:buNone/>
+            </a:pPr>
+            <a:r>
+              <a:rPr lang="en-US" sz="2400" dirty="0"/>
+              <a:t>Catch multiple exception types (multi-catch)</a:t>
+            </a:r>
+          </a:p>
+          <a:p>
+            <a:pPr marL="0" indent="0">
+              <a:buNone/>
+            </a:pPr>
+            <a:endParaRPr lang="en-US" sz="2400" dirty="0"/>
+          </a:p>
+          <a:p>
+            <a:pPr marL="0" indent="0">
+              <a:lnSpc>
+                <a:spcPct val="150000"/>
+              </a:lnSpc>
+              <a:buNone/>
+            </a:pPr>
+            <a:r>
+              <a:rPr lang="en-US" sz="2000" dirty="0"/>
+              <a:t>Catch exceptions of multiple types in the same block</a:t>
+            </a:r>
+            <a:endParaRPr lang="en-US" sz="2000" dirty="0">
+              <a:latin typeface="Andale Mono" panose="020B0509000000000004" pitchFamily="49" charset="0"/>
+            </a:endParaRPr>
+          </a:p>
+          <a:p>
+            <a:pPr marL="0" indent="0">
+              <a:lnSpc>
+                <a:spcPct val="150000"/>
+              </a:lnSpc>
+              <a:buNone/>
+            </a:pPr>
+            <a:r>
+              <a:rPr lang="en-US" sz="2000" dirty="0"/>
+              <a:t>Exception types do not have to be “compatible”</a:t>
+            </a:r>
+          </a:p>
+          <a:p>
+            <a:pPr marL="0" indent="0">
+              <a:lnSpc>
+                <a:spcPct val="150000"/>
+              </a:lnSpc>
+              <a:buNone/>
+            </a:pPr>
+            <a:r>
+              <a:rPr lang="en-US" sz="2000" dirty="0"/>
+              <a:t>Other rules for catching exceptions still apply (e.g. catch specific before generic)</a:t>
+            </a:r>
+            <a:endParaRPr lang="en-US" sz="2000" dirty="0">
+              <a:latin typeface="Andale Mono" panose="020B0509000000000004" pitchFamily="49" charset="0"/>
+            </a:endParaRPr>
+          </a:p>
+        </p:txBody>
+      </p:sp>
+    </p:spTree>
+    <p:extLst>
+      <p:ext uri="{BB962C8B-B14F-4D97-AF65-F5344CB8AC3E}">
+        <p14:creationId xmlns:p14="http://schemas.microsoft.com/office/powerpoint/2010/main" val="3584281534"/>
+      </p:ext>
+    </p:extLst>
+  </p:cSld>
+  <p:clrMapOvr>
+    <a:masterClrMapping/>
+  </p:clrMapOvr>
+  <p:timing>
+    <p:tnLst>
+      <p:par>
+        <p:cTn id="1" dur="indefinite" restart="never" nodeType="tmRoot">
+          <p:childTnLst>
+            <p:seq concurrent="1" nextAc="seek">
+              <p:cTn id="2" dur="indefinite" nodeType="mainSeq">
+                <p:childTnLst>
+                  <p:par>
+                    <p:cTn id="3" fill="hold">
+                      <p:stCondLst>
+                        <p:cond delay="indefinite"/>
+                        <p:cond evt="onBegin" delay="0">
+                          <p:tn val="2"/>
+                        </p:cond>
+                      </p:stCondLst>
+                      <p:childTnLst>
+                        <p:par>
+                          <p:cTn id="4" fill="hold">
+                            <p:stCondLst>
+                              <p:cond delay="0"/>
+                            </p:stCondLst>
+                            <p:childTnLst>
+                              <p:par>
+                                <p:cTn id="5" presetID="2" presetClass="entr" presetSubtype="4" fill="hold" nodeType="withEffect">
+                                  <p:stCondLst>
+                                    <p:cond delay="0"/>
+                                  </p:stCondLst>
+                                  <p:childTnLst>
+                                    <p:set>
+                                      <p:cBhvr>
+                                        <p:cTn id="6" dur="1" fill="hold">
+                                          <p:stCondLst>
+                                            <p:cond delay="0"/>
+                                          </p:stCondLst>
+                                        </p:cTn>
+                                        <p:tgtEl>
+                                          <p:spTgt spid="4">
+                                            <p:txEl>
+                                              <p:pRg st="0" end="0"/>
+                                            </p:txEl>
+                                          </p:spTgt>
+                                        </p:tgtEl>
+                                        <p:attrNameLst>
+                                          <p:attrName>style.visibility</p:attrName>
+                                        </p:attrNameLst>
+                                      </p:cBhvr>
+                                      <p:to>
+                                        <p:strVal val="visible"/>
+                                      </p:to>
+                                    </p:set>
+                                    <p:anim calcmode="lin" valueType="num">
+                                      <p:cBhvr additive="base">
+                                        <p:cTn id="7" dur="500" fill="hold"/>
+                                        <p:tgtEl>
+                                          <p:spTgt spid="4">
+                                            <p:txEl>
+                                              <p:pRg st="0" end="0"/>
+                                            </p:txEl>
+                                          </p:spTgt>
+                                        </p:tgtEl>
+                                        <p:attrNameLst>
+                                          <p:attrName>ppt_x</p:attrName>
+                                        </p:attrNameLst>
+                                      </p:cBhvr>
+                                      <p:tavLst>
+                                        <p:tav tm="0">
+                                          <p:val>
+                                            <p:strVal val="#ppt_x"/>
+                                          </p:val>
+                                        </p:tav>
+                                        <p:tav tm="100000">
+                                          <p:val>
+                                            <p:strVal val="#ppt_x"/>
+                                          </p:val>
+                                        </p:tav>
+                                      </p:tavLst>
+                                    </p:anim>
+                                    <p:anim calcmode="lin" valueType="num">
+                                      <p:cBhvr additive="base">
+                                        <p:cTn id="8" dur="500" fill="hold"/>
+                                        <p:tgtEl>
+                                          <p:spTgt spid="4">
+                                            <p:txEl>
+                                              <p:pRg st="0" end="0"/>
+                                            </p:txEl>
+                                          </p:spTgt>
+                                        </p:tgtEl>
+                                        <p:attrNameLst>
+                                          <p:attrName>ppt_y</p:attrName>
+                                        </p:attrNameLst>
+                                      </p:cBhvr>
+                                      <p:tavLst>
+                                        <p:tav tm="0">
+                                          <p:val>
+                                            <p:strVal val="1+#ppt_h/2"/>
+                                          </p:val>
+                                        </p:tav>
+                                        <p:tav tm="100000">
+                                          <p:val>
+                                            <p:strVal val="#ppt_y"/>
+                                          </p:val>
+                                        </p:tav>
+                                      </p:tavLst>
+                                    </p:anim>
+                                  </p:childTnLst>
+                                </p:cTn>
+                              </p:par>
+                            </p:childTnLst>
+                          </p:cTn>
+                        </p:par>
+                        <p:par>
+                          <p:cTn id="9" fill="hold">
+                            <p:stCondLst>
+                              <p:cond delay="500"/>
+                            </p:stCondLst>
+                            <p:childTnLst>
+                              <p:par>
+                                <p:cTn id="10" presetID="1" presetClass="entr" presetSubtype="0" fill="hold" nodeType="afterEffect">
+                                  <p:stCondLst>
+                                    <p:cond delay="0"/>
+                                  </p:stCondLst>
+                                  <p:childTnLst>
+                                    <p:set>
+                                      <p:cBhvr>
+                                        <p:cTn id="11" dur="1" fill="hold">
+                                          <p:stCondLst>
+                                            <p:cond delay="0"/>
+                                          </p:stCondLst>
+                                        </p:cTn>
+                                        <p:tgtEl>
+                                          <p:spTgt spid="4">
+                                            <p:txEl>
+                                              <p:pRg st="2" end="2"/>
+                                            </p:txEl>
+                                          </p:spTgt>
+                                        </p:tgtEl>
+                                        <p:attrNameLst>
+                                          <p:attrName>style.visibility</p:attrName>
+                                        </p:attrNameLst>
+                                      </p:cBhvr>
+                                      <p:to>
+                                        <p:strVal val="visible"/>
+                                      </p:to>
+                                    </p:set>
+                                  </p:childTnLst>
+                                </p:cTn>
+                              </p:par>
+                              <p:par>
+                                <p:cTn id="12" presetID="1" presetClass="entr" presetSubtype="0" fill="hold" nodeType="withEffect">
+                                  <p:stCondLst>
+                                    <p:cond delay="0"/>
+                                  </p:stCondLst>
+                                  <p:childTnLst>
+                                    <p:set>
+                                      <p:cBhvr>
+                                        <p:cTn id="13" dur="1" fill="hold">
+                                          <p:stCondLst>
+                                            <p:cond delay="0"/>
+                                          </p:stCondLst>
+                                        </p:cTn>
+                                        <p:tgtEl>
+                                          <p:spTgt spid="4">
+                                            <p:txEl>
+                                              <p:pRg st="3" end="3"/>
+                                            </p:txEl>
+                                          </p:spTgt>
+                                        </p:tgtEl>
+                                        <p:attrNameLst>
+                                          <p:attrName>style.visibility</p:attrName>
+                                        </p:attrNameLst>
+                                      </p:cBhvr>
+                                      <p:to>
+                                        <p:strVal val="visible"/>
+                                      </p:to>
+                                    </p:set>
+                                  </p:childTnLst>
+                                </p:cTn>
+                              </p:par>
+                              <p:par>
+                                <p:cTn id="14" presetID="1" presetClass="entr" presetSubtype="0" fill="hold" nodeType="withEffect">
+                                  <p:stCondLst>
+                                    <p:cond delay="0"/>
+                                  </p:stCondLst>
+                                  <p:childTnLst>
+                                    <p:set>
+                                      <p:cBhvr>
+                                        <p:cTn id="15" dur="1" fill="hold">
+                                          <p:stCondLst>
+                                            <p:cond delay="0"/>
+                                          </p:stCondLst>
+                                        </p:cTn>
+                                        <p:tgtEl>
+                                          <p:spTgt spid="4">
+                                            <p:txEl>
+                                              <p:pRg st="4" end="4"/>
+                                            </p:txEl>
+                                          </p:spTgt>
+                                        </p:tgtEl>
+                                        <p:attrNameLst>
+                                          <p:attrName>style.visibility</p:attrName>
+                                        </p:attrNameLst>
+                                      </p:cBhvr>
+                                      <p:to>
+                                        <p:strVal val="visible"/>
+                                      </p:to>
+                                    </p:set>
+                                  </p:childTnLst>
+                                </p:cTn>
+                              </p:par>
+                            </p:childTnLst>
+                          </p:cTn>
+                        </p:par>
+                      </p:childTnLst>
+                    </p:cTn>
+                  </p:par>
+                </p:childTnLst>
+              </p:cTn>
+              <p:prevCondLst>
+                <p:cond evt="onPrev" delay="0">
+                  <p:tgtEl>
+                    <p:sldTgt/>
+                  </p:tgtEl>
+                </p:cond>
+              </p:prevCondLst>
+              <p:nextCondLst>
+                <p:cond evt="onNext" delay="0">
+                  <p:tgtEl>
+                    <p:sldTgt/>
+                  </p:tgtEl>
+                </p:cond>
+              </p:nextCondLst>
+            </p:seq>
+          </p:childTnLst>
+        </p:cTn>
+      </p:par>
+    </p:tnLst>
+  </p:timing>
+</p:sld>
+</file>
+
+<file path=ppt/slides/slide14.xml><?xml version="1.0" encoding="utf-8"?>
+<p:sld xmlns:a="http://schemas.openxmlformats.org/drawingml/2006/main" xmlns:r="http://schemas.openxmlformats.org/officeDocument/2006/relationships" xmlns:p="http://schemas.openxmlformats.org/presentationml/2006/main">
+  <p:cSld>
+    <p:spTree>
+      <p:nvGrpSpPr>
+        <p:cNvPr id="1" name=""/>
+        <p:cNvGrpSpPr/>
+        <p:nvPr/>
+      </p:nvGrpSpPr>
+      <p:grpSpPr>
+        <a:xfrm>
+          <a:off x="0" y="0"/>
+          <a:ext cx="0" cy="0"/>
+          <a:chOff x="0" y="0"/>
+          <a:chExt cx="0" cy="0"/>
+        </a:xfrm>
+      </p:grpSpPr>
+      <p:sp>
+        <p:nvSpPr>
+          <p:cNvPr id="2" name="Title 1">
+            <a:extLst>
+              <a:ext uri="{FF2B5EF4-FFF2-40B4-BE49-F238E27FC236}">
+                <a16:creationId xmlns:a16="http://schemas.microsoft.com/office/drawing/2014/main" id="{C2052CE5-F69A-D645-8ECD-5C44E4A30D5C}"/>
+              </a:ext>
+            </a:extLst>
+          </p:cNvPr>
+          <p:cNvSpPr>
+            <a:spLocks noGrp="1"/>
+          </p:cNvSpPr>
+          <p:nvPr>
+            <p:ph type="title"/>
+          </p:nvPr>
+        </p:nvSpPr>
+        <p:spPr/>
+        <p:txBody>
+          <a:bodyPr/>
+          <a:lstStyle/>
+          <a:p>
+            <a:r>
+              <a:rPr lang="en-US" dirty="0"/>
+              <a:t>Java 7</a:t>
+            </a:r>
+          </a:p>
+        </p:txBody>
+      </p:sp>
+      <p:sp>
+        <p:nvSpPr>
+          <p:cNvPr id="3" name="Content Placeholder 2">
+            <a:extLst>
+              <a:ext uri="{FF2B5EF4-FFF2-40B4-BE49-F238E27FC236}">
+                <a16:creationId xmlns:a16="http://schemas.microsoft.com/office/drawing/2014/main" id="{20ABE521-BF95-4441-82E2-23994761C137}"/>
+              </a:ext>
+            </a:extLst>
+          </p:cNvPr>
+          <p:cNvSpPr>
+            <a:spLocks noGrp="1"/>
+          </p:cNvSpPr>
+          <p:nvPr>
+            <p:ph sz="half" idx="1"/>
+          </p:nvPr>
+        </p:nvSpPr>
+        <p:spPr>
+          <a:xfrm>
+            <a:off x="685802" y="2142067"/>
+            <a:ext cx="3016403" cy="3649134"/>
+          </a:xfrm>
+        </p:spPr>
+        <p:txBody>
+          <a:bodyPr>
+            <a:normAutofit/>
+          </a:bodyPr>
+          <a:lstStyle/>
+          <a:p>
+            <a:pPr marL="0" indent="0">
+              <a:buNone/>
+            </a:pPr>
+            <a:r>
+              <a:rPr lang="en-US" sz="2800" dirty="0"/>
+              <a:t>Project Coin</a:t>
+            </a:r>
+          </a:p>
+        </p:txBody>
+      </p:sp>
+      <p:sp>
+        <p:nvSpPr>
+          <p:cNvPr id="4" name="Content Placeholder 3">
+            <a:extLst>
+              <a:ext uri="{FF2B5EF4-FFF2-40B4-BE49-F238E27FC236}">
+                <a16:creationId xmlns:a16="http://schemas.microsoft.com/office/drawing/2014/main" id="{26204FAF-26E7-1B46-B974-24DDC791B844}"/>
+              </a:ext>
+            </a:extLst>
+          </p:cNvPr>
+          <p:cNvSpPr>
+            <a:spLocks noGrp="1"/>
+          </p:cNvSpPr>
+          <p:nvPr>
+            <p:ph sz="half" idx="2"/>
+          </p:nvPr>
+        </p:nvSpPr>
+        <p:spPr>
+          <a:xfrm>
+            <a:off x="3914078" y="2142067"/>
+            <a:ext cx="6903149" cy="3649133"/>
+          </a:xfrm>
+        </p:spPr>
+        <p:txBody>
+          <a:bodyPr anchor="t">
+            <a:normAutofit/>
+          </a:bodyPr>
+          <a:lstStyle/>
+          <a:p>
+            <a:pPr marL="0" indent="0">
+              <a:buNone/>
+            </a:pPr>
+            <a:r>
+              <a:rPr lang="en-US" sz="2400" dirty="0"/>
+              <a:t>Catch multiple exception types (multi-catch)</a:t>
+            </a:r>
+          </a:p>
+          <a:p>
+            <a:pPr marL="0" indent="0">
+              <a:buNone/>
+            </a:pPr>
+            <a:endParaRPr lang="en-US" sz="2400" dirty="0"/>
+          </a:p>
+        </p:txBody>
+      </p:sp>
+      <p:pic>
+        <p:nvPicPr>
+          <p:cNvPr id="6" name="Picture 5">
+            <a:extLst>
+              <a:ext uri="{FF2B5EF4-FFF2-40B4-BE49-F238E27FC236}">
+                <a16:creationId xmlns:a16="http://schemas.microsoft.com/office/drawing/2014/main" id="{AFBB3F38-B790-3543-9909-A9E3615D24D9}"/>
+              </a:ext>
+            </a:extLst>
+          </p:cNvPr>
+          <p:cNvPicPr>
+            <a:picLocks noChangeAspect="1"/>
+          </p:cNvPicPr>
+          <p:nvPr/>
+        </p:nvPicPr>
+        <p:blipFill>
+          <a:blip r:embed="rId2"/>
+          <a:stretch>
+            <a:fillRect/>
+          </a:stretch>
+        </p:blipFill>
+        <p:spPr>
+          <a:xfrm>
+            <a:off x="3914078" y="3429000"/>
+            <a:ext cx="6903148" cy="1006127"/>
+          </a:xfrm>
+          <a:prstGeom prst="rect">
+            <a:avLst/>
+          </a:prstGeom>
+        </p:spPr>
+      </p:pic>
+    </p:spTree>
+    <p:extLst>
+      <p:ext uri="{BB962C8B-B14F-4D97-AF65-F5344CB8AC3E}">
+        <p14:creationId xmlns:p14="http://schemas.microsoft.com/office/powerpoint/2010/main" val="3389473924"/>
+      </p:ext>
+    </p:extLst>
+  </p:cSld>
+  <p:clrMapOvr>
+    <a:masterClrMapping/>
+  </p:clrMapOvr>
+</p:sld>
+</file>
+
+<file path=ppt/slides/slide15.xml><?xml version="1.0" encoding="utf-8"?>
+<p:sld xmlns:a="http://schemas.openxmlformats.org/drawingml/2006/main" xmlns:r="http://schemas.openxmlformats.org/officeDocument/2006/relationships" xmlns:p="http://schemas.openxmlformats.org/presentationml/2006/main">
+  <p:cSld>
+    <p:spTree>
+      <p:nvGrpSpPr>
+        <p:cNvPr id="1" name=""/>
+        <p:cNvGrpSpPr/>
+        <p:nvPr/>
+      </p:nvGrpSpPr>
+      <p:grpSpPr>
+        <a:xfrm>
+          <a:off x="0" y="0"/>
+          <a:ext cx="0" cy="0"/>
+          <a:chOff x="0" y="0"/>
+          <a:chExt cx="0" cy="0"/>
+        </a:xfrm>
+      </p:grpSpPr>
+      <p:sp>
+        <p:nvSpPr>
+          <p:cNvPr id="2" name="Title 1">
+            <a:extLst>
+              <a:ext uri="{FF2B5EF4-FFF2-40B4-BE49-F238E27FC236}">
+                <a16:creationId xmlns:a16="http://schemas.microsoft.com/office/drawing/2014/main" id="{C2052CE5-F69A-D645-8ECD-5C44E4A30D5C}"/>
+              </a:ext>
+            </a:extLst>
+          </p:cNvPr>
+          <p:cNvSpPr>
+            <a:spLocks noGrp="1"/>
+          </p:cNvSpPr>
+          <p:nvPr>
+            <p:ph type="title"/>
+          </p:nvPr>
+        </p:nvSpPr>
+        <p:spPr/>
+        <p:txBody>
+          <a:bodyPr/>
+          <a:lstStyle/>
+          <a:p>
+            <a:r>
+              <a:rPr lang="en-US" dirty="0"/>
+              <a:t>Java 7</a:t>
+            </a:r>
+          </a:p>
+        </p:txBody>
+      </p:sp>
+      <p:sp>
+        <p:nvSpPr>
+          <p:cNvPr id="3" name="Content Placeholder 2">
+            <a:extLst>
+              <a:ext uri="{FF2B5EF4-FFF2-40B4-BE49-F238E27FC236}">
+                <a16:creationId xmlns:a16="http://schemas.microsoft.com/office/drawing/2014/main" id="{20ABE521-BF95-4441-82E2-23994761C137}"/>
+              </a:ext>
+            </a:extLst>
+          </p:cNvPr>
+          <p:cNvSpPr>
+            <a:spLocks noGrp="1"/>
+          </p:cNvSpPr>
+          <p:nvPr>
+            <p:ph sz="half" idx="1"/>
+          </p:nvPr>
+        </p:nvSpPr>
+        <p:spPr>
+          <a:xfrm>
+            <a:off x="685802" y="2142067"/>
+            <a:ext cx="3016403" cy="3649134"/>
+          </a:xfrm>
+        </p:spPr>
+        <p:txBody>
+          <a:bodyPr>
+            <a:normAutofit/>
+          </a:bodyPr>
+          <a:lstStyle/>
+          <a:p>
+            <a:pPr marL="0" indent="0">
+              <a:buNone/>
+            </a:pPr>
+            <a:r>
+              <a:rPr lang="en-US" sz="2800" dirty="0"/>
+              <a:t>Project Coin</a:t>
+            </a:r>
+          </a:p>
+        </p:txBody>
+      </p:sp>
+      <p:sp>
+        <p:nvSpPr>
+          <p:cNvPr id="4" name="Content Placeholder 3">
+            <a:extLst>
+              <a:ext uri="{FF2B5EF4-FFF2-40B4-BE49-F238E27FC236}">
+                <a16:creationId xmlns:a16="http://schemas.microsoft.com/office/drawing/2014/main" id="{26204FAF-26E7-1B46-B974-24DDC791B844}"/>
+              </a:ext>
+            </a:extLst>
+          </p:cNvPr>
+          <p:cNvSpPr>
+            <a:spLocks noGrp="1"/>
+          </p:cNvSpPr>
+          <p:nvPr>
+            <p:ph sz="half" idx="2"/>
+          </p:nvPr>
+        </p:nvSpPr>
+        <p:spPr>
+          <a:xfrm>
+            <a:off x="3914078" y="2142067"/>
+            <a:ext cx="6903149" cy="3649133"/>
+          </a:xfrm>
+        </p:spPr>
+        <p:txBody>
+          <a:bodyPr anchor="t">
+            <a:normAutofit/>
+          </a:bodyPr>
+          <a:lstStyle/>
+          <a:p>
+            <a:pPr marL="0" indent="0">
+              <a:buNone/>
+            </a:pPr>
+            <a:r>
+              <a:rPr lang="en-US" sz="2400" dirty="0"/>
+              <a:t>Generic type inference (diamond operator)</a:t>
+            </a:r>
+          </a:p>
+          <a:p>
+            <a:pPr marL="0" indent="0">
+              <a:buNone/>
+            </a:pPr>
+            <a:endParaRPr lang="en-US" sz="2400" dirty="0"/>
+          </a:p>
+          <a:p>
+            <a:pPr marL="0" indent="0">
+              <a:lnSpc>
+                <a:spcPct val="150000"/>
+              </a:lnSpc>
+              <a:buNone/>
+            </a:pPr>
+            <a:r>
+              <a:rPr lang="en-US" sz="2000" dirty="0"/>
+              <a:t>Type of generics on RHS inferred from types on LHS</a:t>
+            </a:r>
+            <a:endParaRPr lang="en-US" sz="2000" dirty="0">
+              <a:latin typeface="Andale Mono" panose="020B0509000000000004" pitchFamily="49" charset="0"/>
+            </a:endParaRPr>
+          </a:p>
+          <a:p>
+            <a:pPr marL="0" indent="0">
+              <a:lnSpc>
+                <a:spcPct val="150000"/>
+              </a:lnSpc>
+              <a:buNone/>
+            </a:pPr>
+            <a:r>
+              <a:rPr lang="en-US" sz="2000" dirty="0"/>
+              <a:t>Automatically closed right before any </a:t>
+            </a:r>
+            <a:r>
+              <a:rPr lang="en-US" sz="2000" dirty="0">
+                <a:latin typeface="Andale Mono" panose="020B0509000000000004" pitchFamily="49" charset="0"/>
+              </a:rPr>
+              <a:t>catch</a:t>
+            </a:r>
+            <a:r>
+              <a:rPr lang="en-US" sz="2000" dirty="0"/>
+              <a:t> or </a:t>
+            </a:r>
+            <a:r>
+              <a:rPr lang="en-US" sz="2000" dirty="0">
+                <a:latin typeface="Andale Mono" panose="020B0509000000000004" pitchFamily="49" charset="0"/>
+              </a:rPr>
+              <a:t>finally</a:t>
+            </a:r>
+          </a:p>
+          <a:p>
+            <a:pPr marL="0" indent="0">
+              <a:lnSpc>
+                <a:spcPct val="150000"/>
+              </a:lnSpc>
+              <a:buNone/>
+            </a:pPr>
+            <a:r>
+              <a:rPr lang="en-US" sz="2000" dirty="0"/>
+              <a:t>Anything that implements </a:t>
+            </a:r>
+            <a:r>
+              <a:rPr lang="en-US" sz="2000" dirty="0" err="1"/>
+              <a:t>java.lang.AutoClosable</a:t>
+            </a:r>
+            <a:endParaRPr lang="en-US" sz="2000" dirty="0"/>
+          </a:p>
+        </p:txBody>
+      </p:sp>
+    </p:spTree>
+    <p:extLst>
+      <p:ext uri="{BB962C8B-B14F-4D97-AF65-F5344CB8AC3E}">
+        <p14:creationId xmlns:p14="http://schemas.microsoft.com/office/powerpoint/2010/main" val="236799443"/>
+      </p:ext>
+    </p:extLst>
+  </p:cSld>
+  <p:clrMapOvr>
+    <a:masterClrMapping/>
+  </p:clrMapOvr>
+  <p:timing>
+    <p:tnLst>
+      <p:par>
+        <p:cTn id="1" dur="indefinite" restart="never" nodeType="tmRoot">
+          <p:childTnLst>
+            <p:seq concurrent="1" nextAc="seek">
+              <p:cTn id="2" dur="indefinite" nodeType="mainSeq">
+                <p:childTnLst>
+                  <p:par>
+                    <p:cTn id="3" fill="hold">
+                      <p:stCondLst>
+                        <p:cond delay="indefinite"/>
+                        <p:cond evt="onBegin" delay="0">
+                          <p:tn val="2"/>
+                        </p:cond>
+                      </p:stCondLst>
+                      <p:childTnLst>
+                        <p:par>
+                          <p:cTn id="4" fill="hold">
+                            <p:stCondLst>
+                              <p:cond delay="0"/>
+                            </p:stCondLst>
+                            <p:childTnLst>
+                              <p:par>
+                                <p:cTn id="5" presetID="2" presetClass="entr" presetSubtype="4" fill="hold" nodeType="withEffect">
+                                  <p:stCondLst>
+                                    <p:cond delay="0"/>
+                                  </p:stCondLst>
+                                  <p:childTnLst>
+                                    <p:set>
+                                      <p:cBhvr>
+                                        <p:cTn id="6" dur="1" fill="hold">
+                                          <p:stCondLst>
+                                            <p:cond delay="0"/>
+                                          </p:stCondLst>
+                                        </p:cTn>
+                                        <p:tgtEl>
+                                          <p:spTgt spid="4">
+                                            <p:txEl>
+                                              <p:pRg st="0" end="0"/>
+                                            </p:txEl>
+                                          </p:spTgt>
+                                        </p:tgtEl>
+                                        <p:attrNameLst>
+                                          <p:attrName>style.visibility</p:attrName>
+                                        </p:attrNameLst>
+                                      </p:cBhvr>
+                                      <p:to>
+                                        <p:strVal val="visible"/>
+                                      </p:to>
+                                    </p:set>
+                                    <p:anim calcmode="lin" valueType="num">
+                                      <p:cBhvr additive="base">
+                                        <p:cTn id="7" dur="500" fill="hold"/>
+                                        <p:tgtEl>
+                                          <p:spTgt spid="4">
+                                            <p:txEl>
+                                              <p:pRg st="0" end="0"/>
+                                            </p:txEl>
+                                          </p:spTgt>
+                                        </p:tgtEl>
+                                        <p:attrNameLst>
+                                          <p:attrName>ppt_x</p:attrName>
+                                        </p:attrNameLst>
+                                      </p:cBhvr>
+                                      <p:tavLst>
+                                        <p:tav tm="0">
+                                          <p:val>
+                                            <p:strVal val="#ppt_x"/>
+                                          </p:val>
+                                        </p:tav>
+                                        <p:tav tm="100000">
+                                          <p:val>
+                                            <p:strVal val="#ppt_x"/>
+                                          </p:val>
+                                        </p:tav>
+                                      </p:tavLst>
+                                    </p:anim>
+                                    <p:anim calcmode="lin" valueType="num">
+                                      <p:cBhvr additive="base">
+                                        <p:cTn id="8" dur="500" fill="hold"/>
+                                        <p:tgtEl>
+                                          <p:spTgt spid="4">
+                                            <p:txEl>
+                                              <p:pRg st="0" end="0"/>
+                                            </p:txEl>
+                                          </p:spTgt>
+                                        </p:tgtEl>
+                                        <p:attrNameLst>
+                                          <p:attrName>ppt_y</p:attrName>
+                                        </p:attrNameLst>
+                                      </p:cBhvr>
+                                      <p:tavLst>
+                                        <p:tav tm="0">
+                                          <p:val>
+                                            <p:strVal val="1+#ppt_h/2"/>
+                                          </p:val>
+                                        </p:tav>
+                                        <p:tav tm="100000">
+                                          <p:val>
+                                            <p:strVal val="#ppt_y"/>
+                                          </p:val>
+                                        </p:tav>
+                                      </p:tavLst>
+                                    </p:anim>
+                                  </p:childTnLst>
+                                </p:cTn>
+                              </p:par>
+                            </p:childTnLst>
+                          </p:cTn>
+                        </p:par>
+                        <p:par>
+                          <p:cTn id="9" fill="hold">
+                            <p:stCondLst>
+                              <p:cond delay="500"/>
+                            </p:stCondLst>
+                            <p:childTnLst>
+                              <p:par>
+                                <p:cTn id="10" presetID="1" presetClass="entr" presetSubtype="0" fill="hold" nodeType="afterEffect">
+                                  <p:stCondLst>
+                                    <p:cond delay="0"/>
+                                  </p:stCondLst>
+                                  <p:childTnLst>
+                                    <p:set>
+                                      <p:cBhvr>
+                                        <p:cTn id="11" dur="1" fill="hold">
+                                          <p:stCondLst>
+                                            <p:cond delay="0"/>
+                                          </p:stCondLst>
+                                        </p:cTn>
+                                        <p:tgtEl>
+                                          <p:spTgt spid="4">
+                                            <p:txEl>
+                                              <p:pRg st="2" end="2"/>
+                                            </p:txEl>
+                                          </p:spTgt>
+                                        </p:tgtEl>
+                                        <p:attrNameLst>
+                                          <p:attrName>style.visibility</p:attrName>
+                                        </p:attrNameLst>
+                                      </p:cBhvr>
+                                      <p:to>
+                                        <p:strVal val="visible"/>
+                                      </p:to>
+                                    </p:set>
+                                  </p:childTnLst>
+                                </p:cTn>
+                              </p:par>
+                              <p:par>
+                                <p:cTn id="12" presetID="1" presetClass="entr" presetSubtype="0" fill="hold" nodeType="withEffect">
+                                  <p:stCondLst>
+                                    <p:cond delay="0"/>
+                                  </p:stCondLst>
+                                  <p:childTnLst>
+                                    <p:set>
+                                      <p:cBhvr>
+                                        <p:cTn id="13" dur="1" fill="hold">
+                                          <p:stCondLst>
+                                            <p:cond delay="0"/>
+                                          </p:stCondLst>
+                                        </p:cTn>
+                                        <p:tgtEl>
+                                          <p:spTgt spid="4">
+                                            <p:txEl>
+                                              <p:pRg st="3" end="3"/>
+                                            </p:txEl>
+                                          </p:spTgt>
+                                        </p:tgtEl>
+                                        <p:attrNameLst>
+                                          <p:attrName>style.visibility</p:attrName>
+                                        </p:attrNameLst>
+                                      </p:cBhvr>
+                                      <p:to>
+                                        <p:strVal val="visible"/>
+                                      </p:to>
+                                    </p:set>
+                                  </p:childTnLst>
+                                </p:cTn>
+                              </p:par>
+                              <p:par>
+                                <p:cTn id="14" presetID="1" presetClass="entr" presetSubtype="0" fill="hold" nodeType="withEffect">
+                                  <p:stCondLst>
+                                    <p:cond delay="0"/>
+                                  </p:stCondLst>
+                                  <p:childTnLst>
+                                    <p:set>
+                                      <p:cBhvr>
+                                        <p:cTn id="15" dur="1" fill="hold">
+                                          <p:stCondLst>
+                                            <p:cond delay="0"/>
+                                          </p:stCondLst>
+                                        </p:cTn>
+                                        <p:tgtEl>
+                                          <p:spTgt spid="4">
+                                            <p:txEl>
+                                              <p:pRg st="4" end="4"/>
+                                            </p:txEl>
+                                          </p:spTgt>
+                                        </p:tgtEl>
+                                        <p:attrNameLst>
+                                          <p:attrName>style.visibility</p:attrName>
+                                        </p:attrNameLst>
+                                      </p:cBhvr>
+                                      <p:to>
+                                        <p:strVal val="visible"/>
+                                      </p:to>
+                                    </p:set>
+                                  </p:childTnLst>
+                                </p:cTn>
+                              </p:par>
+                            </p:childTnLst>
+                          </p:cTn>
+                        </p:par>
+                      </p:childTnLst>
+                    </p:cTn>
+                  </p:par>
+                </p:childTnLst>
+              </p:cTn>
+              <p:prevCondLst>
+                <p:cond evt="onPrev" delay="0">
+                  <p:tgtEl>
+                    <p:sldTgt/>
+                  </p:tgtEl>
+                </p:cond>
+              </p:prevCondLst>
+              <p:nextCondLst>
+                <p:cond evt="onNext" delay="0">
+                  <p:tgtEl>
+                    <p:sldTgt/>
+                  </p:tgtEl>
+                </p:cond>
+              </p:nextCondLst>
+            </p:seq>
+          </p:childTnLst>
+        </p:cTn>
+      </p:par>
+    </p:tnLst>
+  </p:timing>
+</p:sld>
+</file>
+
+<file path=ppt/slides/slide16.xml><?xml version="1.0" encoding="utf-8"?>
+<p:sld xmlns:a="http://schemas.openxmlformats.org/drawingml/2006/main" xmlns:r="http://schemas.openxmlformats.org/officeDocument/2006/relationships" xmlns:p="http://schemas.openxmlformats.org/presentationml/2006/main">
+  <p:cSld>
+    <p:spTree>
+      <p:nvGrpSpPr>
+        <p:cNvPr id="1" name=""/>
+        <p:cNvGrpSpPr/>
+        <p:nvPr/>
+      </p:nvGrpSpPr>
+      <p:grpSpPr>
+        <a:xfrm>
+          <a:off x="0" y="0"/>
+          <a:ext cx="0" cy="0"/>
+          <a:chOff x="0" y="0"/>
+          <a:chExt cx="0" cy="0"/>
+        </a:xfrm>
+      </p:grpSpPr>
+      <p:sp>
+        <p:nvSpPr>
+          <p:cNvPr id="2" name="Title 1">
+            <a:extLst>
+              <a:ext uri="{FF2B5EF4-FFF2-40B4-BE49-F238E27FC236}">
+                <a16:creationId xmlns:a16="http://schemas.microsoft.com/office/drawing/2014/main" id="{C2052CE5-F69A-D645-8ECD-5C44E4A30D5C}"/>
+              </a:ext>
+            </a:extLst>
+          </p:cNvPr>
+          <p:cNvSpPr>
+            <a:spLocks noGrp="1"/>
+          </p:cNvSpPr>
+          <p:nvPr>
+            <p:ph type="title"/>
+          </p:nvPr>
+        </p:nvSpPr>
+        <p:spPr/>
+        <p:txBody>
+          <a:bodyPr/>
+          <a:lstStyle/>
+          <a:p>
+            <a:r>
+              <a:rPr lang="en-US" dirty="0"/>
+              <a:t>Java 7</a:t>
+            </a:r>
+          </a:p>
+        </p:txBody>
+      </p:sp>
+      <p:sp>
+        <p:nvSpPr>
+          <p:cNvPr id="3" name="Content Placeholder 2">
+            <a:extLst>
+              <a:ext uri="{FF2B5EF4-FFF2-40B4-BE49-F238E27FC236}">
+                <a16:creationId xmlns:a16="http://schemas.microsoft.com/office/drawing/2014/main" id="{20ABE521-BF95-4441-82E2-23994761C137}"/>
+              </a:ext>
+            </a:extLst>
+          </p:cNvPr>
+          <p:cNvSpPr>
+            <a:spLocks noGrp="1"/>
+          </p:cNvSpPr>
+          <p:nvPr>
+            <p:ph sz="half" idx="1"/>
+          </p:nvPr>
+        </p:nvSpPr>
+        <p:spPr>
+          <a:xfrm>
+            <a:off x="685802" y="2142067"/>
+            <a:ext cx="3016403" cy="3649134"/>
+          </a:xfrm>
+        </p:spPr>
+        <p:txBody>
+          <a:bodyPr>
+            <a:normAutofit/>
+          </a:bodyPr>
+          <a:lstStyle/>
+          <a:p>
+            <a:pPr marL="0" indent="0">
+              <a:buNone/>
+            </a:pPr>
+            <a:r>
+              <a:rPr lang="en-US" sz="2800" dirty="0"/>
+              <a:t>Project Coin</a:t>
+            </a:r>
+          </a:p>
+        </p:txBody>
+      </p:sp>
+      <p:sp>
+        <p:nvSpPr>
+          <p:cNvPr id="4" name="Content Placeholder 3">
+            <a:extLst>
+              <a:ext uri="{FF2B5EF4-FFF2-40B4-BE49-F238E27FC236}">
+                <a16:creationId xmlns:a16="http://schemas.microsoft.com/office/drawing/2014/main" id="{26204FAF-26E7-1B46-B974-24DDC791B844}"/>
+              </a:ext>
+            </a:extLst>
+          </p:cNvPr>
+          <p:cNvSpPr>
+            <a:spLocks noGrp="1"/>
+          </p:cNvSpPr>
+          <p:nvPr>
+            <p:ph sz="half" idx="2"/>
+          </p:nvPr>
+        </p:nvSpPr>
+        <p:spPr>
+          <a:xfrm>
+            <a:off x="3914078" y="2142067"/>
+            <a:ext cx="6903149" cy="3649133"/>
+          </a:xfrm>
+        </p:spPr>
+        <p:txBody>
+          <a:bodyPr anchor="t">
+            <a:normAutofit/>
+          </a:bodyPr>
+          <a:lstStyle/>
+          <a:p>
+            <a:pPr marL="0" indent="0">
+              <a:buNone/>
+            </a:pPr>
+            <a:r>
+              <a:rPr lang="en-US" sz="2400" dirty="0"/>
+              <a:t>Generic type inference (diamond operator)</a:t>
+            </a:r>
+          </a:p>
+          <a:p>
+            <a:pPr marL="0" indent="0">
+              <a:buNone/>
+            </a:pPr>
+            <a:endParaRPr lang="en-US" sz="2400" dirty="0"/>
+          </a:p>
+        </p:txBody>
+      </p:sp>
+      <p:pic>
+        <p:nvPicPr>
+          <p:cNvPr id="6" name="Picture 5">
+            <a:extLst>
+              <a:ext uri="{FF2B5EF4-FFF2-40B4-BE49-F238E27FC236}">
+                <a16:creationId xmlns:a16="http://schemas.microsoft.com/office/drawing/2014/main" id="{05372306-A0B3-034A-A105-265D99A657A5}"/>
+              </a:ext>
+            </a:extLst>
+          </p:cNvPr>
+          <p:cNvPicPr>
+            <a:picLocks noChangeAspect="1"/>
+          </p:cNvPicPr>
+          <p:nvPr/>
+        </p:nvPicPr>
+        <p:blipFill>
+          <a:blip r:embed="rId2"/>
+          <a:stretch>
+            <a:fillRect/>
+          </a:stretch>
+        </p:blipFill>
+        <p:spPr>
+          <a:xfrm>
+            <a:off x="3919293" y="3012016"/>
+            <a:ext cx="6897934" cy="1735855"/>
+          </a:xfrm>
+          <a:prstGeom prst="rect">
+            <a:avLst/>
+          </a:prstGeom>
+        </p:spPr>
+      </p:pic>
+    </p:spTree>
+    <p:extLst>
+      <p:ext uri="{BB962C8B-B14F-4D97-AF65-F5344CB8AC3E}">
+        <p14:creationId xmlns:p14="http://schemas.microsoft.com/office/powerpoint/2010/main" val="2790031457"/>
+      </p:ext>
+    </p:extLst>
+  </p:cSld>
+  <p:clrMapOvr>
+    <a:masterClrMapping/>
+  </p:clrMapOvr>
+</p:sld>
+</file>
+
+<file path=ppt/slides/slide17.xml><?xml version="1.0" encoding="utf-8"?>
+<p:sld xmlns:a="http://schemas.openxmlformats.org/drawingml/2006/main" xmlns:r="http://schemas.openxmlformats.org/officeDocument/2006/relationships" xmlns:p="http://schemas.openxmlformats.org/presentationml/2006/main">
+  <p:cSld>
+    <p:spTree>
+      <p:nvGrpSpPr>
+        <p:cNvPr id="1" name=""/>
+        <p:cNvGrpSpPr/>
+        <p:nvPr/>
+      </p:nvGrpSpPr>
+      <p:grpSpPr>
+        <a:xfrm>
+          <a:off x="0" y="0"/>
+          <a:ext cx="0" cy="0"/>
+          <a:chOff x="0" y="0"/>
+          <a:chExt cx="0" cy="0"/>
+        </a:xfrm>
+      </p:grpSpPr>
+      <p:sp>
+        <p:nvSpPr>
+          <p:cNvPr id="2" name="Title 1">
+            <a:extLst>
+              <a:ext uri="{FF2B5EF4-FFF2-40B4-BE49-F238E27FC236}">
+                <a16:creationId xmlns:a16="http://schemas.microsoft.com/office/drawing/2014/main" id="{C2052CE5-F69A-D645-8ECD-5C44E4A30D5C}"/>
+              </a:ext>
+            </a:extLst>
+          </p:cNvPr>
+          <p:cNvSpPr>
+            <a:spLocks noGrp="1"/>
+          </p:cNvSpPr>
+          <p:nvPr>
+            <p:ph type="title"/>
+          </p:nvPr>
+        </p:nvSpPr>
+        <p:spPr/>
+        <p:txBody>
+          <a:bodyPr/>
+          <a:lstStyle/>
+          <a:p>
+            <a:r>
+              <a:rPr lang="en-US" dirty="0"/>
+              <a:t>Java 7</a:t>
+            </a:r>
+          </a:p>
+        </p:txBody>
+      </p:sp>
+      <p:sp>
+        <p:nvSpPr>
+          <p:cNvPr id="3" name="Content Placeholder 2">
+            <a:extLst>
+              <a:ext uri="{FF2B5EF4-FFF2-40B4-BE49-F238E27FC236}">
+                <a16:creationId xmlns:a16="http://schemas.microsoft.com/office/drawing/2014/main" id="{20ABE521-BF95-4441-82E2-23994761C137}"/>
+              </a:ext>
+            </a:extLst>
+          </p:cNvPr>
+          <p:cNvSpPr>
+            <a:spLocks noGrp="1"/>
+          </p:cNvSpPr>
+          <p:nvPr>
+            <p:ph sz="half" idx="1"/>
+          </p:nvPr>
+        </p:nvSpPr>
+        <p:spPr>
+          <a:xfrm>
+            <a:off x="685802" y="2142067"/>
+            <a:ext cx="3016403" cy="3649134"/>
+          </a:xfrm>
+        </p:spPr>
+        <p:txBody>
+          <a:bodyPr>
+            <a:normAutofit/>
+          </a:bodyPr>
+          <a:lstStyle/>
+          <a:p>
+            <a:pPr marL="0" indent="0">
+              <a:buNone/>
+            </a:pPr>
+            <a:r>
+              <a:rPr lang="en-US" sz="2800" dirty="0"/>
+              <a:t>Project Coin</a:t>
+            </a:r>
+          </a:p>
+        </p:txBody>
+      </p:sp>
+      <p:sp>
+        <p:nvSpPr>
+          <p:cNvPr id="4" name="Content Placeholder 3">
+            <a:extLst>
+              <a:ext uri="{FF2B5EF4-FFF2-40B4-BE49-F238E27FC236}">
+                <a16:creationId xmlns:a16="http://schemas.microsoft.com/office/drawing/2014/main" id="{26204FAF-26E7-1B46-B974-24DDC791B844}"/>
+              </a:ext>
+            </a:extLst>
+          </p:cNvPr>
+          <p:cNvSpPr>
+            <a:spLocks noGrp="1"/>
+          </p:cNvSpPr>
+          <p:nvPr>
+            <p:ph sz="half" idx="2"/>
+          </p:nvPr>
+        </p:nvSpPr>
+        <p:spPr>
+          <a:xfrm>
+            <a:off x="3914078" y="2142067"/>
+            <a:ext cx="6903149" cy="3649133"/>
+          </a:xfrm>
+        </p:spPr>
+        <p:txBody>
+          <a:bodyPr anchor="t">
+            <a:normAutofit/>
+          </a:bodyPr>
+          <a:lstStyle/>
+          <a:p>
+            <a:pPr marL="0" indent="0">
+              <a:buNone/>
+            </a:pPr>
+            <a:r>
+              <a:rPr lang="en-US" sz="2400" dirty="0"/>
+              <a:t>Numeric literal improvements</a:t>
+            </a:r>
+          </a:p>
+          <a:p>
+            <a:pPr marL="0" indent="0">
+              <a:buNone/>
+            </a:pPr>
+            <a:endParaRPr lang="en-US" sz="2400" dirty="0"/>
+          </a:p>
+          <a:p>
+            <a:pPr marL="0" indent="0">
+              <a:lnSpc>
+                <a:spcPct val="150000"/>
+              </a:lnSpc>
+              <a:buNone/>
+            </a:pPr>
+            <a:r>
+              <a:rPr lang="en-US" sz="2000" dirty="0"/>
+              <a:t>Declare binary integer literals</a:t>
+            </a:r>
+            <a:endParaRPr lang="en-US" sz="2000" dirty="0">
+              <a:latin typeface="Andale Mono" panose="020B0509000000000004" pitchFamily="49" charset="0"/>
+            </a:endParaRPr>
+          </a:p>
+          <a:p>
+            <a:pPr marL="0" indent="0">
+              <a:lnSpc>
+                <a:spcPct val="150000"/>
+              </a:lnSpc>
+              <a:buNone/>
+            </a:pPr>
+            <a:r>
+              <a:rPr lang="en-US" sz="2000" dirty="0"/>
+              <a:t>Use underscores in numeric literals</a:t>
+            </a:r>
+            <a:endParaRPr lang="en-US" sz="2000" dirty="0">
+              <a:latin typeface="Andale Mono" panose="020B0509000000000004" pitchFamily="49" charset="0"/>
+            </a:endParaRPr>
+          </a:p>
+        </p:txBody>
+      </p:sp>
+    </p:spTree>
+    <p:extLst>
+      <p:ext uri="{BB962C8B-B14F-4D97-AF65-F5344CB8AC3E}">
+        <p14:creationId xmlns:p14="http://schemas.microsoft.com/office/powerpoint/2010/main" val="3795959925"/>
+      </p:ext>
+    </p:extLst>
+  </p:cSld>
+  <p:clrMapOvr>
+    <a:masterClrMapping/>
+  </p:clrMapOvr>
+  <p:timing>
+    <p:tnLst>
+      <p:par>
+        <p:cTn id="1" dur="indefinite" restart="never" nodeType="tmRoot">
+          <p:childTnLst>
+            <p:seq concurrent="1" nextAc="seek">
+              <p:cTn id="2" dur="indefinite" nodeType="mainSeq">
+                <p:childTnLst>
+                  <p:par>
+                    <p:cTn id="3" fill="hold">
+                      <p:stCondLst>
+                        <p:cond delay="indefinite"/>
+                        <p:cond evt="onBegin" delay="0">
+                          <p:tn val="2"/>
+                        </p:cond>
+                      </p:stCondLst>
+                      <p:childTnLst>
+                        <p:par>
+                          <p:cTn id="4" fill="hold">
+                            <p:stCondLst>
+                              <p:cond delay="0"/>
+                            </p:stCondLst>
+                            <p:childTnLst>
+                              <p:par>
+                                <p:cTn id="5" presetID="2" presetClass="entr" presetSubtype="4" fill="hold" nodeType="withEffect">
+                                  <p:stCondLst>
+                                    <p:cond delay="0"/>
+                                  </p:stCondLst>
+                                  <p:childTnLst>
+                                    <p:set>
+                                      <p:cBhvr>
+                                        <p:cTn id="6" dur="1" fill="hold">
+                                          <p:stCondLst>
+                                            <p:cond delay="0"/>
+                                          </p:stCondLst>
+                                        </p:cTn>
+                                        <p:tgtEl>
+                                          <p:spTgt spid="4">
+                                            <p:txEl>
+                                              <p:pRg st="0" end="0"/>
+                                            </p:txEl>
+                                          </p:spTgt>
+                                        </p:tgtEl>
+                                        <p:attrNameLst>
+                                          <p:attrName>style.visibility</p:attrName>
+                                        </p:attrNameLst>
+                                      </p:cBhvr>
+                                      <p:to>
+                                        <p:strVal val="visible"/>
+                                      </p:to>
+                                    </p:set>
+                                    <p:anim calcmode="lin" valueType="num">
+                                      <p:cBhvr additive="base">
+                                        <p:cTn id="7" dur="500" fill="hold"/>
+                                        <p:tgtEl>
+                                          <p:spTgt spid="4">
+                                            <p:txEl>
+                                              <p:pRg st="0" end="0"/>
+                                            </p:txEl>
+                                          </p:spTgt>
+                                        </p:tgtEl>
+                                        <p:attrNameLst>
+                                          <p:attrName>ppt_x</p:attrName>
+                                        </p:attrNameLst>
+                                      </p:cBhvr>
+                                      <p:tavLst>
+                                        <p:tav tm="0">
+                                          <p:val>
+                                            <p:strVal val="#ppt_x"/>
+                                          </p:val>
+                                        </p:tav>
+                                        <p:tav tm="100000">
+                                          <p:val>
+                                            <p:strVal val="#ppt_x"/>
+                                          </p:val>
+                                        </p:tav>
+                                      </p:tavLst>
+                                    </p:anim>
+                                    <p:anim calcmode="lin" valueType="num">
+                                      <p:cBhvr additive="base">
+                                        <p:cTn id="8" dur="500" fill="hold"/>
+                                        <p:tgtEl>
+                                          <p:spTgt spid="4">
+                                            <p:txEl>
+                                              <p:pRg st="0" end="0"/>
+                                            </p:txEl>
+                                          </p:spTgt>
+                                        </p:tgtEl>
+                                        <p:attrNameLst>
+                                          <p:attrName>ppt_y</p:attrName>
+                                        </p:attrNameLst>
+                                      </p:cBhvr>
+                                      <p:tavLst>
+                                        <p:tav tm="0">
+                                          <p:val>
+                                            <p:strVal val="1+#ppt_h/2"/>
+                                          </p:val>
+                                        </p:tav>
+                                        <p:tav tm="100000">
+                                          <p:val>
+                                            <p:strVal val="#ppt_y"/>
+                                          </p:val>
+                                        </p:tav>
+                                      </p:tavLst>
+                                    </p:anim>
+                                  </p:childTnLst>
+                                </p:cTn>
+                              </p:par>
+                            </p:childTnLst>
+                          </p:cTn>
+                        </p:par>
+                        <p:par>
+                          <p:cTn id="9" fill="hold">
+                            <p:stCondLst>
+                              <p:cond delay="500"/>
+                            </p:stCondLst>
+                            <p:childTnLst>
+                              <p:par>
+                                <p:cTn id="10" presetID="1" presetClass="entr" presetSubtype="0" fill="hold" nodeType="afterEffect">
+                                  <p:stCondLst>
+                                    <p:cond delay="0"/>
+                                  </p:stCondLst>
+                                  <p:childTnLst>
+                                    <p:set>
+                                      <p:cBhvr>
+                                        <p:cTn id="11" dur="1" fill="hold">
+                                          <p:stCondLst>
+                                            <p:cond delay="0"/>
+                                          </p:stCondLst>
+                                        </p:cTn>
+                                        <p:tgtEl>
+                                          <p:spTgt spid="4">
+                                            <p:txEl>
+                                              <p:pRg st="2" end="2"/>
+                                            </p:txEl>
+                                          </p:spTgt>
+                                        </p:tgtEl>
+                                        <p:attrNameLst>
+                                          <p:attrName>style.visibility</p:attrName>
+                                        </p:attrNameLst>
+                                      </p:cBhvr>
+                                      <p:to>
+                                        <p:strVal val="visible"/>
+                                      </p:to>
+                                    </p:set>
+                                  </p:childTnLst>
+                                </p:cTn>
+                              </p:par>
+                              <p:par>
+                                <p:cTn id="12" presetID="1" presetClass="entr" presetSubtype="0" fill="hold" nodeType="withEffect">
+                                  <p:stCondLst>
+                                    <p:cond delay="0"/>
+                                  </p:stCondLst>
+                                  <p:childTnLst>
+                                    <p:set>
+                                      <p:cBhvr>
+                                        <p:cTn id="13" dur="1" fill="hold">
+                                          <p:stCondLst>
+                                            <p:cond delay="0"/>
+                                          </p:stCondLst>
+                                        </p:cTn>
+                                        <p:tgtEl>
+                                          <p:spTgt spid="4">
+                                            <p:txEl>
+                                              <p:pRg st="3" end="3"/>
+                                            </p:txEl>
+                                          </p:spTgt>
+                                        </p:tgtEl>
+                                        <p:attrNameLst>
+                                          <p:attrName>style.visibility</p:attrName>
+                                        </p:attrNameLst>
+                                      </p:cBhvr>
+                                      <p:to>
+                                        <p:strVal val="visible"/>
+                                      </p:to>
+                                    </p:set>
+                                  </p:childTnLst>
+                                </p:cTn>
+                              </p:par>
+                            </p:childTnLst>
+                          </p:cTn>
+                        </p:par>
+                      </p:childTnLst>
+                    </p:cTn>
+                  </p:par>
+                </p:childTnLst>
+              </p:cTn>
+              <p:prevCondLst>
+                <p:cond evt="onPrev" delay="0">
+                  <p:tgtEl>
+                    <p:sldTgt/>
+                  </p:tgtEl>
+                </p:cond>
+              </p:prevCondLst>
+              <p:nextCondLst>
+                <p:cond evt="onNext" delay="0">
+                  <p:tgtEl>
+                    <p:sldTgt/>
+                  </p:tgtEl>
+                </p:cond>
+              </p:nextCondLst>
+            </p:seq>
+          </p:childTnLst>
+        </p:cTn>
+      </p:par>
+    </p:tnLst>
+  </p:timing>
+</p:sld>
+</file>
+
+<file path=ppt/slides/slide18.xml><?xml version="1.0" encoding="utf-8"?>
+<p:sld xmlns:a="http://schemas.openxmlformats.org/drawingml/2006/main" xmlns:r="http://schemas.openxmlformats.org/officeDocument/2006/relationships" xmlns:p="http://schemas.openxmlformats.org/presentationml/2006/main">
+  <p:cSld>
+    <p:spTree>
+      <p:nvGrpSpPr>
+        <p:cNvPr id="1" name=""/>
+        <p:cNvGrpSpPr/>
+        <p:nvPr/>
+      </p:nvGrpSpPr>
+      <p:grpSpPr>
+        <a:xfrm>
+          <a:off x="0" y="0"/>
+          <a:ext cx="0" cy="0"/>
+          <a:chOff x="0" y="0"/>
+          <a:chExt cx="0" cy="0"/>
+        </a:xfrm>
+      </p:grpSpPr>
+      <p:sp>
+        <p:nvSpPr>
+          <p:cNvPr id="2" name="Title 1">
+            <a:extLst>
+              <a:ext uri="{FF2B5EF4-FFF2-40B4-BE49-F238E27FC236}">
+                <a16:creationId xmlns:a16="http://schemas.microsoft.com/office/drawing/2014/main" id="{C2052CE5-F69A-D645-8ECD-5C44E4A30D5C}"/>
+              </a:ext>
+            </a:extLst>
+          </p:cNvPr>
+          <p:cNvSpPr>
+            <a:spLocks noGrp="1"/>
+          </p:cNvSpPr>
+          <p:nvPr>
+            <p:ph type="title"/>
+          </p:nvPr>
+        </p:nvSpPr>
+        <p:spPr/>
+        <p:txBody>
+          <a:bodyPr/>
+          <a:lstStyle/>
+          <a:p>
+            <a:r>
+              <a:rPr lang="en-US" dirty="0"/>
+              <a:t>Java 7</a:t>
+            </a:r>
+          </a:p>
+        </p:txBody>
+      </p:sp>
+      <p:sp>
+        <p:nvSpPr>
+          <p:cNvPr id="3" name="Content Placeholder 2">
+            <a:extLst>
+              <a:ext uri="{FF2B5EF4-FFF2-40B4-BE49-F238E27FC236}">
+                <a16:creationId xmlns:a16="http://schemas.microsoft.com/office/drawing/2014/main" id="{20ABE521-BF95-4441-82E2-23994761C137}"/>
+              </a:ext>
+            </a:extLst>
+          </p:cNvPr>
+          <p:cNvSpPr>
+            <a:spLocks noGrp="1"/>
+          </p:cNvSpPr>
+          <p:nvPr>
+            <p:ph sz="half" idx="1"/>
+          </p:nvPr>
+        </p:nvSpPr>
+        <p:spPr>
+          <a:xfrm>
+            <a:off x="685802" y="2142067"/>
+            <a:ext cx="3016403" cy="3649134"/>
+          </a:xfrm>
+        </p:spPr>
+        <p:txBody>
+          <a:bodyPr>
+            <a:normAutofit/>
+          </a:bodyPr>
+          <a:lstStyle/>
+          <a:p>
+            <a:pPr marL="0" indent="0">
+              <a:buNone/>
+            </a:pPr>
+            <a:r>
+              <a:rPr lang="en-US" sz="2800" dirty="0"/>
+              <a:t>Project Coin</a:t>
+            </a:r>
+          </a:p>
+        </p:txBody>
+      </p:sp>
+      <p:sp>
+        <p:nvSpPr>
+          <p:cNvPr id="4" name="Content Placeholder 3">
+            <a:extLst>
+              <a:ext uri="{FF2B5EF4-FFF2-40B4-BE49-F238E27FC236}">
+                <a16:creationId xmlns:a16="http://schemas.microsoft.com/office/drawing/2014/main" id="{26204FAF-26E7-1B46-B974-24DDC791B844}"/>
+              </a:ext>
+            </a:extLst>
+          </p:cNvPr>
+          <p:cNvSpPr>
+            <a:spLocks noGrp="1"/>
+          </p:cNvSpPr>
+          <p:nvPr>
+            <p:ph sz="half" idx="2"/>
+          </p:nvPr>
+        </p:nvSpPr>
+        <p:spPr>
+          <a:xfrm>
+            <a:off x="3914078" y="2142067"/>
+            <a:ext cx="6903149" cy="3649133"/>
+          </a:xfrm>
+        </p:spPr>
+        <p:txBody>
+          <a:bodyPr anchor="t">
+            <a:normAutofit/>
+          </a:bodyPr>
+          <a:lstStyle/>
+          <a:p>
+            <a:pPr marL="0" indent="0">
+              <a:buNone/>
+            </a:pPr>
+            <a:r>
+              <a:rPr lang="en-US" sz="2400" dirty="0"/>
+              <a:t>Numeric literal improvements</a:t>
+            </a:r>
+          </a:p>
+          <a:p>
+            <a:pPr marL="0" indent="0">
+              <a:buNone/>
+            </a:pPr>
+            <a:endParaRPr lang="en-US" sz="2400" dirty="0"/>
+          </a:p>
+        </p:txBody>
+      </p:sp>
+      <p:pic>
+        <p:nvPicPr>
+          <p:cNvPr id="5" name="Picture 4">
+            <a:extLst>
+              <a:ext uri="{FF2B5EF4-FFF2-40B4-BE49-F238E27FC236}">
+                <a16:creationId xmlns:a16="http://schemas.microsoft.com/office/drawing/2014/main" id="{81858EC5-2A46-E54B-85D8-35AA224FC297}"/>
+              </a:ext>
+            </a:extLst>
+          </p:cNvPr>
+          <p:cNvPicPr>
+            <a:picLocks noChangeAspect="1"/>
+          </p:cNvPicPr>
+          <p:nvPr/>
+        </p:nvPicPr>
+        <p:blipFill>
+          <a:blip r:embed="rId2"/>
+          <a:stretch>
+            <a:fillRect/>
+          </a:stretch>
+        </p:blipFill>
+        <p:spPr>
+          <a:xfrm>
+            <a:off x="3914078" y="3429000"/>
+            <a:ext cx="6903148" cy="1099824"/>
+          </a:xfrm>
+          <a:prstGeom prst="rect">
+            <a:avLst/>
+          </a:prstGeom>
+        </p:spPr>
+      </p:pic>
+    </p:spTree>
+    <p:extLst>
+      <p:ext uri="{BB962C8B-B14F-4D97-AF65-F5344CB8AC3E}">
+        <p14:creationId xmlns:p14="http://schemas.microsoft.com/office/powerpoint/2010/main" val="3968539130"/>
+      </p:ext>
+    </p:extLst>
+  </p:cSld>
+  <p:clrMapOvr>
+    <a:masterClrMapping/>
+  </p:clrMapOvr>
+</p:sld>
+</file>
+
+<file path=ppt/slides/slide19.xml><?xml version="1.0" encoding="utf-8"?>
+<p:sld xmlns:a="http://schemas.openxmlformats.org/drawingml/2006/main" xmlns:r="http://schemas.openxmlformats.org/officeDocument/2006/relationships" xmlns:p="http://schemas.openxmlformats.org/presentationml/2006/main">
+  <p:cSld>
+    <p:spTree>
+      <p:nvGrpSpPr>
+        <p:cNvPr id="1" name=""/>
+        <p:cNvGrpSpPr/>
+        <p:nvPr/>
+      </p:nvGrpSpPr>
+      <p:grpSpPr>
+        <a:xfrm>
+          <a:off x="0" y="0"/>
+          <a:ext cx="0" cy="0"/>
+          <a:chOff x="0" y="0"/>
+          <a:chExt cx="0" cy="0"/>
+        </a:xfrm>
+      </p:grpSpPr>
+      <p:sp>
+        <p:nvSpPr>
+          <p:cNvPr id="2" name="Title 1">
+            <a:extLst>
+              <a:ext uri="{FF2B5EF4-FFF2-40B4-BE49-F238E27FC236}">
+                <a16:creationId xmlns:a16="http://schemas.microsoft.com/office/drawing/2014/main" id="{A6AF450C-FFDD-6243-BADD-B20AD0DC1849}"/>
+              </a:ext>
+            </a:extLst>
+          </p:cNvPr>
+          <p:cNvSpPr>
+            <a:spLocks noGrp="1"/>
+          </p:cNvSpPr>
+          <p:nvPr>
+            <p:ph type="title"/>
+          </p:nvPr>
+        </p:nvSpPr>
+        <p:spPr/>
+        <p:txBody>
+          <a:bodyPr/>
+          <a:lstStyle/>
+          <a:p>
+            <a:r>
+              <a:rPr lang="en-US" dirty="0"/>
+              <a:t>Java 8</a:t>
+            </a:r>
+          </a:p>
+        </p:txBody>
+      </p:sp>
+      <p:sp>
+        <p:nvSpPr>
+          <p:cNvPr id="3" name="Text Placeholder 2">
+            <a:extLst>
+              <a:ext uri="{FF2B5EF4-FFF2-40B4-BE49-F238E27FC236}">
+                <a16:creationId xmlns:a16="http://schemas.microsoft.com/office/drawing/2014/main" id="{5A4E1B65-8352-194A-BCE2-27690D61B3F9}"/>
+              </a:ext>
+            </a:extLst>
+          </p:cNvPr>
+          <p:cNvSpPr>
+            <a:spLocks noGrp="1"/>
+          </p:cNvSpPr>
+          <p:nvPr>
+            <p:ph type="body" idx="1"/>
+          </p:nvPr>
+        </p:nvSpPr>
+        <p:spPr/>
+        <p:txBody>
+          <a:bodyPr/>
+          <a:lstStyle/>
+          <a:p>
+            <a:endParaRPr lang="en-US"/>
+          </a:p>
+        </p:txBody>
+      </p:sp>
+    </p:spTree>
+    <p:extLst>
+      <p:ext uri="{BB962C8B-B14F-4D97-AF65-F5344CB8AC3E}">
+        <p14:creationId xmlns:p14="http://schemas.microsoft.com/office/powerpoint/2010/main" val="3754491479"/>
+      </p:ext>
+    </p:extLst>
+  </p:cSld>
+  <p:clrMapOvr>
+    <a:masterClrMapping/>
+  </p:clrMapOvr>
+</p:sld>
+</file>
+
 <file path=ppt/slides/slide2.xml><?xml version="1.0" encoding="utf-8"?>
 <p:sld xmlns:a="http://schemas.openxmlformats.org/drawingml/2006/main" xmlns:r="http://schemas.openxmlformats.org/officeDocument/2006/relationships" xmlns:p="http://schemas.openxmlformats.org/presentationml/2006/main">
   <p:cSld>
@@ -6472,6 +9145,178 @@
     <p:extLst>
       <p:ext uri="{BB962C8B-B14F-4D97-AF65-F5344CB8AC3E}">
         <p14:creationId xmlns:p14="http://schemas.microsoft.com/office/powerpoint/2010/main" val="873591733"/>
+      </p:ext>
+    </p:extLst>
+  </p:cSld>
+  <p:clrMapOvr>
+    <a:masterClrMapping/>
+  </p:clrMapOvr>
+</p:sld>
+</file>
+
+<file path=ppt/slides/slide20.xml><?xml version="1.0" encoding="utf-8"?>
+<p:sld xmlns:a="http://schemas.openxmlformats.org/drawingml/2006/main" xmlns:r="http://schemas.openxmlformats.org/officeDocument/2006/relationships" xmlns:p="http://schemas.openxmlformats.org/presentationml/2006/main">
+  <p:cSld>
+    <p:spTree>
+      <p:nvGrpSpPr>
+        <p:cNvPr id="1" name=""/>
+        <p:cNvGrpSpPr/>
+        <p:nvPr/>
+      </p:nvGrpSpPr>
+      <p:grpSpPr>
+        <a:xfrm>
+          <a:off x="0" y="0"/>
+          <a:ext cx="0" cy="0"/>
+          <a:chOff x="0" y="0"/>
+          <a:chExt cx="0" cy="0"/>
+        </a:xfrm>
+      </p:grpSpPr>
+      <p:sp>
+        <p:nvSpPr>
+          <p:cNvPr id="2" name="Title 1">
+            <a:extLst>
+              <a:ext uri="{FF2B5EF4-FFF2-40B4-BE49-F238E27FC236}">
+                <a16:creationId xmlns:a16="http://schemas.microsoft.com/office/drawing/2014/main" id="{EB4780D8-CCA0-1D4B-99FA-5028A46301A0}"/>
+              </a:ext>
+            </a:extLst>
+          </p:cNvPr>
+          <p:cNvSpPr>
+            <a:spLocks noGrp="1"/>
+          </p:cNvSpPr>
+          <p:nvPr>
+            <p:ph type="title"/>
+          </p:nvPr>
+        </p:nvSpPr>
+        <p:spPr/>
+        <p:txBody>
+          <a:bodyPr/>
+          <a:lstStyle/>
+          <a:p>
+            <a:r>
+              <a:rPr lang="en-US" dirty="0"/>
+              <a:t>Java 8</a:t>
+            </a:r>
+          </a:p>
+        </p:txBody>
+      </p:sp>
+      <p:sp>
+        <p:nvSpPr>
+          <p:cNvPr id="3" name="Content Placeholder 2">
+            <a:extLst>
+              <a:ext uri="{FF2B5EF4-FFF2-40B4-BE49-F238E27FC236}">
+                <a16:creationId xmlns:a16="http://schemas.microsoft.com/office/drawing/2014/main" id="{D51ED6B6-95F4-AC4E-9563-D8520B9637B3}"/>
+              </a:ext>
+            </a:extLst>
+          </p:cNvPr>
+          <p:cNvSpPr>
+            <a:spLocks noGrp="1"/>
+          </p:cNvSpPr>
+          <p:nvPr>
+            <p:ph idx="1"/>
+          </p:nvPr>
+        </p:nvSpPr>
+        <p:spPr/>
+        <p:txBody>
+          <a:bodyPr/>
+          <a:lstStyle/>
+          <a:p>
+            <a:endParaRPr lang="en-US"/>
+          </a:p>
+        </p:txBody>
+      </p:sp>
+    </p:spTree>
+    <p:extLst>
+      <p:ext uri="{BB962C8B-B14F-4D97-AF65-F5344CB8AC3E}">
+        <p14:creationId xmlns:p14="http://schemas.microsoft.com/office/powerpoint/2010/main" val="838961412"/>
+      </p:ext>
+    </p:extLst>
+  </p:cSld>
+  <p:clrMapOvr>
+    <a:masterClrMapping/>
+  </p:clrMapOvr>
+</p:sld>
+</file>
+
+<file path=ppt/slides/slide21.xml><?xml version="1.0" encoding="utf-8"?>
+<p:sld xmlns:a="http://schemas.openxmlformats.org/drawingml/2006/main" xmlns:r="http://schemas.openxmlformats.org/officeDocument/2006/relationships" xmlns:p="http://schemas.openxmlformats.org/presentationml/2006/main">
+  <p:cSld>
+    <p:spTree>
+      <p:nvGrpSpPr>
+        <p:cNvPr id="1" name=""/>
+        <p:cNvGrpSpPr/>
+        <p:nvPr/>
+      </p:nvGrpSpPr>
+      <p:grpSpPr>
+        <a:xfrm>
+          <a:off x="0" y="0"/>
+          <a:ext cx="0" cy="0"/>
+          <a:chOff x="0" y="0"/>
+          <a:chExt cx="0" cy="0"/>
+        </a:xfrm>
+      </p:grpSpPr>
+      <p:sp>
+        <p:nvSpPr>
+          <p:cNvPr id="2" name="Title 1">
+            <a:extLst>
+              <a:ext uri="{FF2B5EF4-FFF2-40B4-BE49-F238E27FC236}">
+                <a16:creationId xmlns:a16="http://schemas.microsoft.com/office/drawing/2014/main" id="{EB4780D8-CCA0-1D4B-99FA-5028A46301A0}"/>
+              </a:ext>
+            </a:extLst>
+          </p:cNvPr>
+          <p:cNvSpPr>
+            <a:spLocks noGrp="1"/>
+          </p:cNvSpPr>
+          <p:nvPr>
+            <p:ph type="title"/>
+          </p:nvPr>
+        </p:nvSpPr>
+        <p:spPr/>
+        <p:txBody>
+          <a:bodyPr/>
+          <a:lstStyle/>
+          <a:p>
+            <a:r>
+              <a:rPr lang="en-US" dirty="0"/>
+              <a:t>Java 8</a:t>
+            </a:r>
+          </a:p>
+        </p:txBody>
+      </p:sp>
+      <p:sp>
+        <p:nvSpPr>
+          <p:cNvPr id="3" name="Content Placeholder 2">
+            <a:extLst>
+              <a:ext uri="{FF2B5EF4-FFF2-40B4-BE49-F238E27FC236}">
+                <a16:creationId xmlns:a16="http://schemas.microsoft.com/office/drawing/2014/main" id="{D51ED6B6-95F4-AC4E-9563-D8520B9637B3}"/>
+              </a:ext>
+            </a:extLst>
+          </p:cNvPr>
+          <p:cNvSpPr>
+            <a:spLocks noGrp="1"/>
+          </p:cNvSpPr>
+          <p:nvPr>
+            <p:ph idx="1"/>
+          </p:nvPr>
+        </p:nvSpPr>
+        <p:spPr/>
+        <p:txBody>
+          <a:bodyPr/>
+          <a:lstStyle/>
+          <a:p>
+            <a:pPr marL="0" indent="0" algn="ctr">
+              <a:buNone/>
+            </a:pPr>
+            <a:r>
+              <a:rPr lang="en-US" dirty="0"/>
+              <a:t>The Java 8 release marks Java’s first foray into functional programming</a:t>
+            </a:r>
+          </a:p>
+        </p:txBody>
+      </p:sp>
+    </p:spTree>
+    <p:extLst>
+      <p:ext uri="{BB962C8B-B14F-4D97-AF65-F5344CB8AC3E}">
+        <p14:creationId xmlns:p14="http://schemas.microsoft.com/office/powerpoint/2010/main" val="722464877"/>
       </p:ext>
     </p:extLst>
   </p:cSld>
@@ -7255,7 +10100,54 @@
           <a:bodyPr/>
           <a:lstStyle/>
           <a:p>
-            <a:endParaRPr lang="en-US"/>
+            <a:pPr marL="0" indent="0">
+              <a:buNone/>
+            </a:pPr>
+            <a:r>
+              <a:rPr lang="en-US" sz="2800" dirty="0"/>
+              <a:t>Enhancements in a nutshell</a:t>
+            </a:r>
+          </a:p>
+          <a:p>
+            <a:r>
+              <a:rPr lang="en-US" dirty="0"/>
+              <a:t>Project Coin</a:t>
+            </a:r>
+          </a:p>
+          <a:p>
+            <a:r>
+              <a:rPr lang="en-US" dirty="0"/>
+              <a:t>Concurrency utilities</a:t>
+            </a:r>
+          </a:p>
+          <a:p>
+            <a:r>
+              <a:rPr lang="en-US" dirty="0"/>
+              <a:t>New File I/O library</a:t>
+            </a:r>
+          </a:p>
+          <a:p>
+            <a:r>
+              <a:rPr lang="en-US" dirty="0" err="1">
+                <a:latin typeface="Andale Mono" panose="020B0509000000000004" pitchFamily="49" charset="0"/>
+              </a:rPr>
+              <a:t>invokedynamic</a:t>
+            </a:r>
+            <a:endParaRPr lang="en-US" dirty="0">
+              <a:latin typeface="Andale Mono" panose="020B0509000000000004" pitchFamily="49" charset="0"/>
+            </a:endParaRPr>
+          </a:p>
+          <a:p>
+            <a:r>
+              <a:rPr lang="en-US" dirty="0"/>
+              <a:t>Elliptic curve cryptography</a:t>
+            </a:r>
+          </a:p>
+          <a:p>
+            <a:r>
+              <a:rPr lang="en-US" dirty="0"/>
+              <a:t>Various low-level enhancements (memory handling, graphics, etc.)</a:t>
+            </a:r>
           </a:p>
         </p:txBody>
       </p:sp>
@@ -7269,6 +10161,436 @@
   <p:clrMapOvr>
     <a:masterClrMapping/>
   </p:clrMapOvr>
+</p:sld>
+</file>
+
+<file path=ppt/slides/slide9.xml><?xml version="1.0" encoding="utf-8"?>
+<p:sld xmlns:a="http://schemas.openxmlformats.org/drawingml/2006/main" xmlns:r="http://schemas.openxmlformats.org/officeDocument/2006/relationships" xmlns:p="http://schemas.openxmlformats.org/presentationml/2006/main">
+  <p:cSld>
+    <p:spTree>
+      <p:nvGrpSpPr>
+        <p:cNvPr id="1" name=""/>
+        <p:cNvGrpSpPr/>
+        <p:nvPr/>
+      </p:nvGrpSpPr>
+      <p:grpSpPr>
+        <a:xfrm>
+          <a:off x="0" y="0"/>
+          <a:ext cx="0" cy="0"/>
+          <a:chOff x="0" y="0"/>
+          <a:chExt cx="0" cy="0"/>
+        </a:xfrm>
+      </p:grpSpPr>
+      <p:sp>
+        <p:nvSpPr>
+          <p:cNvPr id="2" name="Title 1">
+            <a:extLst>
+              <a:ext uri="{FF2B5EF4-FFF2-40B4-BE49-F238E27FC236}">
+                <a16:creationId xmlns:a16="http://schemas.microsoft.com/office/drawing/2014/main" id="{C2052CE5-F69A-D645-8ECD-5C44E4A30D5C}"/>
+              </a:ext>
+            </a:extLst>
+          </p:cNvPr>
+          <p:cNvSpPr>
+            <a:spLocks noGrp="1"/>
+          </p:cNvSpPr>
+          <p:nvPr>
+            <p:ph type="title"/>
+          </p:nvPr>
+        </p:nvSpPr>
+        <p:spPr/>
+        <p:txBody>
+          <a:bodyPr/>
+          <a:lstStyle/>
+          <a:p>
+            <a:r>
+              <a:rPr lang="en-US" dirty="0"/>
+              <a:t>Java 7</a:t>
+            </a:r>
+          </a:p>
+        </p:txBody>
+      </p:sp>
+      <p:sp>
+        <p:nvSpPr>
+          <p:cNvPr id="3" name="Content Placeholder 2">
+            <a:extLst>
+              <a:ext uri="{FF2B5EF4-FFF2-40B4-BE49-F238E27FC236}">
+                <a16:creationId xmlns:a16="http://schemas.microsoft.com/office/drawing/2014/main" id="{20ABE521-BF95-4441-82E2-23994761C137}"/>
+              </a:ext>
+            </a:extLst>
+          </p:cNvPr>
+          <p:cNvSpPr>
+            <a:spLocks noGrp="1"/>
+          </p:cNvSpPr>
+          <p:nvPr>
+            <p:ph sz="half" idx="1"/>
+          </p:nvPr>
+        </p:nvSpPr>
+        <p:spPr>
+          <a:xfrm>
+            <a:off x="685802" y="2142067"/>
+            <a:ext cx="3016403" cy="3649134"/>
+          </a:xfrm>
+        </p:spPr>
+        <p:txBody>
+          <a:bodyPr>
+            <a:normAutofit/>
+          </a:bodyPr>
+          <a:lstStyle/>
+          <a:p>
+            <a:pPr marL="0" indent="0">
+              <a:buNone/>
+            </a:pPr>
+            <a:r>
+              <a:rPr lang="en-US" sz="2800" dirty="0"/>
+              <a:t>Project Coin</a:t>
+            </a:r>
+          </a:p>
+        </p:txBody>
+      </p:sp>
+      <p:sp>
+        <p:nvSpPr>
+          <p:cNvPr id="4" name="Content Placeholder 3">
+            <a:extLst>
+              <a:ext uri="{FF2B5EF4-FFF2-40B4-BE49-F238E27FC236}">
+                <a16:creationId xmlns:a16="http://schemas.microsoft.com/office/drawing/2014/main" id="{26204FAF-26E7-1B46-B974-24DDC791B844}"/>
+              </a:ext>
+            </a:extLst>
+          </p:cNvPr>
+          <p:cNvSpPr>
+            <a:spLocks noGrp="1"/>
+          </p:cNvSpPr>
+          <p:nvPr>
+            <p:ph sz="half" idx="2"/>
+          </p:nvPr>
+        </p:nvSpPr>
+        <p:spPr>
+          <a:xfrm>
+            <a:off x="3914078" y="2142067"/>
+            <a:ext cx="6903149" cy="3649133"/>
+          </a:xfrm>
+        </p:spPr>
+        <p:txBody>
+          <a:bodyPr anchor="t">
+            <a:normAutofit/>
+          </a:bodyPr>
+          <a:lstStyle/>
+          <a:p>
+            <a:pPr marL="0" indent="0">
+              <a:buNone/>
+            </a:pPr>
+            <a:r>
+              <a:rPr lang="en-US" sz="2400" dirty="0"/>
+              <a:t>Strings in </a:t>
+            </a:r>
+            <a:r>
+              <a:rPr lang="en-US" sz="2400" dirty="0">
+                <a:latin typeface="Andale Mono" panose="020B0509000000000004" pitchFamily="49" charset="0"/>
+              </a:rPr>
+              <a:t>switch</a:t>
+            </a:r>
+            <a:r>
+              <a:rPr lang="en-US" sz="2400" dirty="0"/>
+              <a:t> statement</a:t>
+            </a:r>
+          </a:p>
+          <a:p>
+            <a:pPr marL="0" indent="0">
+              <a:buNone/>
+            </a:pPr>
+            <a:endParaRPr lang="en-US" sz="2400" dirty="0"/>
+          </a:p>
+          <a:p>
+            <a:pPr marL="0" indent="0">
+              <a:lnSpc>
+                <a:spcPct val="150000"/>
+              </a:lnSpc>
+              <a:buNone/>
+            </a:pPr>
+            <a:r>
+              <a:rPr lang="en-US" sz="2000" dirty="0"/>
+              <a:t>Use strings directly as the expression and case matches</a:t>
+            </a:r>
+          </a:p>
+          <a:p>
+            <a:pPr marL="0" indent="0">
+              <a:lnSpc>
+                <a:spcPct val="150000"/>
+              </a:lnSpc>
+              <a:buNone/>
+            </a:pPr>
+            <a:r>
+              <a:rPr lang="en-US" sz="2000" dirty="0"/>
+              <a:t>Strings will be compared using </a:t>
+            </a:r>
+            <a:r>
+              <a:rPr lang="en-US" sz="2000" dirty="0">
+                <a:latin typeface="Andale Mono" panose="020B0509000000000004" pitchFamily="49" charset="0"/>
+              </a:rPr>
+              <a:t>.equals()</a:t>
+            </a:r>
+          </a:p>
+          <a:p>
+            <a:pPr marL="0" indent="0">
+              <a:lnSpc>
+                <a:spcPct val="150000"/>
+              </a:lnSpc>
+              <a:buNone/>
+            </a:pPr>
+            <a:r>
+              <a:rPr lang="en-US" sz="2000" dirty="0"/>
+              <a:t>These are generally more efficient than if/then/else statements using strings</a:t>
+            </a:r>
+          </a:p>
+        </p:txBody>
+      </p:sp>
+    </p:spTree>
+    <p:extLst>
+      <p:ext uri="{BB962C8B-B14F-4D97-AF65-F5344CB8AC3E}">
+        <p14:creationId xmlns:p14="http://schemas.microsoft.com/office/powerpoint/2010/main" val="2759462308"/>
+      </p:ext>
+    </p:extLst>
+  </p:cSld>
+  <p:clrMapOvr>
+    <a:masterClrMapping/>
+  </p:clrMapOvr>
+  <p:timing>
+    <p:tnLst>
+      <p:par>
+        <p:cTn id="1" dur="indefinite" restart="never" nodeType="tmRoot">
+          <p:childTnLst>
+            <p:seq concurrent="1" nextAc="seek">
+              <p:cTn id="2" dur="indefinite" nodeType="mainSeq">
+                <p:childTnLst>
+                  <p:par>
+                    <p:cTn id="3" fill="hold">
+                      <p:stCondLst>
+                        <p:cond delay="indefinite"/>
+                        <p:cond evt="onBegin" delay="0">
+                          <p:tn val="2"/>
+                        </p:cond>
+                      </p:stCondLst>
+                      <p:childTnLst>
+                        <p:par>
+                          <p:cTn id="4" fill="hold">
+                            <p:stCondLst>
+                              <p:cond delay="0"/>
+                            </p:stCondLst>
+                            <p:childTnLst>
+                              <p:par>
+                                <p:cTn id="5" presetID="2" presetClass="entr" presetSubtype="4" fill="hold" nodeType="withEffect">
+                                  <p:stCondLst>
+                                    <p:cond delay="0"/>
+                                  </p:stCondLst>
+                                  <p:childTnLst>
+                                    <p:set>
+                                      <p:cBhvr>
+                                        <p:cTn id="6" dur="1" fill="hold">
+                                          <p:stCondLst>
+                                            <p:cond delay="0"/>
+                                          </p:stCondLst>
+                                        </p:cTn>
+                                        <p:tgtEl>
+                                          <p:spTgt spid="4">
+                                            <p:txEl>
+                                              <p:pRg st="0" end="0"/>
+                                            </p:txEl>
+                                          </p:spTgt>
+                                        </p:tgtEl>
+                                        <p:attrNameLst>
+                                          <p:attrName>style.visibility</p:attrName>
+                                        </p:attrNameLst>
+                                      </p:cBhvr>
+                                      <p:to>
+                                        <p:strVal val="visible"/>
+                                      </p:to>
+                                    </p:set>
+                                    <p:anim calcmode="lin" valueType="num">
+                                      <p:cBhvr additive="base">
+                                        <p:cTn id="7" dur="500" fill="hold"/>
+                                        <p:tgtEl>
+                                          <p:spTgt spid="4">
+                                            <p:txEl>
+                                              <p:pRg st="0" end="0"/>
+                                            </p:txEl>
+                                          </p:spTgt>
+                                        </p:tgtEl>
+                                        <p:attrNameLst>
+                                          <p:attrName>ppt_x</p:attrName>
+                                        </p:attrNameLst>
+                                      </p:cBhvr>
+                                      <p:tavLst>
+                                        <p:tav tm="0">
+                                          <p:val>
+                                            <p:strVal val="#ppt_x"/>
+                                          </p:val>
+                                        </p:tav>
+                                        <p:tav tm="100000">
+                                          <p:val>
+                                            <p:strVal val="#ppt_x"/>
+                                          </p:val>
+                                        </p:tav>
+                                      </p:tavLst>
+                                    </p:anim>
+                                    <p:anim calcmode="lin" valueType="num">
+                                      <p:cBhvr additive="base">
+                                        <p:cTn id="8" dur="500" fill="hold"/>
+                                        <p:tgtEl>
+                                          <p:spTgt spid="4">
+                                            <p:txEl>
+                                              <p:pRg st="0" end="0"/>
+                                            </p:txEl>
+                                          </p:spTgt>
+                                        </p:tgtEl>
+                                        <p:attrNameLst>
+                                          <p:attrName>ppt_y</p:attrName>
+                                        </p:attrNameLst>
+                                      </p:cBhvr>
+                                      <p:tavLst>
+                                        <p:tav tm="0">
+                                          <p:val>
+                                            <p:strVal val="1+#ppt_h/2"/>
+                                          </p:val>
+                                        </p:tav>
+                                        <p:tav tm="100000">
+                                          <p:val>
+                                            <p:strVal val="#ppt_y"/>
+                                          </p:val>
+                                        </p:tav>
+                                      </p:tavLst>
+                                    </p:anim>
+                                  </p:childTnLst>
+                                </p:cTn>
+                              </p:par>
+                            </p:childTnLst>
+                          </p:cTn>
+                        </p:par>
+                        <p:par>
+                          <p:cTn id="9" fill="hold">
+                            <p:stCondLst>
+                              <p:cond delay="500"/>
+                            </p:stCondLst>
+                            <p:childTnLst>
+                              <p:par>
+                                <p:cTn id="10" presetID="1" presetClass="entr" presetSubtype="0" fill="hold" nodeType="afterEffect">
+                                  <p:stCondLst>
+                                    <p:cond delay="0"/>
+                                  </p:stCondLst>
+                                  <p:childTnLst>
+                                    <p:set>
+                                      <p:cBhvr>
+                                        <p:cTn id="11" dur="1" fill="hold">
+                                          <p:stCondLst>
+                                            <p:cond delay="0"/>
+                                          </p:stCondLst>
+                                        </p:cTn>
+                                        <p:tgtEl>
+                                          <p:spTgt spid="4">
+                                            <p:txEl>
+                                              <p:pRg st="2" end="2"/>
+                                            </p:txEl>
+                                          </p:spTgt>
+                                        </p:tgtEl>
+                                        <p:attrNameLst>
+                                          <p:attrName>style.visibility</p:attrName>
+                                        </p:attrNameLst>
+                                      </p:cBhvr>
+                                      <p:to>
+                                        <p:strVal val="visible"/>
+                                      </p:to>
+                                    </p:set>
+                                  </p:childTnLst>
+                                </p:cTn>
+                              </p:par>
+                              <p:par>
+                                <p:cTn id="12" presetID="1" presetClass="entr" presetSubtype="0" fill="hold" nodeType="withEffect">
+                                  <p:stCondLst>
+                                    <p:cond delay="0"/>
+                                  </p:stCondLst>
+                                  <p:childTnLst>
+                                    <p:set>
+                                      <p:cBhvr>
+                                        <p:cTn id="13" dur="1" fill="hold">
+                                          <p:stCondLst>
+                                            <p:cond delay="0"/>
+                                          </p:stCondLst>
+                                        </p:cTn>
+                                        <p:tgtEl>
+                                          <p:spTgt spid="4">
+                                            <p:txEl>
+                                              <p:pRg st="3" end="3"/>
+                                            </p:txEl>
+                                          </p:spTgt>
+                                        </p:tgtEl>
+                                        <p:attrNameLst>
+                                          <p:attrName>style.visibility</p:attrName>
+                                        </p:attrNameLst>
+                                      </p:cBhvr>
+                                      <p:to>
+                                        <p:strVal val="visible"/>
+                                      </p:to>
+                                    </p:set>
+                                  </p:childTnLst>
+                                </p:cTn>
+                              </p:par>
+                              <p:par>
+                                <p:cTn id="14" presetID="1" presetClass="entr" presetSubtype="0" fill="hold" nodeType="withEffect">
+                                  <p:stCondLst>
+                                    <p:cond delay="0"/>
+                                  </p:stCondLst>
+                                  <p:childTnLst>
+                                    <p:set>
+                                      <p:cBhvr>
+                                        <p:cTn id="15" dur="1" fill="hold">
+                                          <p:stCondLst>
+                                            <p:cond delay="0"/>
+                                          </p:stCondLst>
+                                        </p:cTn>
+                                        <p:tgtEl>
+                                          <p:spTgt spid="4">
+                                            <p:txEl>
+                                              <p:pRg st="4" end="4"/>
+                                            </p:txEl>
+                                          </p:spTgt>
+                                        </p:tgtEl>
+                                        <p:attrNameLst>
+                                          <p:attrName>style.visibility</p:attrName>
+                                        </p:attrNameLst>
+                                      </p:cBhvr>
+                                      <p:to>
+                                        <p:strVal val="visible"/>
+                                      </p:to>
+                                    </p:set>
+                                  </p:childTnLst>
+                                </p:cTn>
+                              </p:par>
+                            </p:childTnLst>
+                          </p:cTn>
+                        </p:par>
+                      </p:childTnLst>
+                    </p:cTn>
+                  </p:par>
+                </p:childTnLst>
+              </p:cTn>
+              <p:prevCondLst>
+                <p:cond evt="onPrev" delay="0">
+                  <p:tgtEl>
+                    <p:sldTgt/>
+                  </p:tgtEl>
+                </p:cond>
+              </p:prevCondLst>
+              <p:nextCondLst>
+                <p:cond evt="onNext" delay="0">
+                  <p:tgtEl>
+                    <p:sldTgt/>
+                  </p:tgtEl>
+                </p:cond>
+              </p:nextCondLst>
+            </p:seq>
+          </p:childTnLst>
+        </p:cTn>
+      </p:par>
+    </p:tnLst>
+  </p:timing>
 </p:sld>
 </file>
 

</xml_diff>

<commit_message>
Presentation: Fixed copy/paste error
</commit_message>
<xml_diff>
--- a/Java 7 and 8.pptx
+++ b/Java 7 and 8.pptx
@@ -324,7 +324,7 @@
           <a:p>
             <a:fld id="{7139643C-5607-B049-9B5A-F7A87CB21215}" type="datetimeFigureOut">
               <a:rPr lang="en-US" smtClean="0"/>
-              <a:t>11/11/20</a:t>
+              <a:t>11/19/20</a:t>
             </a:fld>
             <a:endParaRPr lang="en-US"/>
           </a:p>
@@ -635,10 +635,7 @@
           <a:bodyPr/>
           <a:lstStyle/>
           <a:p>
-            <a:r>
-              <a:rPr lang="en-US" dirty="0"/>
-              <a:t>In addition to changing the development process of the platform, Oracle also started shifting how it is licensed and distributed. Basically, if you want a “free” JDK/JRE, you must go through some OpenJDK-derived build. However, other vendors are free to create their own supported builds, based on OpenJDK. So the lack of an official Oracle build does not preclude having a supported platform.</a:t>
-            </a:r>
+            <a:endParaRPr lang="en-US" dirty="0"/>
           </a:p>
         </p:txBody>
       </p:sp>
@@ -659,7 +656,7 @@
           <a:p>
             <a:fld id="{B74070AD-33A4-834F-B7FB-BE5272A61543}" type="slidenum">
               <a:rPr lang="en-US" smtClean="0"/>
-              <a:t>5</a:t>
+              <a:t>1</a:t>
             </a:fld>
             <a:endParaRPr lang="en-US"/>
           </a:p>
@@ -668,7 +665,7 @@
     </p:spTree>
     <p:extLst>
       <p:ext uri="{BB962C8B-B14F-4D97-AF65-F5344CB8AC3E}">
-        <p14:creationId xmlns:p14="http://schemas.microsoft.com/office/powerpoint/2010/main" val="3974302724"/>
+        <p14:creationId xmlns:p14="http://schemas.microsoft.com/office/powerpoint/2010/main" val="674579492"/>
       </p:ext>
     </p:extLst>
   </p:cSld>
@@ -722,18 +719,7 @@
           <a:bodyPr/>
           <a:lstStyle/>
           <a:p>
-            <a:r>
-              <a:rPr lang="en-US" dirty="0"/>
-              <a:t>The API strives to be simple, but date &amp; time handling is a complex topic. Be sure to read the </a:t>
-            </a:r>
-            <a:r>
-              <a:rPr lang="en-US" dirty="0" err="1"/>
-              <a:t>JavaDocs</a:t>
-            </a:r>
-            <a:r>
-              <a:rPr lang="en-US" dirty="0"/>
-              <a:t> to learn which classes are appropriate for a given situation.</a:t>
-            </a:r>
+            <a:endParaRPr lang="en-US" dirty="0"/>
           </a:p>
         </p:txBody>
       </p:sp>
@@ -754,7 +740,7 @@
           <a:p>
             <a:fld id="{B74070AD-33A4-834F-B7FB-BE5272A61543}" type="slidenum">
               <a:rPr lang="en-US" smtClean="0"/>
-              <a:t>36</a:t>
+              <a:t>30</a:t>
             </a:fld>
             <a:endParaRPr lang="en-US"/>
           </a:p>
@@ -763,7 +749,7 @@
     </p:spTree>
     <p:extLst>
       <p:ext uri="{BB962C8B-B14F-4D97-AF65-F5344CB8AC3E}">
-        <p14:creationId xmlns:p14="http://schemas.microsoft.com/office/powerpoint/2010/main" val="1211849264"/>
+        <p14:creationId xmlns:p14="http://schemas.microsoft.com/office/powerpoint/2010/main" val="3196493527"/>
       </p:ext>
     </p:extLst>
   </p:cSld>
@@ -819,7 +805,15 @@
           <a:p>
             <a:r>
               <a:rPr lang="en-US" dirty="0"/>
-              <a:t>Time zones &amp; offsets add significant complexity. They should be reserved for the “edges” of a system, such as for display to a user. Internal logic should stick to local dates &amp; times (or instants) if at all possible.</a:t>
+              <a:t>The API strives to be simple, but date &amp; time handling is a complex topic. Be sure to read the </a:t>
+            </a:r>
+            <a:r>
+              <a:rPr lang="en-US" dirty="0" err="1"/>
+              <a:t>JavaDocs</a:t>
+            </a:r>
+            <a:r>
+              <a:rPr lang="en-US" dirty="0"/>
+              <a:t> to learn which classes are appropriate for a given situation.</a:t>
             </a:r>
           </a:p>
         </p:txBody>
@@ -841,7 +835,7 @@
           <a:p>
             <a:fld id="{B74070AD-33A4-834F-B7FB-BE5272A61543}" type="slidenum">
               <a:rPr lang="en-US" smtClean="0"/>
-              <a:t>39</a:t>
+              <a:t>36</a:t>
             </a:fld>
             <a:endParaRPr lang="en-US"/>
           </a:p>
@@ -850,7 +844,7 @@
     </p:spTree>
     <p:extLst>
       <p:ext uri="{BB962C8B-B14F-4D97-AF65-F5344CB8AC3E}">
-        <p14:creationId xmlns:p14="http://schemas.microsoft.com/office/powerpoint/2010/main" val="671917555"/>
+        <p14:creationId xmlns:p14="http://schemas.microsoft.com/office/powerpoint/2010/main" val="1211849264"/>
       </p:ext>
     </p:extLst>
   </p:cSld>
@@ -904,7 +898,10 @@
           <a:bodyPr/>
           <a:lstStyle/>
           <a:p>
-            <a:endParaRPr lang="en-US" dirty="0"/>
+            <a:r>
+              <a:rPr lang="en-US" dirty="0"/>
+              <a:t>Time zones &amp; offsets add significant complexity. They should be reserved for the “edges” of a system, such as for display to a user. Internal logic should stick to local dates &amp; times (or instants) if at all possible.</a:t>
+            </a:r>
           </a:p>
         </p:txBody>
       </p:sp>
@@ -925,7 +922,7 @@
           <a:p>
             <a:fld id="{B74070AD-33A4-834F-B7FB-BE5272A61543}" type="slidenum">
               <a:rPr lang="en-US" smtClean="0"/>
-              <a:t>40</a:t>
+              <a:t>39</a:t>
             </a:fld>
             <a:endParaRPr lang="en-US"/>
           </a:p>
@@ -934,7 +931,7 @@
     </p:spTree>
     <p:extLst>
       <p:ext uri="{BB962C8B-B14F-4D97-AF65-F5344CB8AC3E}">
-        <p14:creationId xmlns:p14="http://schemas.microsoft.com/office/powerpoint/2010/main" val="299147760"/>
+        <p14:creationId xmlns:p14="http://schemas.microsoft.com/office/powerpoint/2010/main" val="671917555"/>
       </p:ext>
     </p:extLst>
   </p:cSld>
@@ -1009,7 +1006,7 @@
           <a:p>
             <a:fld id="{B74070AD-33A4-834F-B7FB-BE5272A61543}" type="slidenum">
               <a:rPr lang="en-US" smtClean="0"/>
-              <a:t>41</a:t>
+              <a:t>40</a:t>
             </a:fld>
             <a:endParaRPr lang="en-US"/>
           </a:p>
@@ -1018,7 +1015,7 @@
     </p:spTree>
     <p:extLst>
       <p:ext uri="{BB962C8B-B14F-4D97-AF65-F5344CB8AC3E}">
-        <p14:creationId xmlns:p14="http://schemas.microsoft.com/office/powerpoint/2010/main" val="1891520342"/>
+        <p14:creationId xmlns:p14="http://schemas.microsoft.com/office/powerpoint/2010/main" val="299147760"/>
       </p:ext>
     </p:extLst>
   </p:cSld>
@@ -1093,7 +1090,7 @@
           <a:p>
             <a:fld id="{B74070AD-33A4-834F-B7FB-BE5272A61543}" type="slidenum">
               <a:rPr lang="en-US" smtClean="0"/>
-              <a:t>43</a:t>
+              <a:t>41</a:t>
             </a:fld>
             <a:endParaRPr lang="en-US"/>
           </a:p>
@@ -1102,7 +1099,7 @@
     </p:spTree>
     <p:extLst>
       <p:ext uri="{BB962C8B-B14F-4D97-AF65-F5344CB8AC3E}">
-        <p14:creationId xmlns:p14="http://schemas.microsoft.com/office/powerpoint/2010/main" val="1413216110"/>
+        <p14:creationId xmlns:p14="http://schemas.microsoft.com/office/powerpoint/2010/main" val="1891520342"/>
       </p:ext>
     </p:extLst>
   </p:cSld>
@@ -1177,7 +1174,7 @@
           <a:p>
             <a:fld id="{B74070AD-33A4-834F-B7FB-BE5272A61543}" type="slidenum">
               <a:rPr lang="en-US" smtClean="0"/>
-              <a:t>44</a:t>
+              <a:t>43</a:t>
             </a:fld>
             <a:endParaRPr lang="en-US"/>
           </a:p>
@@ -1186,7 +1183,7 @@
     </p:spTree>
     <p:extLst>
       <p:ext uri="{BB962C8B-B14F-4D97-AF65-F5344CB8AC3E}">
-        <p14:creationId xmlns:p14="http://schemas.microsoft.com/office/powerpoint/2010/main" val="715828447"/>
+        <p14:creationId xmlns:p14="http://schemas.microsoft.com/office/powerpoint/2010/main" val="1413216110"/>
       </p:ext>
     </p:extLst>
   </p:cSld>
@@ -1261,7 +1258,7 @@
           <a:p>
             <a:fld id="{B74070AD-33A4-834F-B7FB-BE5272A61543}" type="slidenum">
               <a:rPr lang="en-US" smtClean="0"/>
-              <a:t>45</a:t>
+              <a:t>44</a:t>
             </a:fld>
             <a:endParaRPr lang="en-US"/>
           </a:p>
@@ -1270,7 +1267,7 @@
     </p:spTree>
     <p:extLst>
       <p:ext uri="{BB962C8B-B14F-4D97-AF65-F5344CB8AC3E}">
-        <p14:creationId xmlns:p14="http://schemas.microsoft.com/office/powerpoint/2010/main" val="935683614"/>
+        <p14:creationId xmlns:p14="http://schemas.microsoft.com/office/powerpoint/2010/main" val="715828447"/>
       </p:ext>
     </p:extLst>
   </p:cSld>
@@ -1345,7 +1342,7 @@
           <a:p>
             <a:fld id="{B74070AD-33A4-834F-B7FB-BE5272A61543}" type="slidenum">
               <a:rPr lang="en-US" smtClean="0"/>
-              <a:t>46</a:t>
+              <a:t>45</a:t>
             </a:fld>
             <a:endParaRPr lang="en-US"/>
           </a:p>
@@ -1354,7 +1351,7 @@
     </p:spTree>
     <p:extLst>
       <p:ext uri="{BB962C8B-B14F-4D97-AF65-F5344CB8AC3E}">
-        <p14:creationId xmlns:p14="http://schemas.microsoft.com/office/powerpoint/2010/main" val="2385043682"/>
+        <p14:creationId xmlns:p14="http://schemas.microsoft.com/office/powerpoint/2010/main" val="935683614"/>
       </p:ext>
     </p:extLst>
   </p:cSld>
@@ -1429,7 +1426,7 @@
           <a:p>
             <a:fld id="{B74070AD-33A4-834F-B7FB-BE5272A61543}" type="slidenum">
               <a:rPr lang="en-US" smtClean="0"/>
-              <a:t>47</a:t>
+              <a:t>46</a:t>
             </a:fld>
             <a:endParaRPr lang="en-US"/>
           </a:p>
@@ -1438,7 +1435,7 @@
     </p:spTree>
     <p:extLst>
       <p:ext uri="{BB962C8B-B14F-4D97-AF65-F5344CB8AC3E}">
-        <p14:creationId xmlns:p14="http://schemas.microsoft.com/office/powerpoint/2010/main" val="227805187"/>
+        <p14:creationId xmlns:p14="http://schemas.microsoft.com/office/powerpoint/2010/main" val="2385043682"/>
       </p:ext>
     </p:extLst>
   </p:cSld>
@@ -1513,7 +1510,7 @@
           <a:p>
             <a:fld id="{B74070AD-33A4-834F-B7FB-BE5272A61543}" type="slidenum">
               <a:rPr lang="en-US" smtClean="0"/>
-              <a:t>48</a:t>
+              <a:t>47</a:t>
             </a:fld>
             <a:endParaRPr lang="en-US"/>
           </a:p>
@@ -1522,7 +1519,7 @@
     </p:spTree>
     <p:extLst>
       <p:ext uri="{BB962C8B-B14F-4D97-AF65-F5344CB8AC3E}">
-        <p14:creationId xmlns:p14="http://schemas.microsoft.com/office/powerpoint/2010/main" val="2804000444"/>
+        <p14:creationId xmlns:p14="http://schemas.microsoft.com/office/powerpoint/2010/main" val="227805187"/>
       </p:ext>
     </p:extLst>
   </p:cSld>
@@ -1577,20 +1574,8 @@
           <a:lstStyle/>
           <a:p>
             <a:r>
-              <a:rPr lang="en-US" dirty="0" err="1"/>
-              <a:t>GraalVM’s</a:t>
-            </a:r>
-            <a:r>
               <a:rPr lang="en-US" dirty="0"/>
-              <a:t> a much bigger beast than just an OpenJDK distribution. We’ll have a full session covering </a:t>
-            </a:r>
-            <a:r>
-              <a:rPr lang="en-US" dirty="0" err="1"/>
-              <a:t>GraalVM</a:t>
-            </a:r>
-            <a:r>
-              <a:rPr lang="en-US" dirty="0"/>
-              <a:t> in the future.</a:t>
+              <a:t>In addition to changing the development process of the platform, Oracle also started shifting how it is licensed and distributed. Basically, if you want a “free” JDK/JRE, you must go through some OpenJDK-derived build. However, other vendors are free to create their own supported builds, based on OpenJDK. So the lack of an official Oracle build does not preclude having a supported platform.</a:t>
             </a:r>
           </a:p>
         </p:txBody>
@@ -1612,7 +1597,7 @@
           <a:p>
             <a:fld id="{B74070AD-33A4-834F-B7FB-BE5272A61543}" type="slidenum">
               <a:rPr lang="en-US" smtClean="0"/>
-              <a:t>6</a:t>
+              <a:t>5</a:t>
             </a:fld>
             <a:endParaRPr lang="en-US"/>
           </a:p>
@@ -1621,7 +1606,7 @@
     </p:spTree>
     <p:extLst>
       <p:ext uri="{BB962C8B-B14F-4D97-AF65-F5344CB8AC3E}">
-        <p14:creationId xmlns:p14="http://schemas.microsoft.com/office/powerpoint/2010/main" val="75597334"/>
+        <p14:creationId xmlns:p14="http://schemas.microsoft.com/office/powerpoint/2010/main" val="3974302724"/>
       </p:ext>
     </p:extLst>
   </p:cSld>
@@ -1696,6 +1681,90 @@
           <a:p>
             <a:fld id="{B74070AD-33A4-834F-B7FB-BE5272A61543}" type="slidenum">
               <a:rPr lang="en-US" smtClean="0"/>
+              <a:t>48</a:t>
+            </a:fld>
+            <a:endParaRPr lang="en-US"/>
+          </a:p>
+        </p:txBody>
+      </p:sp>
+    </p:spTree>
+    <p:extLst>
+      <p:ext uri="{BB962C8B-B14F-4D97-AF65-F5344CB8AC3E}">
+        <p14:creationId xmlns:p14="http://schemas.microsoft.com/office/powerpoint/2010/main" val="2804000444"/>
+      </p:ext>
+    </p:extLst>
+  </p:cSld>
+  <p:clrMapOvr>
+    <a:masterClrMapping/>
+  </p:clrMapOvr>
+</p:notes>
+</file>
+
+<file path=ppt/notesSlides/notesSlide21.xml><?xml version="1.0" encoding="utf-8"?>
+<p:notes xmlns:a="http://schemas.openxmlformats.org/drawingml/2006/main" xmlns:r="http://schemas.openxmlformats.org/officeDocument/2006/relationships" xmlns:p="http://schemas.openxmlformats.org/presentationml/2006/main">
+  <p:cSld>
+    <p:spTree>
+      <p:nvGrpSpPr>
+        <p:cNvPr id="1" name=""/>
+        <p:cNvGrpSpPr/>
+        <p:nvPr/>
+      </p:nvGrpSpPr>
+      <p:grpSpPr>
+        <a:xfrm>
+          <a:off x="0" y="0"/>
+          <a:ext cx="0" cy="0"/>
+          <a:chOff x="0" y="0"/>
+          <a:chExt cx="0" cy="0"/>
+        </a:xfrm>
+      </p:grpSpPr>
+      <p:sp>
+        <p:nvSpPr>
+          <p:cNvPr id="2" name="Slide Image Placeholder 1"/>
+          <p:cNvSpPr>
+            <a:spLocks noGrp="1" noRot="1" noChangeAspect="1"/>
+          </p:cNvSpPr>
+          <p:nvPr>
+            <p:ph type="sldImg"/>
+          </p:nvPr>
+        </p:nvSpPr>
+        <p:spPr/>
+      </p:sp>
+      <p:sp>
+        <p:nvSpPr>
+          <p:cNvPr id="3" name="Notes Placeholder 2"/>
+          <p:cNvSpPr>
+            <a:spLocks noGrp="1"/>
+          </p:cNvSpPr>
+          <p:nvPr>
+            <p:ph type="body" idx="1"/>
+          </p:nvPr>
+        </p:nvSpPr>
+        <p:spPr/>
+        <p:txBody>
+          <a:bodyPr/>
+          <a:lstStyle/>
+          <a:p>
+            <a:endParaRPr lang="en-US" dirty="0"/>
+          </a:p>
+        </p:txBody>
+      </p:sp>
+      <p:sp>
+        <p:nvSpPr>
+          <p:cNvPr id="4" name="Slide Number Placeholder 3"/>
+          <p:cNvSpPr>
+            <a:spLocks noGrp="1"/>
+          </p:cNvSpPr>
+          <p:nvPr>
+            <p:ph type="sldNum" sz="quarter" idx="5"/>
+          </p:nvPr>
+        </p:nvSpPr>
+        <p:spPr/>
+        <p:txBody>
+          <a:bodyPr/>
+          <a:lstStyle/>
+          <a:p>
+            <a:fld id="{B74070AD-33A4-834F-B7FB-BE5272A61543}" type="slidenum">
+              <a:rPr lang="en-US" smtClean="0"/>
               <a:t>49</a:t>
             </a:fld>
             <a:endParaRPr lang="en-US"/>
@@ -1715,7 +1784,7 @@
 </p:notes>
 </file>
 
-<file path=ppt/notesSlides/notesSlide21.xml><?xml version="1.0" encoding="utf-8"?>
+<file path=ppt/notesSlides/notesSlide22.xml><?xml version="1.0" encoding="utf-8"?>
 <p:notes xmlns:a="http://schemas.openxmlformats.org/drawingml/2006/main" xmlns:r="http://schemas.openxmlformats.org/officeDocument/2006/relationships" xmlns:p="http://schemas.openxmlformats.org/presentationml/2006/main">
   <p:cSld>
     <p:spTree>
@@ -1845,29 +1914,20 @@
           <a:p>
             <a:r>
               <a:rPr lang="en-US" dirty="0" err="1"/>
-              <a:t>invokedynamic</a:t>
+              <a:t>GraalVM’s</a:t>
             </a:r>
             <a:r>
               <a:rPr lang="en-US" dirty="0"/>
-              <a:t> </a:t>
-            </a:r>
-            <a:r>
-              <a:rPr lang="en-US" i="1" dirty="0"/>
-              <a:t>might</a:t>
-            </a:r>
-            <a:r>
-              <a:rPr lang="en-US" i="0" dirty="0"/>
-              <a:t> be the first new bytecode instruction added to the JVM since version 1.0. It was added for both dynamic languages, like Groovy &amp; </a:t>
-            </a:r>
-            <a:r>
-              <a:rPr lang="en-US" i="0" dirty="0" err="1"/>
-              <a:t>JRuby</a:t>
-            </a:r>
-            <a:r>
-              <a:rPr lang="en-US" i="0" dirty="0"/>
-              <a:t>, and laid the groundwork for lambdas in Java 8.</a:t>
-            </a:r>
-            <a:endParaRPr lang="en-US" dirty="0"/>
+              <a:t> a much bigger beast than just an OpenJDK distribution. We’ll have a full session covering </a:t>
+            </a:r>
+            <a:r>
+              <a:rPr lang="en-US" dirty="0" err="1"/>
+              <a:t>GraalVM</a:t>
+            </a:r>
+            <a:r>
+              <a:rPr lang="en-US" dirty="0"/>
+              <a:t> in the future.</a:t>
+            </a:r>
           </a:p>
         </p:txBody>
       </p:sp>
@@ -1888,7 +1948,7 @@
           <a:p>
             <a:fld id="{B74070AD-33A4-834F-B7FB-BE5272A61543}" type="slidenum">
               <a:rPr lang="en-US" smtClean="0"/>
-              <a:t>8</a:t>
+              <a:t>6</a:t>
             </a:fld>
             <a:endParaRPr lang="en-US"/>
           </a:p>
@@ -1897,7 +1957,7 @@
     </p:spTree>
     <p:extLst>
       <p:ext uri="{BB962C8B-B14F-4D97-AF65-F5344CB8AC3E}">
-        <p14:creationId xmlns:p14="http://schemas.microsoft.com/office/powerpoint/2010/main" val="3709810433"/>
+        <p14:creationId xmlns:p14="http://schemas.microsoft.com/office/powerpoint/2010/main" val="75597334"/>
       </p:ext>
     </p:extLst>
   </p:cSld>
@@ -1952,9 +2012,30 @@
           <a:lstStyle/>
           <a:p>
             <a:r>
+              <a:rPr lang="en-US" dirty="0" err="1"/>
+              <a:t>invokedynamic</a:t>
+            </a:r>
+            <a:r>
               <a:rPr lang="en-US" dirty="0"/>
-              <a:t>Lambdas were probably the most important enhancement to Java since generics in Java 1.5</a:t>
-            </a:r>
+              <a:t> </a:t>
+            </a:r>
+            <a:r>
+              <a:rPr lang="en-US" i="1" dirty="0"/>
+              <a:t>might</a:t>
+            </a:r>
+            <a:r>
+              <a:rPr lang="en-US" i="0" dirty="0"/>
+              <a:t> be the first new bytecode instruction added to the JVM since version 1.0. It was added for both dynamic languages, like Groovy &amp; </a:t>
+            </a:r>
+            <a:r>
+              <a:rPr lang="en-US" i="0" dirty="0" err="1"/>
+              <a:t>JRuby</a:t>
+            </a:r>
+            <a:r>
+              <a:rPr lang="en-US" i="0" dirty="0"/>
+              <a:t>, and laid the groundwork for lambdas in Java 8.</a:t>
+            </a:r>
+            <a:endParaRPr lang="en-US" dirty="0"/>
           </a:p>
         </p:txBody>
       </p:sp>
@@ -1975,7 +2056,7 @@
           <a:p>
             <a:fld id="{B74070AD-33A4-834F-B7FB-BE5272A61543}" type="slidenum">
               <a:rPr lang="en-US" smtClean="0"/>
-              <a:t>23</a:t>
+              <a:t>8</a:t>
             </a:fld>
             <a:endParaRPr lang="en-US"/>
           </a:p>
@@ -1984,7 +2065,7 @@
     </p:spTree>
     <p:extLst>
       <p:ext uri="{BB962C8B-B14F-4D97-AF65-F5344CB8AC3E}">
-        <p14:creationId xmlns:p14="http://schemas.microsoft.com/office/powerpoint/2010/main" val="1315247894"/>
+        <p14:creationId xmlns:p14="http://schemas.microsoft.com/office/powerpoint/2010/main" val="3709810433"/>
       </p:ext>
     </p:extLst>
   </p:cSld>
@@ -2038,7 +2119,10 @@
           <a:bodyPr/>
           <a:lstStyle/>
           <a:p>
-            <a:endParaRPr lang="en-US" dirty="0"/>
+            <a:r>
+              <a:rPr lang="en-US" dirty="0"/>
+              <a:t>Lambdas were probably the most important enhancement to Java since generics in Java 1.5</a:t>
+            </a:r>
           </a:p>
         </p:txBody>
       </p:sp>
@@ -2059,7 +2143,7 @@
           <a:p>
             <a:fld id="{B74070AD-33A4-834F-B7FB-BE5272A61543}" type="slidenum">
               <a:rPr lang="en-US" smtClean="0"/>
-              <a:t>25</a:t>
+              <a:t>23</a:t>
             </a:fld>
             <a:endParaRPr lang="en-US"/>
           </a:p>
@@ -2068,7 +2152,7 @@
     </p:spTree>
     <p:extLst>
       <p:ext uri="{BB962C8B-B14F-4D97-AF65-F5344CB8AC3E}">
-        <p14:creationId xmlns:p14="http://schemas.microsoft.com/office/powerpoint/2010/main" val="3480453347"/>
+        <p14:creationId xmlns:p14="http://schemas.microsoft.com/office/powerpoint/2010/main" val="1315247894"/>
       </p:ext>
     </p:extLst>
   </p:cSld>
@@ -2122,10 +2206,7 @@
           <a:bodyPr/>
           <a:lstStyle/>
           <a:p>
-            <a:r>
-              <a:rPr lang="en-US" dirty="0"/>
-              <a:t>There are 4 kinds of method references: constructor, static method, instance method of a type, instance method of a specific object.</a:t>
-            </a:r>
+            <a:endParaRPr lang="en-US" dirty="0"/>
           </a:p>
         </p:txBody>
       </p:sp>
@@ -2146,7 +2227,7 @@
           <a:p>
             <a:fld id="{B74070AD-33A4-834F-B7FB-BE5272A61543}" type="slidenum">
               <a:rPr lang="en-US" smtClean="0"/>
-              <a:t>27</a:t>
+              <a:t>25</a:t>
             </a:fld>
             <a:endParaRPr lang="en-US"/>
           </a:p>
@@ -2155,7 +2236,7 @@
     </p:spTree>
     <p:extLst>
       <p:ext uri="{BB962C8B-B14F-4D97-AF65-F5344CB8AC3E}">
-        <p14:creationId xmlns:p14="http://schemas.microsoft.com/office/powerpoint/2010/main" val="4110552658"/>
+        <p14:creationId xmlns:p14="http://schemas.microsoft.com/office/powerpoint/2010/main" val="3480453347"/>
       </p:ext>
     </p:extLst>
   </p:cSld>
@@ -2209,7 +2290,10 @@
           <a:bodyPr/>
           <a:lstStyle/>
           <a:p>
-            <a:endParaRPr lang="en-US" dirty="0"/>
+            <a:r>
+              <a:rPr lang="en-US" dirty="0"/>
+              <a:t>There are 4 kinds of method references: constructor, static method, instance method of a type, instance method of a specific object.</a:t>
+            </a:r>
           </a:p>
         </p:txBody>
       </p:sp>
@@ -2230,7 +2314,7 @@
           <a:p>
             <a:fld id="{B74070AD-33A4-834F-B7FB-BE5272A61543}" type="slidenum">
               <a:rPr lang="en-US" smtClean="0"/>
-              <a:t>28</a:t>
+              <a:t>27</a:t>
             </a:fld>
             <a:endParaRPr lang="en-US"/>
           </a:p>
@@ -2239,7 +2323,7 @@
     </p:spTree>
     <p:extLst>
       <p:ext uri="{BB962C8B-B14F-4D97-AF65-F5344CB8AC3E}">
-        <p14:creationId xmlns:p14="http://schemas.microsoft.com/office/powerpoint/2010/main" val="1190935246"/>
+        <p14:creationId xmlns:p14="http://schemas.microsoft.com/office/powerpoint/2010/main" val="4110552658"/>
       </p:ext>
     </p:extLst>
   </p:cSld>
@@ -2314,7 +2398,7 @@
           <a:p>
             <a:fld id="{B74070AD-33A4-834F-B7FB-BE5272A61543}" type="slidenum">
               <a:rPr lang="en-US" smtClean="0"/>
-              <a:t>29</a:t>
+              <a:t>28</a:t>
             </a:fld>
             <a:endParaRPr lang="en-US"/>
           </a:p>
@@ -2323,7 +2407,7 @@
     </p:spTree>
     <p:extLst>
       <p:ext uri="{BB962C8B-B14F-4D97-AF65-F5344CB8AC3E}">
-        <p14:creationId xmlns:p14="http://schemas.microsoft.com/office/powerpoint/2010/main" val="3717712459"/>
+        <p14:creationId xmlns:p14="http://schemas.microsoft.com/office/powerpoint/2010/main" val="1190935246"/>
       </p:ext>
     </p:extLst>
   </p:cSld>
@@ -2398,7 +2482,7 @@
           <a:p>
             <a:fld id="{B74070AD-33A4-834F-B7FB-BE5272A61543}" type="slidenum">
               <a:rPr lang="en-US" smtClean="0"/>
-              <a:t>30</a:t>
+              <a:t>29</a:t>
             </a:fld>
             <a:endParaRPr lang="en-US"/>
           </a:p>
@@ -2407,7 +2491,7 @@
     </p:spTree>
     <p:extLst>
       <p:ext uri="{BB962C8B-B14F-4D97-AF65-F5344CB8AC3E}">
-        <p14:creationId xmlns:p14="http://schemas.microsoft.com/office/powerpoint/2010/main" val="3196493527"/>
+        <p14:creationId xmlns:p14="http://schemas.microsoft.com/office/powerpoint/2010/main" val="3717712459"/>
       </p:ext>
     </p:extLst>
   </p:cSld>
@@ -2647,7 +2731,7 @@
             <a:fld id="{B61BEF0D-F0BB-DE4B-95CE-6DB70DBA9567}" type="datetimeFigureOut">
               <a:rPr lang="en-US" dirty="0"/>
               <a:pPr/>
-              <a:t>11/11/20</a:t>
+              <a:t>11/19/20</a:t>
             </a:fld>
             <a:endParaRPr lang="en-US" dirty="0"/>
           </a:p>
@@ -2978,7 +3062,7 @@
             <a:fld id="{B61BEF0D-F0BB-DE4B-95CE-6DB70DBA9567}" type="datetimeFigureOut">
               <a:rPr lang="en-US" dirty="0"/>
               <a:pPr/>
-              <a:t>11/11/20</a:t>
+              <a:t>11/19/20</a:t>
             </a:fld>
             <a:endParaRPr lang="en-US" dirty="0"/>
           </a:p>
@@ -3253,7 +3337,7 @@
             <a:fld id="{B61BEF0D-F0BB-DE4B-95CE-6DB70DBA9567}" type="datetimeFigureOut">
               <a:rPr lang="en-US" dirty="0"/>
               <a:pPr/>
-              <a:t>11/11/20</a:t>
+              <a:t>11/19/20</a:t>
             </a:fld>
             <a:endParaRPr lang="en-US" dirty="0"/>
           </a:p>
@@ -3818,7 +3902,7 @@
             <a:fld id="{B61BEF0D-F0BB-DE4B-95CE-6DB70DBA9567}" type="datetimeFigureOut">
               <a:rPr lang="en-US" dirty="0"/>
               <a:pPr/>
-              <a:t>11/11/20</a:t>
+              <a:t>11/19/20</a:t>
             </a:fld>
             <a:endParaRPr lang="en-US" dirty="0"/>
           </a:p>
@@ -4093,7 +4177,7 @@
             <a:fld id="{B61BEF0D-F0BB-DE4B-95CE-6DB70DBA9567}" type="datetimeFigureOut">
               <a:rPr lang="en-US" dirty="0"/>
               <a:pPr/>
-              <a:t>11/11/20</a:t>
+              <a:t>11/19/20</a:t>
             </a:fld>
             <a:endParaRPr lang="en-US" dirty="0"/>
           </a:p>
@@ -4652,7 +4736,7 @@
             <a:fld id="{B61BEF0D-F0BB-DE4B-95CE-6DB70DBA9567}" type="datetimeFigureOut">
               <a:rPr lang="en-US" dirty="0"/>
               <a:pPr/>
-              <a:t>11/11/20</a:t>
+              <a:t>11/19/20</a:t>
             </a:fld>
             <a:endParaRPr lang="en-US" dirty="0"/>
           </a:p>
@@ -4976,7 +5060,7 @@
             <a:fld id="{B61BEF0D-F0BB-DE4B-95CE-6DB70DBA9567}" type="datetimeFigureOut">
               <a:rPr lang="en-US" dirty="0"/>
               <a:pPr/>
-              <a:t>11/11/20</a:t>
+              <a:t>11/19/20</a:t>
             </a:fld>
             <a:endParaRPr lang="en-US" dirty="0"/>
           </a:p>
@@ -5150,7 +5234,7 @@
             <a:fld id="{B61BEF0D-F0BB-DE4B-95CE-6DB70DBA9567}" type="datetimeFigureOut">
               <a:rPr lang="en-US" dirty="0"/>
               <a:pPr/>
-              <a:t>11/11/20</a:t>
+              <a:t>11/19/20</a:t>
             </a:fld>
             <a:endParaRPr lang="en-US" dirty="0"/>
           </a:p>
@@ -5385,7 +5469,7 @@
             <a:fld id="{B61BEF0D-F0BB-DE4B-95CE-6DB70DBA9567}" type="datetimeFigureOut">
               <a:rPr lang="en-US" dirty="0"/>
               <a:pPr/>
-              <a:t>11/11/20</a:t>
+              <a:t>11/19/20</a:t>
             </a:fld>
             <a:endParaRPr lang="en-US" dirty="0"/>
           </a:p>
@@ -5582,7 +5666,7 @@
             <a:fld id="{B61BEF0D-F0BB-DE4B-95CE-6DB70DBA9567}" type="datetimeFigureOut">
               <a:rPr lang="en-US" dirty="0"/>
               <a:pPr/>
-              <a:t>11/11/20</a:t>
+              <a:t>11/19/20</a:t>
             </a:fld>
             <a:endParaRPr lang="en-US" dirty="0"/>
           </a:p>
@@ -5855,7 +5939,7 @@
             <a:fld id="{B61BEF0D-F0BB-DE4B-95CE-6DB70DBA9567}" type="datetimeFigureOut">
               <a:rPr lang="en-US" dirty="0"/>
               <a:pPr/>
-              <a:t>11/11/20</a:t>
+              <a:t>11/19/20</a:t>
             </a:fld>
             <a:endParaRPr lang="en-US" dirty="0"/>
           </a:p>
@@ -6118,7 +6202,7 @@
             <a:fld id="{B61BEF0D-F0BB-DE4B-95CE-6DB70DBA9567}" type="datetimeFigureOut">
               <a:rPr lang="en-US" dirty="0"/>
               <a:pPr/>
-              <a:t>11/11/20</a:t>
+              <a:t>11/19/20</a:t>
             </a:fld>
             <a:endParaRPr lang="en-US" dirty="0"/>
           </a:p>
@@ -6489,7 +6573,7 @@
             <a:fld id="{B61BEF0D-F0BB-DE4B-95CE-6DB70DBA9567}" type="datetimeFigureOut">
               <a:rPr lang="en-US" dirty="0"/>
               <a:pPr/>
-              <a:t>11/11/20</a:t>
+              <a:t>11/19/20</a:t>
             </a:fld>
             <a:endParaRPr lang="en-US" dirty="0"/>
           </a:p>
@@ -6634,7 +6718,7 @@
             <a:fld id="{B61BEF0D-F0BB-DE4B-95CE-6DB70DBA9567}" type="datetimeFigureOut">
               <a:rPr lang="en-US" dirty="0"/>
               <a:pPr/>
-              <a:t>11/11/20</a:t>
+              <a:t>11/19/20</a:t>
             </a:fld>
             <a:endParaRPr lang="en-US" dirty="0"/>
           </a:p>
@@ -6756,7 +6840,7 @@
             <a:fld id="{B61BEF0D-F0BB-DE4B-95CE-6DB70DBA9567}" type="datetimeFigureOut">
               <a:rPr lang="en-US" dirty="0"/>
               <a:pPr/>
-              <a:t>11/11/20</a:t>
+              <a:t>11/19/20</a:t>
             </a:fld>
             <a:endParaRPr lang="en-US" dirty="0"/>
           </a:p>
@@ -7038,7 +7122,7 @@
             <a:fld id="{B61BEF0D-F0BB-DE4B-95CE-6DB70DBA9567}" type="datetimeFigureOut">
               <a:rPr lang="en-US" dirty="0"/>
               <a:pPr/>
-              <a:t>11/11/20</a:t>
+              <a:t>11/19/20</a:t>
             </a:fld>
             <a:endParaRPr lang="en-US" dirty="0"/>
           </a:p>
@@ -7359,7 +7443,7 @@
             <a:fld id="{B61BEF0D-F0BB-DE4B-95CE-6DB70DBA9567}" type="datetimeFigureOut">
               <a:rPr lang="en-US" dirty="0"/>
               <a:pPr/>
-              <a:t>11/11/20</a:t>
+              <a:t>11/19/20</a:t>
             </a:fld>
             <a:endParaRPr lang="en-US" dirty="0"/>
           </a:p>
@@ -7570,7 +7654,7 @@
             <a:fld id="{B61BEF0D-F0BB-DE4B-95CE-6DB70DBA9567}" type="datetimeFigureOut">
               <a:rPr lang="en-US" dirty="0"/>
               <a:pPr/>
-              <a:t>11/11/20</a:t>
+              <a:t>11/19/20</a:t>
             </a:fld>
             <a:endParaRPr lang="en-US" dirty="0"/>
           </a:p>
@@ -10142,55 +10226,6 @@
               <a:latin typeface="Andale Mono" panose="020B0509000000000004" pitchFamily="49" charset="0"/>
             </a:endParaRPr>
           </a:p>
-          <a:p>
-            <a:pPr marL="0" indent="0">
-              <a:lnSpc>
-                <a:spcPct val="150000"/>
-              </a:lnSpc>
-              <a:buNone/>
-            </a:pPr>
-            <a:r>
-              <a:rPr lang="en-US" sz="2000" dirty="0"/>
-              <a:t>Automatically closed right before any </a:t>
-            </a:r>
-            <a:r>
-              <a:rPr lang="en-US" sz="2000" dirty="0">
-                <a:latin typeface="Andale Mono" panose="020B0509000000000004" pitchFamily="49" charset="0"/>
-              </a:rPr>
-              <a:t>catch</a:t>
-            </a:r>
-            <a:r>
-              <a:rPr lang="en-US" sz="2000" dirty="0"/>
-              <a:t> or </a:t>
-            </a:r>
-            <a:r>
-              <a:rPr lang="en-US" sz="2000" dirty="0">
-                <a:latin typeface="Andale Mono" panose="020B0509000000000004" pitchFamily="49" charset="0"/>
-              </a:rPr>
-              <a:t>finally</a:t>
-            </a:r>
-          </a:p>
-          <a:p>
-            <a:pPr marL="0" indent="0">
-              <a:lnSpc>
-                <a:spcPct val="150000"/>
-              </a:lnSpc>
-              <a:buNone/>
-            </a:pPr>
-            <a:r>
-              <a:rPr lang="en-US" sz="2000" dirty="0"/>
-              <a:t>Anything that implements </a:t>
-            </a:r>
-            <a:r>
-              <a:rPr lang="en-US" sz="2000" dirty="0" err="1">
-                <a:latin typeface="Andale Mono" panose="020B0509000000000004" pitchFamily="49" charset="0"/>
-              </a:rPr>
-              <a:t>java.lang.AutoClosable</a:t>
-            </a:r>
-            <a:endParaRPr lang="en-US" sz="2000" dirty="0">
-              <a:latin typeface="Andale Mono" panose="020B0509000000000004" pitchFamily="49" charset="0"/>
-            </a:endParaRPr>
-          </a:p>
         </p:txBody>
       </p:sp>
     </p:spTree>
@@ -10337,68 +10372,6 @@
                                           <p:spTgt spid="4">
                                             <p:txEl>
                                               <p:pRg st="2" end="2"/>
-                                            </p:txEl>
-                                          </p:spTgt>
-                                        </p:tgtEl>
-                                        <p:attrNameLst>
-                                          <p:attrName>style.visibility</p:attrName>
-                                        </p:attrNameLst>
-                                      </p:cBhvr>
-                                      <p:to>
-                                        <p:strVal val="visible"/>
-                                      </p:to>
-                                    </p:set>
-                                  </p:childTnLst>
-                                </p:cTn>
-                              </p:par>
-                              <p:par>
-                                <p:cTn id="12" presetID="1" presetClass="entr" presetSubtype="0" fill="hold" nodeType="withEffect">
-                                  <p:stCondLst>
-                                    <p:cond delay="0"/>
-                                  </p:stCondLst>
-                                  <p:childTnLst>
-                                    <p:set>
-                                      <p:cBhvr>
-                                        <p:cTn id="13" dur="1" fill="hold">
-                                          <p:stCondLst>
-                                            <p:cond delay="0"/>
-                                          </p:stCondLst>
-                                        </p:cTn>
-                                        <p:tgtEl>
-                                          <p:spTgt spid="4">
-                                            <p:txEl>
-                                              <p:pRg st="3" end="3"/>
-                                            </p:txEl>
-                                          </p:spTgt>
-                                        </p:tgtEl>
-                                        <p:attrNameLst>
-                                          <p:attrName>style.visibility</p:attrName>
-                                        </p:attrNameLst>
-                                      </p:cBhvr>
-                                      <p:to>
-                                        <p:strVal val="visible"/>
-                                      </p:to>
-                                    </p:set>
-                                  </p:childTnLst>
-                                </p:cTn>
-                              </p:par>
-                              <p:par>
-                                <p:cTn id="14" presetID="1" presetClass="entr" presetSubtype="0" fill="hold" nodeType="withEffect">
-                                  <p:stCondLst>
-                                    <p:cond delay="0"/>
-                                  </p:stCondLst>
-                                  <p:childTnLst>
-                                    <p:set>
-                                      <p:cBhvr>
-                                        <p:cTn id="15" dur="1" fill="hold">
-                                          <p:stCondLst>
-                                            <p:cond delay="0"/>
-                                          </p:stCondLst>
-                                        </p:cTn>
-                                        <p:tgtEl>
-                                          <p:spTgt spid="4">
-                                            <p:txEl>
-                                              <p:pRg st="4" end="4"/>
                                             </p:txEl>
                                           </p:spTgt>
                                         </p:tgtEl>
@@ -12432,13 +12405,13 @@
   <p:clrMapOvr>
     <a:masterClrMapping/>
   </p:clrMapOvr>
-  <mc:AlternateContent xmlns:mc="http://schemas.openxmlformats.org/markup-compatibility/2006">
-    <mc:Choice xmlns:p159="http://schemas.microsoft.com/office/powerpoint/2015/09/main" Requires="p159">
+  <mc:AlternateContent xmlns:mc="http://schemas.openxmlformats.org/markup-compatibility/2006" xmlns:p159="http://schemas.microsoft.com/office/powerpoint/2015/09/main">
+    <mc:Choice Requires="p159">
       <p:transition spd="slow">
         <p159:morph option="byObject"/>
       </p:transition>
     </mc:Choice>
-    <mc:Fallback>
+    <mc:Fallback xmlns="">
       <p:transition spd="slow">
         <p:fade/>
       </p:transition>
@@ -13937,13 +13910,13 @@
   <p:clrMapOvr>
     <a:masterClrMapping/>
   </p:clrMapOvr>
-  <mc:AlternateContent xmlns:mc="http://schemas.openxmlformats.org/markup-compatibility/2006">
-    <mc:Choice xmlns:p14="http://schemas.microsoft.com/office/powerpoint/2010/main" Requires="p14">
+  <mc:AlternateContent xmlns:mc="http://schemas.openxmlformats.org/markup-compatibility/2006" xmlns:p14="http://schemas.microsoft.com/office/powerpoint/2010/main">
+    <mc:Choice Requires="p14">
       <p:transition spd="med" p14:dur="700">
         <p:fade/>
       </p:transition>
     </mc:Choice>
-    <mc:Fallback>
+    <mc:Fallback xmlns="">
       <p:transition spd="med">
         <p:fade/>
       </p:transition>
@@ -15547,13 +15520,13 @@
   <p:clrMapOvr>
     <a:masterClrMapping/>
   </p:clrMapOvr>
-  <mc:AlternateContent xmlns:mc="http://schemas.openxmlformats.org/markup-compatibility/2006">
-    <mc:Choice xmlns:p14="http://schemas.microsoft.com/office/powerpoint/2010/main" Requires="p14">
+  <mc:AlternateContent xmlns:mc="http://schemas.openxmlformats.org/markup-compatibility/2006" xmlns:p14="http://schemas.microsoft.com/office/powerpoint/2010/main">
+    <mc:Choice Requires="p14">
       <p:transition spd="med" p14:dur="700">
         <p:fade/>
       </p:transition>
     </mc:Choice>
-    <mc:Fallback>
+    <mc:Fallback xmlns="">
       <p:transition spd="med">
         <p:fade/>
       </p:transition>
@@ -15678,13 +15651,13 @@
   <p:clrMapOvr>
     <a:masterClrMapping/>
   </p:clrMapOvr>
-  <mc:AlternateContent xmlns:mc="http://schemas.openxmlformats.org/markup-compatibility/2006">
-    <mc:Choice xmlns:p159="http://schemas.microsoft.com/office/powerpoint/2015/09/main" Requires="p159">
+  <mc:AlternateContent xmlns:mc="http://schemas.openxmlformats.org/markup-compatibility/2006" xmlns:p159="http://schemas.microsoft.com/office/powerpoint/2015/09/main">
+    <mc:Choice Requires="p159">
       <p:transition spd="slow">
         <p159:morph option="byObject"/>
       </p:transition>
     </mc:Choice>
-    <mc:Fallback>
+    <mc:Fallback xmlns="">
       <p:transition spd="slow">
         <p:fade/>
       </p:transition>
@@ -16898,13 +16871,13 @@
   <p:clrMapOvr>
     <a:masterClrMapping/>
   </p:clrMapOvr>
-  <mc:AlternateContent xmlns:mc="http://schemas.openxmlformats.org/markup-compatibility/2006">
-    <mc:Choice xmlns:p14="http://schemas.microsoft.com/office/powerpoint/2010/main" Requires="p14">
+  <mc:AlternateContent xmlns:mc="http://schemas.openxmlformats.org/markup-compatibility/2006" xmlns:p14="http://schemas.microsoft.com/office/powerpoint/2010/main">
+    <mc:Choice Requires="p14">
       <p:transition spd="med" p14:dur="700">
         <p:fade/>
       </p:transition>
     </mc:Choice>
-    <mc:Fallback>
+    <mc:Fallback xmlns="">
       <p:transition spd="med">
         <p:fade/>
       </p:transition>
@@ -22648,13 +22621,13 @@
   <p:clrMapOvr>
     <a:masterClrMapping/>
   </p:clrMapOvr>
-  <mc:AlternateContent xmlns:mc="http://schemas.openxmlformats.org/markup-compatibility/2006">
-    <mc:Choice xmlns:p14="http://schemas.microsoft.com/office/powerpoint/2010/main" Requires="p14">
+  <mc:AlternateContent xmlns:mc="http://schemas.openxmlformats.org/markup-compatibility/2006" xmlns:p14="http://schemas.microsoft.com/office/powerpoint/2010/main">
+    <mc:Choice Requires="p14">
       <p:transition spd="med" p14:dur="700">
         <p:fade/>
       </p:transition>
     </mc:Choice>
-    <mc:Fallback>
+    <mc:Fallback xmlns="">
       <p:transition spd="med">
         <p:fade/>
       </p:transition>
@@ -22862,13 +22835,13 @@
   <p:clrMapOvr>
     <a:masterClrMapping/>
   </p:clrMapOvr>
-  <mc:AlternateContent xmlns:mc="http://schemas.openxmlformats.org/markup-compatibility/2006">
-    <mc:Choice xmlns:p159="http://schemas.microsoft.com/office/powerpoint/2015/09/main" Requires="p159">
+  <mc:AlternateContent xmlns:mc="http://schemas.openxmlformats.org/markup-compatibility/2006" xmlns:p159="http://schemas.microsoft.com/office/powerpoint/2015/09/main">
+    <mc:Choice Requires="p159">
       <p:transition xmlns:p14="http://schemas.microsoft.com/office/powerpoint/2010/main" spd="slow" p14:dur="2000">
         <p159:morph option="byObject"/>
       </p:transition>
     </mc:Choice>
-    <mc:Fallback>
+    <mc:Fallback xmlns="">
       <p:transition spd="slow">
         <p:fade/>
       </p:transition>
@@ -25188,13 +25161,13 @@
   <p:clrMapOvr>
     <a:masterClrMapping/>
   </p:clrMapOvr>
-  <mc:AlternateContent xmlns:mc="http://schemas.openxmlformats.org/markup-compatibility/2006">
-    <mc:Choice xmlns:p159="http://schemas.microsoft.com/office/powerpoint/2015/09/main" Requires="p159">
+  <mc:AlternateContent xmlns:mc="http://schemas.openxmlformats.org/markup-compatibility/2006" xmlns:p159="http://schemas.microsoft.com/office/powerpoint/2015/09/main">
+    <mc:Choice Requires="p159">
       <p:transition spd="slow">
         <p159:morph option="byObject"/>
       </p:transition>
     </mc:Choice>
-    <mc:Fallback>
+    <mc:Fallback xmlns="">
       <p:transition spd="slow">
         <p:fade/>
       </p:transition>
@@ -27453,13 +27426,13 @@
   <p:clrMapOvr>
     <a:masterClrMapping/>
   </p:clrMapOvr>
-  <mc:AlternateContent xmlns:mc="http://schemas.openxmlformats.org/markup-compatibility/2006">
-    <mc:Choice xmlns:p159="http://schemas.microsoft.com/office/powerpoint/2015/09/main" Requires="p159">
+  <mc:AlternateContent xmlns:mc="http://schemas.openxmlformats.org/markup-compatibility/2006" xmlns:p159="http://schemas.microsoft.com/office/powerpoint/2015/09/main">
+    <mc:Choice Requires="p159">
       <p:transition spd="slow">
         <p159:morph option="byObject"/>
       </p:transition>
     </mc:Choice>
-    <mc:Fallback>
+    <mc:Fallback xmlns="">
       <p:transition spd="slow">
         <p:fade/>
       </p:transition>

</xml_diff>